<commit_message>
Add Mock vs Stub slides
</commit_message>
<xml_diff>
--- a/Summit2017_Mocking.pptx
+++ b/Summit2017_Mocking.pptx
@@ -5,10 +5,10 @@
     <p:sldMasterId id="2147483648" r:id="rId4"/>
   </p:sldMasterIdLst>
   <p:notesMasterIdLst>
-    <p:notesMasterId r:id="rId20"/>
+    <p:notesMasterId r:id="rId22"/>
   </p:notesMasterIdLst>
   <p:handoutMasterIdLst>
-    <p:handoutMasterId r:id="rId21"/>
+    <p:handoutMasterId r:id="rId23"/>
   </p:handoutMasterIdLst>
   <p:sldIdLst>
     <p:sldId id="422" r:id="rId5"/>
@@ -18,14 +18,16 @@
     <p:sldId id="424" r:id="rId9"/>
     <p:sldId id="425" r:id="rId10"/>
     <p:sldId id="408" r:id="rId11"/>
-    <p:sldId id="402" r:id="rId12"/>
-    <p:sldId id="416" r:id="rId13"/>
-    <p:sldId id="417" r:id="rId14"/>
-    <p:sldId id="418" r:id="rId15"/>
-    <p:sldId id="419" r:id="rId16"/>
-    <p:sldId id="420" r:id="rId17"/>
-    <p:sldId id="409" r:id="rId18"/>
-    <p:sldId id="421" r:id="rId19"/>
+    <p:sldId id="426" r:id="rId12"/>
+    <p:sldId id="427" r:id="rId13"/>
+    <p:sldId id="402" r:id="rId14"/>
+    <p:sldId id="416" r:id="rId15"/>
+    <p:sldId id="417" r:id="rId16"/>
+    <p:sldId id="418" r:id="rId17"/>
+    <p:sldId id="419" r:id="rId18"/>
+    <p:sldId id="420" r:id="rId19"/>
+    <p:sldId id="409" r:id="rId20"/>
+    <p:sldId id="421" r:id="rId21"/>
   </p:sldIdLst>
   <p:sldSz cx="9144000" cy="5143500" type="screen16x9"/>
   <p:notesSz cx="6858000" cy="9144000"/>
@@ -1026,7 +1028,7 @@
                 <a:ea typeface="+mn-ea"/>
                 <a:cs typeface="+mn-cs"/>
               </a:rPr>
-              <a:t>After 1965 Ford built a dynamometer laboratory to automate the testing of the engines as closely as possible to on-course conditions.</a:t>
+              <a:t>After the 1965 season Ford built a dynamometer laboratory to automate the testing of the engines as closely as possible to on-course conditions.</a:t>
             </a:r>
           </a:p>
           <a:p>
@@ -1127,15 +1129,18 @@
               <a:buFont typeface="Arial" panose="020B0604020202020204" pitchFamily="34" charset="0"/>
               <a:buChar char="•"/>
             </a:pPr>
-            <a:endParaRPr lang="en-US" sz="1000" b="0" i="0" kern="1200" dirty="0">
-              <a:solidFill>
-                <a:schemeClr val="tx1"/>
-              </a:solidFill>
-              <a:effectLst/>
-              <a:latin typeface="+mn-lt"/>
-              <a:ea typeface="+mn-ea"/>
-              <a:cs typeface="+mn-cs"/>
-            </a:endParaRPr>
+            <a:r>
+              <a:rPr lang="en-US" sz="1000" b="0" i="0" kern="1200" dirty="0">
+                <a:solidFill>
+                  <a:schemeClr val="tx1"/>
+                </a:solidFill>
+                <a:effectLst/>
+                <a:latin typeface="+mn-lt"/>
+                <a:ea typeface="+mn-ea"/>
+                <a:cs typeface="+mn-cs"/>
+              </a:rPr>
+              <a:t>That’s a big win for automated testing</a:t>
+            </a:r>
           </a:p>
         </p:txBody>
       </p:sp>
@@ -1167,6 +1172,391 @@
     <p:extLst>
       <p:ext uri="{BB962C8B-B14F-4D97-AF65-F5344CB8AC3E}">
         <p14:creationId xmlns:p14="http://schemas.microsoft.com/office/powerpoint/2010/main" val="2577835155"/>
+      </p:ext>
+    </p:extLst>
+  </p:cSld>
+  <p:clrMapOvr>
+    <a:masterClrMapping/>
+  </p:clrMapOvr>
+</p:notes>
+</file>
+
+<file path=ppt/notesSlides/notesSlide5.xml><?xml version="1.0" encoding="utf-8"?>
+<p:notes xmlns:a="http://schemas.openxmlformats.org/drawingml/2006/main" xmlns:r="http://schemas.openxmlformats.org/officeDocument/2006/relationships" xmlns:p="http://schemas.openxmlformats.org/presentationml/2006/main">
+  <p:cSld>
+    <p:spTree>
+      <p:nvGrpSpPr>
+        <p:cNvPr id="1" name=""/>
+        <p:cNvGrpSpPr/>
+        <p:nvPr/>
+      </p:nvGrpSpPr>
+      <p:grpSpPr>
+        <a:xfrm>
+          <a:off x="0" y="0"/>
+          <a:ext cx="0" cy="0"/>
+          <a:chOff x="0" y="0"/>
+          <a:chExt cx="0" cy="0"/>
+        </a:xfrm>
+      </p:grpSpPr>
+      <p:sp>
+        <p:nvSpPr>
+          <p:cNvPr id="2" name="Slide Image Placeholder 1"/>
+          <p:cNvSpPr>
+            <a:spLocks noGrp="1" noRot="1" noChangeAspect="1"/>
+          </p:cNvSpPr>
+          <p:nvPr>
+            <p:ph type="sldImg"/>
+          </p:nvPr>
+        </p:nvSpPr>
+        <p:spPr/>
+      </p:sp>
+      <p:sp>
+        <p:nvSpPr>
+          <p:cNvPr id="3" name="Notes Placeholder 2"/>
+          <p:cNvSpPr>
+            <a:spLocks noGrp="1"/>
+          </p:cNvSpPr>
+          <p:nvPr>
+            <p:ph type="body" idx="1"/>
+          </p:nvPr>
+        </p:nvSpPr>
+        <p:spPr/>
+        <p:txBody>
+          <a:bodyPr/>
+          <a:lstStyle/>
+          <a:p>
+            <a:pPr marL="171450" indent="-171450">
+              <a:buFont typeface="Arial" panose="020B0604020202020204" pitchFamily="34" charset="0"/>
+              <a:buChar char="•"/>
+            </a:pPr>
+            <a:r>
+              <a:rPr lang="en-US" sz="1000" b="0" i="0" kern="1200" dirty="0">
+                <a:solidFill>
+                  <a:schemeClr val="tx1"/>
+                </a:solidFill>
+                <a:effectLst/>
+                <a:latin typeface="+mn-lt"/>
+                <a:ea typeface="+mn-ea"/>
+                <a:cs typeface="+mn-cs"/>
+              </a:rPr>
+              <a:t>We use the term </a:t>
+            </a:r>
+            <a:r>
+              <a:rPr lang="en-US" sz="1000" b="1" i="0" kern="1200" dirty="0">
+                <a:solidFill>
+                  <a:schemeClr val="tx1"/>
+                </a:solidFill>
+                <a:effectLst/>
+                <a:latin typeface="+mn-lt"/>
+                <a:ea typeface="+mn-ea"/>
+                <a:cs typeface="+mn-cs"/>
+              </a:rPr>
+              <a:t>Mock</a:t>
+            </a:r>
+            <a:r>
+              <a:rPr lang="en-US" sz="1000" b="0" i="0" kern="1200" dirty="0">
+                <a:solidFill>
+                  <a:schemeClr val="tx1"/>
+                </a:solidFill>
+                <a:effectLst/>
+                <a:latin typeface="+mn-lt"/>
+                <a:ea typeface="+mn-ea"/>
+                <a:cs typeface="+mn-cs"/>
+              </a:rPr>
+              <a:t> we are most likely meant Test Double</a:t>
+            </a:r>
+          </a:p>
+          <a:p>
+            <a:pPr marL="171450" indent="-171450">
+              <a:buFont typeface="Arial" panose="020B0604020202020204" pitchFamily="34" charset="0"/>
+              <a:buChar char="•"/>
+            </a:pPr>
+            <a:r>
+              <a:rPr lang="en-US" sz="1000" b="0" i="0" kern="1200" dirty="0">
+                <a:solidFill>
+                  <a:schemeClr val="tx1"/>
+                </a:solidFill>
+                <a:effectLst/>
+                <a:latin typeface="+mn-lt"/>
+                <a:ea typeface="+mn-ea"/>
+                <a:cs typeface="+mn-cs"/>
+              </a:rPr>
+              <a:t>It’s probably not super important that you know these by heart, but understand that you use different Test Doubles for the different types of verification</a:t>
+            </a:r>
+          </a:p>
+          <a:p>
+            <a:pPr marL="171450" indent="-171450">
+              <a:buFont typeface="Arial" panose="020B0604020202020204" pitchFamily="34" charset="0"/>
+              <a:buChar char="•"/>
+            </a:pPr>
+            <a:r>
+              <a:rPr lang="en-US" sz="1000" b="0" i="0" kern="1200" dirty="0">
+                <a:solidFill>
+                  <a:schemeClr val="tx1"/>
+                </a:solidFill>
+                <a:effectLst/>
+                <a:latin typeface="+mn-lt"/>
+                <a:ea typeface="+mn-ea"/>
+                <a:cs typeface="+mn-cs"/>
+              </a:rPr>
+              <a:t>When you are verifying the state, was your state affected by a Stub?</a:t>
+            </a:r>
+          </a:p>
+          <a:p>
+            <a:pPr marL="171450" indent="-171450">
+              <a:buFont typeface="Arial" panose="020B0604020202020204" pitchFamily="34" charset="0"/>
+              <a:buChar char="•"/>
+            </a:pPr>
+            <a:r>
+              <a:rPr lang="en-US" sz="1000" b="0" i="0" kern="1200" dirty="0">
+                <a:solidFill>
+                  <a:schemeClr val="tx1"/>
+                </a:solidFill>
+                <a:effectLst/>
+                <a:latin typeface="+mn-lt"/>
+                <a:ea typeface="+mn-ea"/>
+                <a:cs typeface="+mn-cs"/>
+              </a:rPr>
+              <a:t>When you are verifying behavior</a:t>
+            </a:r>
+            <a:endParaRPr lang="en-US" dirty="0"/>
+          </a:p>
+        </p:txBody>
+      </p:sp>
+      <p:sp>
+        <p:nvSpPr>
+          <p:cNvPr id="4" name="Slide Number Placeholder 3"/>
+          <p:cNvSpPr>
+            <a:spLocks noGrp="1"/>
+          </p:cNvSpPr>
+          <p:nvPr>
+            <p:ph type="sldNum" sz="quarter" idx="10"/>
+          </p:nvPr>
+        </p:nvSpPr>
+        <p:spPr/>
+        <p:txBody>
+          <a:bodyPr/>
+          <a:lstStyle/>
+          <a:p>
+            <a:fld id="{580C3CF9-2088-4345-84DE-A0500A36AC73}" type="slidenum">
+              <a:rPr lang="en-US" smtClean="0"/>
+              <a:pPr/>
+              <a:t>7</a:t>
+            </a:fld>
+            <a:endParaRPr lang="en-US"/>
+          </a:p>
+        </p:txBody>
+      </p:sp>
+    </p:spTree>
+    <p:extLst>
+      <p:ext uri="{BB962C8B-B14F-4D97-AF65-F5344CB8AC3E}">
+        <p14:creationId xmlns:p14="http://schemas.microsoft.com/office/powerpoint/2010/main" val="1630166121"/>
+      </p:ext>
+    </p:extLst>
+  </p:cSld>
+  <p:clrMapOvr>
+    <a:masterClrMapping/>
+  </p:clrMapOvr>
+</p:notes>
+</file>
+
+<file path=ppt/notesSlides/notesSlide6.xml><?xml version="1.0" encoding="utf-8"?>
+<p:notes xmlns:a="http://schemas.openxmlformats.org/drawingml/2006/main" xmlns:r="http://schemas.openxmlformats.org/officeDocument/2006/relationships" xmlns:p="http://schemas.openxmlformats.org/presentationml/2006/main">
+  <p:cSld>
+    <p:spTree>
+      <p:nvGrpSpPr>
+        <p:cNvPr id="1" name=""/>
+        <p:cNvGrpSpPr/>
+        <p:nvPr/>
+      </p:nvGrpSpPr>
+      <p:grpSpPr>
+        <a:xfrm>
+          <a:off x="0" y="0"/>
+          <a:ext cx="0" cy="0"/>
+          <a:chOff x="0" y="0"/>
+          <a:chExt cx="0" cy="0"/>
+        </a:xfrm>
+      </p:grpSpPr>
+      <p:sp>
+        <p:nvSpPr>
+          <p:cNvPr id="2" name="Slide Image Placeholder 1"/>
+          <p:cNvSpPr>
+            <a:spLocks noGrp="1" noRot="1" noChangeAspect="1"/>
+          </p:cNvSpPr>
+          <p:nvPr>
+            <p:ph type="sldImg"/>
+          </p:nvPr>
+        </p:nvSpPr>
+        <p:spPr/>
+      </p:sp>
+      <p:sp>
+        <p:nvSpPr>
+          <p:cNvPr id="3" name="Notes Placeholder 2"/>
+          <p:cNvSpPr>
+            <a:spLocks noGrp="1"/>
+          </p:cNvSpPr>
+          <p:nvPr>
+            <p:ph type="body" idx="1"/>
+          </p:nvPr>
+        </p:nvSpPr>
+        <p:spPr/>
+        <p:txBody>
+          <a:bodyPr/>
+          <a:lstStyle/>
+          <a:p>
+            <a:pPr marL="171450" indent="-171450">
+              <a:buFont typeface="Arial" panose="020B0604020202020204" pitchFamily="34" charset="0"/>
+              <a:buChar char="•"/>
+            </a:pPr>
+            <a:r>
+              <a:rPr lang="en-US" dirty="0"/>
+              <a:t>code C:\Source\TMGit\chris.hunt\pssummit2017-mocking\Demo1-MockvsSt ub.ps1</a:t>
+            </a:r>
+          </a:p>
+          <a:p>
+            <a:pPr marL="171450" indent="-171450">
+              <a:buFont typeface="Arial" panose="020B0604020202020204" pitchFamily="34" charset="0"/>
+              <a:buChar char="•"/>
+            </a:pPr>
+            <a:r>
+              <a:rPr lang="en-US" dirty="0"/>
+              <a:t>invoke-pester .\Demo1-MockvsStub.ps1</a:t>
+            </a:r>
+            <a:endParaRPr lang="en-US" dirty="0"/>
+          </a:p>
+        </p:txBody>
+      </p:sp>
+      <p:sp>
+        <p:nvSpPr>
+          <p:cNvPr id="4" name="Slide Number Placeholder 3"/>
+          <p:cNvSpPr>
+            <a:spLocks noGrp="1"/>
+          </p:cNvSpPr>
+          <p:nvPr>
+            <p:ph type="sldNum" sz="quarter" idx="10"/>
+          </p:nvPr>
+        </p:nvSpPr>
+        <p:spPr/>
+        <p:txBody>
+          <a:bodyPr/>
+          <a:lstStyle/>
+          <a:p>
+            <a:fld id="{580C3CF9-2088-4345-84DE-A0500A36AC73}" type="slidenum">
+              <a:rPr lang="en-US" smtClean="0"/>
+              <a:pPr/>
+              <a:t>8</a:t>
+            </a:fld>
+            <a:endParaRPr lang="en-US"/>
+          </a:p>
+        </p:txBody>
+      </p:sp>
+    </p:spTree>
+    <p:extLst>
+      <p:ext uri="{BB962C8B-B14F-4D97-AF65-F5344CB8AC3E}">
+        <p14:creationId xmlns:p14="http://schemas.microsoft.com/office/powerpoint/2010/main" val="3105298814"/>
+      </p:ext>
+    </p:extLst>
+  </p:cSld>
+  <p:clrMapOvr>
+    <a:masterClrMapping/>
+  </p:clrMapOvr>
+</p:notes>
+</file>
+
+<file path=ppt/notesSlides/notesSlide7.xml><?xml version="1.0" encoding="utf-8"?>
+<p:notes xmlns:a="http://schemas.openxmlformats.org/drawingml/2006/main" xmlns:r="http://schemas.openxmlformats.org/officeDocument/2006/relationships" xmlns:p="http://schemas.openxmlformats.org/presentationml/2006/main">
+  <p:cSld>
+    <p:spTree>
+      <p:nvGrpSpPr>
+        <p:cNvPr id="1" name=""/>
+        <p:cNvGrpSpPr/>
+        <p:nvPr/>
+      </p:nvGrpSpPr>
+      <p:grpSpPr>
+        <a:xfrm>
+          <a:off x="0" y="0"/>
+          <a:ext cx="0" cy="0"/>
+          <a:chOff x="0" y="0"/>
+          <a:chExt cx="0" cy="0"/>
+        </a:xfrm>
+      </p:grpSpPr>
+      <p:sp>
+        <p:nvSpPr>
+          <p:cNvPr id="2" name="Slide Image Placeholder 1"/>
+          <p:cNvSpPr>
+            <a:spLocks noGrp="1" noRot="1" noChangeAspect="1"/>
+          </p:cNvSpPr>
+          <p:nvPr>
+            <p:ph type="sldImg"/>
+          </p:nvPr>
+        </p:nvSpPr>
+        <p:spPr/>
+      </p:sp>
+      <p:sp>
+        <p:nvSpPr>
+          <p:cNvPr id="3" name="Notes Placeholder 2"/>
+          <p:cNvSpPr>
+            <a:spLocks noGrp="1"/>
+          </p:cNvSpPr>
+          <p:nvPr>
+            <p:ph type="body" idx="1"/>
+          </p:nvPr>
+        </p:nvSpPr>
+        <p:spPr/>
+        <p:txBody>
+          <a:bodyPr/>
+          <a:lstStyle/>
+          <a:p>
+            <a:pPr marL="171450" indent="-171450">
+              <a:buFont typeface="Arial" panose="020B0604020202020204" pitchFamily="34" charset="0"/>
+              <a:buChar char="•"/>
+            </a:pPr>
+            <a:r>
+              <a:rPr lang="en-US" dirty="0"/>
+              <a:t>code C:\Source\TMGit\chris.hunt\pssummit2017-mocking\Demo1-MockvsSt ub.ps1</a:t>
+            </a:r>
+          </a:p>
+          <a:p>
+            <a:pPr marL="171450" indent="-171450">
+              <a:buFont typeface="Arial" panose="020B0604020202020204" pitchFamily="34" charset="0"/>
+              <a:buChar char="•"/>
+            </a:pPr>
+            <a:r>
+              <a:rPr lang="en-US" dirty="0"/>
+              <a:t>invoke-pester .\Demo1-MockvsStub.ps1</a:t>
+            </a:r>
+            <a:endParaRPr lang="en-US" dirty="0"/>
+          </a:p>
+        </p:txBody>
+      </p:sp>
+      <p:sp>
+        <p:nvSpPr>
+          <p:cNvPr id="4" name="Slide Number Placeholder 3"/>
+          <p:cNvSpPr>
+            <a:spLocks noGrp="1"/>
+          </p:cNvSpPr>
+          <p:nvPr>
+            <p:ph type="sldNum" sz="quarter" idx="10"/>
+          </p:nvPr>
+        </p:nvSpPr>
+        <p:spPr/>
+        <p:txBody>
+          <a:bodyPr/>
+          <a:lstStyle/>
+          <a:p>
+            <a:fld id="{580C3CF9-2088-4345-84DE-A0500A36AC73}" type="slidenum">
+              <a:rPr lang="en-US" smtClean="0"/>
+              <a:pPr/>
+              <a:t>9</a:t>
+            </a:fld>
+            <a:endParaRPr lang="en-US"/>
+          </a:p>
+        </p:txBody>
+      </p:sp>
+    </p:spTree>
+    <p:extLst>
+      <p:ext uri="{BB962C8B-B14F-4D97-AF65-F5344CB8AC3E}">
+        <p14:creationId xmlns:p14="http://schemas.microsoft.com/office/powerpoint/2010/main" val="3229578436"/>
       </p:ext>
     </p:extLst>
   </p:cSld>
@@ -9759,28 +10149,63 @@
           </a:bodyPr>
           <a:lstStyle/>
           <a:p>
-            <a:pPr algn="l"/>
+            <a:pPr algn="l">
+              <a:lnSpc>
+                <a:spcPct val="100000"/>
+              </a:lnSpc>
+              <a:spcBef>
+                <a:spcPts val="600"/>
+              </a:spcBef>
+            </a:pPr>
             <a:r>
               <a:rPr lang="en-US" sz="2400" b="1" dirty="0"/>
               <a:t>Chris Hunt</a:t>
             </a:r>
           </a:p>
           <a:p>
-            <a:pPr algn="l"/>
-            <a:r>
-              <a:rPr lang="en-US" sz="2400" dirty="0"/>
+            <a:pPr algn="l">
+              <a:lnSpc>
+                <a:spcPct val="100000"/>
+              </a:lnSpc>
+              <a:spcBef>
+                <a:spcPts val="600"/>
+              </a:spcBef>
+            </a:pPr>
+            <a:r>
+              <a:rPr lang="en-US" sz="1800" dirty="0"/>
+              <a:t>Windows Platform Engineer @ Ticketmaster</a:t>
+            </a:r>
+          </a:p>
+          <a:p>
+            <a:pPr algn="l">
+              <a:lnSpc>
+                <a:spcPct val="100000"/>
+              </a:lnSpc>
+              <a:spcBef>
+                <a:spcPts val="600"/>
+              </a:spcBef>
+            </a:pPr>
+            <a:r>
+              <a:rPr lang="en-US" sz="1800" dirty="0"/>
               <a:t>@</a:t>
             </a:r>
             <a:r>
-              <a:rPr lang="en-US" sz="2400" dirty="0" err="1"/>
+              <a:rPr lang="en-US" sz="1800" dirty="0" err="1"/>
               <a:t>LogicalDiagram</a:t>
             </a:r>
-            <a:endParaRPr lang="en-US" sz="2400" dirty="0"/>
-          </a:p>
-          <a:p>
-            <a:pPr algn="l"/>
-            <a:r>
-              <a:rPr lang="en-US" sz="2400" dirty="0"/>
+            <a:endParaRPr lang="en-US" sz="1800" dirty="0"/>
+          </a:p>
+          <a:p>
+            <a:pPr algn="l">
+              <a:lnSpc>
+                <a:spcPct val="100000"/>
+              </a:lnSpc>
+              <a:spcBef>
+                <a:spcPts val="600"/>
+              </a:spcBef>
+            </a:pPr>
+            <a:r>
+              <a:rPr lang="en-US" sz="1800" dirty="0"/>
               <a:t>https://github.com/cdhunt</a:t>
             </a:r>
           </a:p>
@@ -9882,6 +10307,461 @@
                 <a:latin typeface="Interstate-Black"/>
                 <a:cs typeface="Interstate-Black"/>
               </a:rPr>
+              <a:t>Compute Provisioning</a:t>
+            </a:r>
+          </a:p>
+          <a:p>
+            <a:endParaRPr lang="en-US" dirty="0">
+              <a:latin typeface="Interstate-Black"/>
+              <a:cs typeface="Interstate-Black"/>
+            </a:endParaRPr>
+          </a:p>
+        </p:txBody>
+      </p:sp>
+      <p:sp>
+        <p:nvSpPr>
+          <p:cNvPr id="4" name="Content Placeholder 3"/>
+          <p:cNvSpPr>
+            <a:spLocks noGrp="1"/>
+          </p:cNvSpPr>
+          <p:nvPr>
+            <p:ph sz="quarter" idx="17"/>
+          </p:nvPr>
+        </p:nvSpPr>
+        <p:spPr>
+          <a:xfrm>
+            <a:off x="273051" y="4011513"/>
+            <a:ext cx="8550274" cy="770366"/>
+          </a:xfrm>
+        </p:spPr>
+        <p:txBody>
+          <a:bodyPr>
+            <a:noAutofit/>
+          </a:bodyPr>
+          <a:lstStyle/>
+          <a:p>
+            <a:r>
+              <a:rPr lang="en-US" sz="1200" dirty="0"/>
+              <a:t>One of the biggest decisions is determining how the compute for your application will be provisioned. Docker or server-less technologies are strongly preferred, and will work for most Windows applications, but not all. In cases where Docker containers are not suitable, it is recommended to use immutable EC2 instances, as this will provide a similar management experience as containers. Terraform(</a:t>
+            </a:r>
+            <a:r>
+              <a:rPr lang="en-US" sz="1200" dirty="0" err="1"/>
+              <a:t>er</a:t>
+            </a:r>
+            <a:r>
+              <a:rPr lang="en-US" sz="1200" dirty="0"/>
+              <a:t>) must be used for all options.</a:t>
+            </a:r>
+          </a:p>
+          <a:p>
+            <a:endParaRPr lang="en-US" sz="1200" dirty="0"/>
+          </a:p>
+        </p:txBody>
+      </p:sp>
+      <p:cxnSp>
+        <p:nvCxnSpPr>
+          <p:cNvPr id="6" name="Straight Connector 5"/>
+          <p:cNvCxnSpPr>
+            <a:stCxn id="3" idx="1"/>
+            <a:endCxn id="3" idx="3"/>
+          </p:cNvCxnSpPr>
+          <p:nvPr/>
+        </p:nvCxnSpPr>
+        <p:spPr>
+          <a:xfrm>
+            <a:off x="273051" y="641272"/>
+            <a:ext cx="8550274" cy="0"/>
+          </a:xfrm>
+          <a:prstGeom prst="line">
+            <a:avLst/>
+          </a:prstGeom>
+        </p:spPr>
+        <p:style>
+          <a:lnRef idx="2">
+            <a:schemeClr val="accent1"/>
+          </a:lnRef>
+          <a:fillRef idx="0">
+            <a:schemeClr val="accent1"/>
+          </a:fillRef>
+          <a:effectRef idx="1">
+            <a:schemeClr val="accent1"/>
+          </a:effectRef>
+          <a:fontRef idx="minor">
+            <a:schemeClr val="tx1"/>
+          </a:fontRef>
+        </p:style>
+      </p:cxnSp>
+      <p:pic>
+        <p:nvPicPr>
+          <p:cNvPr id="2" name="Picture 1"/>
+          <p:cNvPicPr>
+            <a:picLocks noChangeAspect="1"/>
+          </p:cNvPicPr>
+          <p:nvPr/>
+        </p:nvPicPr>
+        <p:blipFill>
+          <a:blip r:embed="rId2"/>
+          <a:stretch>
+            <a:fillRect/>
+          </a:stretch>
+        </p:blipFill>
+        <p:spPr>
+          <a:xfrm>
+            <a:off x="273051" y="793760"/>
+            <a:ext cx="8573478" cy="3049801"/>
+          </a:xfrm>
+          <a:prstGeom prst="rect">
+            <a:avLst/>
+          </a:prstGeom>
+        </p:spPr>
+      </p:pic>
+    </p:spTree>
+    <p:extLst>
+      <p:ext uri="{BB962C8B-B14F-4D97-AF65-F5344CB8AC3E}">
+        <p14:creationId xmlns:p14="http://schemas.microsoft.com/office/powerpoint/2010/main" val="2378701437"/>
+      </p:ext>
+    </p:extLst>
+  </p:cSld>
+  <p:clrMapOvr>
+    <a:masterClrMapping/>
+  </p:clrMapOvr>
+</p:sld>
+</file>
+
+<file path=ppt/slides/slide11.xml><?xml version="1.0" encoding="utf-8"?>
+<p:sld xmlns:a="http://schemas.openxmlformats.org/drawingml/2006/main" xmlns:r="http://schemas.openxmlformats.org/officeDocument/2006/relationships" xmlns:p="http://schemas.openxmlformats.org/presentationml/2006/main">
+  <p:cSld>
+    <p:spTree>
+      <p:nvGrpSpPr>
+        <p:cNvPr id="1" name=""/>
+        <p:cNvGrpSpPr/>
+        <p:nvPr/>
+      </p:nvGrpSpPr>
+      <p:grpSpPr>
+        <a:xfrm>
+          <a:off x="0" y="0"/>
+          <a:ext cx="0" cy="0"/>
+          <a:chOff x="0" y="0"/>
+          <a:chExt cx="0" cy="0"/>
+        </a:xfrm>
+      </p:grpSpPr>
+      <p:sp>
+        <p:nvSpPr>
+          <p:cNvPr id="3" name="Text Placeholder 2"/>
+          <p:cNvSpPr>
+            <a:spLocks noGrp="1"/>
+          </p:cNvSpPr>
+          <p:nvPr>
+            <p:ph type="body" sz="quarter" idx="15"/>
+          </p:nvPr>
+        </p:nvSpPr>
+        <p:spPr>
+          <a:effectLst>
+            <a:outerShdw blurRad="40005" dist="20320" dir="5400000" algn="ctr" rotWithShape="0">
+              <a:schemeClr val="bg2">
+                <a:alpha val="38000"/>
+              </a:schemeClr>
+            </a:outerShdw>
+          </a:effectLst>
+        </p:spPr>
+        <p:txBody>
+          <a:bodyPr/>
+          <a:lstStyle/>
+          <a:p>
+            <a:r>
+              <a:rPr lang="en-US" dirty="0">
+                <a:latin typeface="Interstate-Black"/>
+                <a:cs typeface="Interstate-Black"/>
+              </a:rPr>
+              <a:t>Web Gateways</a:t>
+            </a:r>
+          </a:p>
+          <a:p>
+            <a:endParaRPr lang="en-US" dirty="0">
+              <a:latin typeface="Interstate-Black"/>
+              <a:cs typeface="Interstate-Black"/>
+            </a:endParaRPr>
+          </a:p>
+        </p:txBody>
+      </p:sp>
+      <p:cxnSp>
+        <p:nvCxnSpPr>
+          <p:cNvPr id="6" name="Straight Connector 5"/>
+          <p:cNvCxnSpPr>
+            <a:stCxn id="3" idx="1"/>
+            <a:endCxn id="3" idx="3"/>
+          </p:cNvCxnSpPr>
+          <p:nvPr/>
+        </p:nvCxnSpPr>
+        <p:spPr>
+          <a:xfrm>
+            <a:off x="273051" y="641272"/>
+            <a:ext cx="8550274" cy="0"/>
+          </a:xfrm>
+          <a:prstGeom prst="line">
+            <a:avLst/>
+          </a:prstGeom>
+        </p:spPr>
+        <p:style>
+          <a:lnRef idx="2">
+            <a:schemeClr val="accent1"/>
+          </a:lnRef>
+          <a:fillRef idx="0">
+            <a:schemeClr val="accent1"/>
+          </a:fillRef>
+          <a:effectRef idx="1">
+            <a:schemeClr val="accent1"/>
+          </a:effectRef>
+          <a:fontRef idx="minor">
+            <a:schemeClr val="tx1"/>
+          </a:fontRef>
+        </p:style>
+      </p:cxnSp>
+      <p:sp>
+        <p:nvSpPr>
+          <p:cNvPr id="5" name="Content Placeholder 4"/>
+          <p:cNvSpPr>
+            <a:spLocks noGrp="1"/>
+          </p:cNvSpPr>
+          <p:nvPr>
+            <p:ph sz="quarter" idx="18"/>
+          </p:nvPr>
+        </p:nvSpPr>
+        <p:spPr>
+          <a:xfrm>
+            <a:off x="273051" y="1130561"/>
+            <a:ext cx="3886200" cy="3340292"/>
+          </a:xfrm>
+        </p:spPr>
+        <p:txBody>
+          <a:bodyPr>
+            <a:normAutofit/>
+          </a:bodyPr>
+          <a:lstStyle/>
+          <a:p>
+            <a:pPr algn="ctr"/>
+            <a:r>
+              <a:rPr lang="en-US" sz="1600" b="1" u="sng" dirty="0">
+                <a:solidFill>
+                  <a:schemeClr val="accent3"/>
+                </a:solidFill>
+              </a:rPr>
+              <a:t>Recommendations</a:t>
+            </a:r>
+          </a:p>
+          <a:p>
+            <a:pPr marL="285750" indent="-285750">
+              <a:buFont typeface="Arial" panose="020B0604020202020204" pitchFamily="34" charset="0"/>
+              <a:buChar char="•"/>
+            </a:pPr>
+            <a:r>
+              <a:rPr lang="en-US" dirty="0"/>
+              <a:t>Leverage Docker containers based on Windows Server 2016</a:t>
+            </a:r>
+          </a:p>
+          <a:p>
+            <a:pPr marL="285750" indent="-285750">
+              <a:buFont typeface="Arial" panose="020B0604020202020204" pitchFamily="34" charset="0"/>
+              <a:buChar char="•"/>
+            </a:pPr>
+            <a:r>
+              <a:rPr lang="en-US" dirty="0"/>
+              <a:t>Long term: consider migrating to .NET Core for ease of deployment, maturity and the ability to run cross-platform / use Nano Server</a:t>
+            </a:r>
+          </a:p>
+          <a:p>
+            <a:pPr marL="285750" indent="-285750">
+              <a:buFont typeface="Arial" panose="020B0604020202020204" pitchFamily="34" charset="0"/>
+              <a:buChar char="•"/>
+            </a:pPr>
+            <a:r>
+              <a:rPr lang="en-US" dirty="0"/>
+              <a:t>Use ELB (Elastic Load Balancer) for load balancing</a:t>
+            </a:r>
+          </a:p>
+          <a:p>
+            <a:pPr marL="285750" indent="-285750">
+              <a:buFont typeface="Arial" panose="020B0604020202020204" pitchFamily="34" charset="0"/>
+              <a:buChar char="•"/>
+            </a:pPr>
+            <a:r>
+              <a:rPr lang="en-US" dirty="0"/>
+              <a:t>Should be implemented as one or more auto-scaling group(s)</a:t>
+            </a:r>
+          </a:p>
+          <a:p>
+            <a:pPr marL="285750" indent="-285750">
+              <a:buFont typeface="Arial" panose="020B0604020202020204" pitchFamily="34" charset="0"/>
+              <a:buChar char="•"/>
+            </a:pPr>
+            <a:endParaRPr lang="en-US" dirty="0"/>
+          </a:p>
+          <a:p>
+            <a:pPr marL="285750" indent="-285750">
+              <a:buFont typeface="Arial" panose="020B0604020202020204" pitchFamily="34" charset="0"/>
+              <a:buChar char="•"/>
+            </a:pPr>
+            <a:endParaRPr lang="en-US" dirty="0"/>
+          </a:p>
+          <a:p>
+            <a:pPr marL="285750" indent="-285750">
+              <a:buFont typeface="Arial" panose="020B0604020202020204" pitchFamily="34" charset="0"/>
+              <a:buChar char="•"/>
+            </a:pPr>
+            <a:endParaRPr lang="en-US" dirty="0"/>
+          </a:p>
+        </p:txBody>
+      </p:sp>
+      <p:sp>
+        <p:nvSpPr>
+          <p:cNvPr id="7" name="Content Placeholder 6"/>
+          <p:cNvSpPr>
+            <a:spLocks noGrp="1"/>
+          </p:cNvSpPr>
+          <p:nvPr>
+            <p:ph sz="quarter" idx="17"/>
+          </p:nvPr>
+        </p:nvSpPr>
+        <p:spPr>
+          <a:xfrm>
+            <a:off x="4937125" y="1131957"/>
+            <a:ext cx="3886200" cy="3340292"/>
+          </a:xfrm>
+        </p:spPr>
+        <p:txBody>
+          <a:bodyPr>
+            <a:normAutofit/>
+          </a:bodyPr>
+          <a:lstStyle/>
+          <a:p>
+            <a:pPr algn="ctr"/>
+            <a:r>
+              <a:rPr lang="en-US" sz="1600" b="1" u="sng" dirty="0">
+                <a:solidFill>
+                  <a:schemeClr val="accent3"/>
+                </a:solidFill>
+              </a:rPr>
+              <a:t>Concerns</a:t>
+            </a:r>
+          </a:p>
+          <a:p>
+            <a:pPr marL="285750" indent="-285750">
+              <a:buFont typeface="Arial" panose="020B0604020202020204" pitchFamily="34" charset="0"/>
+              <a:buChar char="•"/>
+            </a:pPr>
+            <a:r>
+              <a:rPr lang="en-US" dirty="0"/>
+              <a:t>TMWS is currently a single point of failure, which needs to be addressed</a:t>
+            </a:r>
+          </a:p>
+          <a:p>
+            <a:pPr marL="285750" indent="-285750">
+              <a:buFont typeface="Arial" panose="020B0604020202020204" pitchFamily="34" charset="0"/>
+              <a:buChar char="•"/>
+            </a:pPr>
+            <a:r>
+              <a:rPr lang="en-US" dirty="0"/>
+              <a:t>Services requiring an IP address (vs. a DNS name) will add risk, complexity and cost</a:t>
+            </a:r>
+          </a:p>
+          <a:p>
+            <a:pPr algn="ctr"/>
+            <a:endParaRPr lang="en-US" sz="1600" b="1" u="sng" dirty="0">
+              <a:solidFill>
+                <a:schemeClr val="accent3"/>
+              </a:solidFill>
+            </a:endParaRPr>
+          </a:p>
+        </p:txBody>
+      </p:sp>
+      <p:cxnSp>
+        <p:nvCxnSpPr>
+          <p:cNvPr id="9" name="Straight Connector 8"/>
+          <p:cNvCxnSpPr/>
+          <p:nvPr/>
+        </p:nvCxnSpPr>
+        <p:spPr>
+          <a:xfrm>
+            <a:off x="4562669" y="1131957"/>
+            <a:ext cx="18662" cy="3673308"/>
+          </a:xfrm>
+          <a:prstGeom prst="line">
+            <a:avLst/>
+          </a:prstGeom>
+        </p:spPr>
+        <p:style>
+          <a:lnRef idx="2">
+            <a:schemeClr val="accent1"/>
+          </a:lnRef>
+          <a:fillRef idx="0">
+            <a:schemeClr val="accent1"/>
+          </a:fillRef>
+          <a:effectRef idx="1">
+            <a:schemeClr val="accent1"/>
+          </a:effectRef>
+          <a:fontRef idx="minor">
+            <a:schemeClr val="tx1"/>
+          </a:fontRef>
+        </p:style>
+      </p:cxnSp>
+    </p:spTree>
+    <p:extLst>
+      <p:ext uri="{BB962C8B-B14F-4D97-AF65-F5344CB8AC3E}">
+        <p14:creationId xmlns:p14="http://schemas.microsoft.com/office/powerpoint/2010/main" val="973501123"/>
+      </p:ext>
+    </p:extLst>
+  </p:cSld>
+  <p:clrMapOvr>
+    <a:masterClrMapping/>
+  </p:clrMapOvr>
+</p:sld>
+</file>
+
+<file path=ppt/slides/slide12.xml><?xml version="1.0" encoding="utf-8"?>
+<p:sld xmlns:a="http://schemas.openxmlformats.org/drawingml/2006/main" xmlns:r="http://schemas.openxmlformats.org/officeDocument/2006/relationships" xmlns:p="http://schemas.openxmlformats.org/presentationml/2006/main">
+  <p:cSld>
+    <p:spTree>
+      <p:nvGrpSpPr>
+        <p:cNvPr id="1" name=""/>
+        <p:cNvGrpSpPr/>
+        <p:nvPr/>
+      </p:nvGrpSpPr>
+      <p:grpSpPr>
+        <a:xfrm>
+          <a:off x="0" y="0"/>
+          <a:ext cx="0" cy="0"/>
+          <a:chOff x="0" y="0"/>
+          <a:chExt cx="0" cy="0"/>
+        </a:xfrm>
+      </p:grpSpPr>
+      <p:sp>
+        <p:nvSpPr>
+          <p:cNvPr id="3" name="Text Placeholder 2"/>
+          <p:cNvSpPr>
+            <a:spLocks noGrp="1"/>
+          </p:cNvSpPr>
+          <p:nvPr>
+            <p:ph type="body" sz="quarter" idx="15"/>
+          </p:nvPr>
+        </p:nvSpPr>
+        <p:spPr>
+          <a:effectLst>
+            <a:outerShdw blurRad="40005" dist="20320" dir="5400000" algn="ctr" rotWithShape="0">
+              <a:schemeClr val="bg2">
+                <a:alpha val="38000"/>
+              </a:schemeClr>
+            </a:outerShdw>
+          </a:effectLst>
+        </p:spPr>
+        <p:txBody>
+          <a:bodyPr/>
+          <a:lstStyle/>
+          <a:p>
+            <a:r>
+              <a:rPr lang="en-US" dirty="0">
+                <a:latin typeface="Interstate-Black"/>
+                <a:cs typeface="Interstate-Black"/>
+              </a:rPr>
               <a:t>Databases</a:t>
             </a:r>
           </a:p>
@@ -10190,7 +11070,7 @@
 </p:sld>
 </file>
 
-<file path=ppt/slides/slide11.xml><?xml version="1.0" encoding="utf-8"?>
+<file path=ppt/slides/slide13.xml><?xml version="1.0" encoding="utf-8"?>
 <p:sld xmlns:a="http://schemas.openxmlformats.org/drawingml/2006/main" xmlns:r="http://schemas.openxmlformats.org/officeDocument/2006/relationships" xmlns:p="http://schemas.openxmlformats.org/presentationml/2006/main">
   <p:cSld>
     <p:spTree>
@@ -10491,7 +11371,7 @@
 </p:sld>
 </file>
 
-<file path=ppt/slides/slide12.xml><?xml version="1.0" encoding="utf-8"?>
+<file path=ppt/slides/slide14.xml><?xml version="1.0" encoding="utf-8"?>
 <p:sld xmlns:a="http://schemas.openxmlformats.org/drawingml/2006/main" xmlns:r="http://schemas.openxmlformats.org/officeDocument/2006/relationships" xmlns:p="http://schemas.openxmlformats.org/presentationml/2006/main">
   <p:cSld>
     <p:spTree>
@@ -10838,7 +11718,7 @@
 </p:sld>
 </file>
 
-<file path=ppt/slides/slide13.xml><?xml version="1.0" encoding="utf-8"?>
+<file path=ppt/slides/slide15.xml><?xml version="1.0" encoding="utf-8"?>
 <p:sld xmlns:a="http://schemas.openxmlformats.org/drawingml/2006/main" xmlns:r="http://schemas.openxmlformats.org/officeDocument/2006/relationships" xmlns:p="http://schemas.openxmlformats.org/presentationml/2006/main">
   <p:cSld>
     <p:spTree>
@@ -11107,7 +11987,7 @@
 </p:sld>
 </file>
 
-<file path=ppt/slides/slide14.xml><?xml version="1.0" encoding="utf-8"?>
+<file path=ppt/slides/slide16.xml><?xml version="1.0" encoding="utf-8"?>
 <p:sld xmlns:a="http://schemas.openxmlformats.org/drawingml/2006/main" xmlns:r="http://schemas.openxmlformats.org/officeDocument/2006/relationships" xmlns:p="http://schemas.openxmlformats.org/presentationml/2006/main">
   <p:cSld>
     <p:spTree>
@@ -11274,7 +12154,7 @@
 </p:sld>
 </file>
 
-<file path=ppt/slides/slide15.xml><?xml version="1.0" encoding="utf-8"?>
+<file path=ppt/slides/slide17.xml><?xml version="1.0" encoding="utf-8"?>
 <p:sld xmlns:a="http://schemas.openxmlformats.org/drawingml/2006/main" xmlns:r="http://schemas.openxmlformats.org/officeDocument/2006/relationships" xmlns:p="http://schemas.openxmlformats.org/presentationml/2006/main">
   <p:cSld>
     <p:spTree>
@@ -12017,7 +12897,7 @@
                 <a:latin typeface="Interstate-Black"/>
                 <a:cs typeface="Interstate-Black"/>
               </a:rPr>
-              <a:t>1965</a:t>
+              <a:t>1964</a:t>
             </a:r>
           </a:p>
           <a:p>
@@ -12057,25 +12937,8 @@
                   <a:schemeClr val="tx1"/>
                 </a:solidFill>
               </a:rPr>
-              <a:t>Ford built a dynamometer laboratory to </a:t>
-            </a:r>
-            <a:r>
-              <a:rPr lang="en-US" sz="1800" dirty="0">
-                <a:solidFill>
-                  <a:schemeClr val="tx1"/>
-                </a:solidFill>
-              </a:rPr>
-              <a:t>automate</a:t>
-            </a:r>
-            <a:r>
-              <a:rPr lang="en-US" sz="1800" dirty="0">
-                <a:solidFill>
-                  <a:schemeClr val="tx1"/>
-                </a:solidFill>
-              </a:rPr>
-              <a:t> engine testing</a:t>
-            </a:r>
-            <a:endParaRPr lang="en-US" sz="1800" dirty="0"/>
+              <a:t>Despite setting a lap, record all three GT40s failed to finish and Ferrari won</a:t>
+            </a:r>
           </a:p>
         </p:txBody>
       </p:sp>
@@ -12312,9 +13175,45 @@
           </a:p>
         </p:txBody>
       </p:sp>
+      <p:sp>
+        <p:nvSpPr>
+          <p:cNvPr id="9" name="TextBox 8"/>
+          <p:cNvSpPr txBox="1"/>
+          <p:nvPr/>
+        </p:nvSpPr>
+        <p:spPr>
+          <a:xfrm>
+            <a:off x="5934467" y="4926963"/>
+            <a:ext cx="3209533" cy="246221"/>
+          </a:xfrm>
+          <a:prstGeom prst="rect">
+            <a:avLst/>
+          </a:prstGeom>
+          <a:noFill/>
+        </p:spPr>
+        <p:txBody>
+          <a:bodyPr wrap="none" rtlCol="0">
+            <a:spAutoFit/>
+          </a:bodyPr>
+          <a:lstStyle/>
+          <a:p>
+            <a:r>
+              <a:rPr lang="en-US" sz="1000" dirty="0">
+                <a:latin typeface="TM Sans"/>
+                <a:cs typeface="TM Sans"/>
+              </a:rPr>
+              <a:t>http://www.autosport.com/news/report.php/id/122477</a:t>
+            </a:r>
+            <a:endParaRPr lang="en-US" sz="1000" dirty="0">
+              <a:latin typeface="TM Sans"/>
+              <a:cs typeface="TM Sans"/>
+            </a:endParaRPr>
+          </a:p>
+        </p:txBody>
+      </p:sp>
       <p:pic>
         <p:nvPicPr>
-          <p:cNvPr id="5" name="Picture 4"/>
+          <p:cNvPr id="8" name="Picture 7"/>
           <p:cNvPicPr>
             <a:picLocks noChangeAspect="1"/>
           </p:cNvPicPr>
@@ -12328,50 +13227,14 @@
         </p:blipFill>
         <p:spPr>
           <a:xfrm>
-            <a:off x="2045835" y="1374250"/>
-            <a:ext cx="5004703" cy="3449081"/>
+            <a:off x="1811749" y="1282151"/>
+            <a:ext cx="5490080" cy="3660053"/>
           </a:xfrm>
           <a:prstGeom prst="rect">
             <a:avLst/>
           </a:prstGeom>
         </p:spPr>
       </p:pic>
-      <p:sp>
-        <p:nvSpPr>
-          <p:cNvPr id="9" name="TextBox 8"/>
-          <p:cNvSpPr txBox="1"/>
-          <p:nvPr/>
-        </p:nvSpPr>
-        <p:spPr>
-          <a:xfrm>
-            <a:off x="7301829" y="4942203"/>
-            <a:ext cx="1842171" cy="246221"/>
-          </a:xfrm>
-          <a:prstGeom prst="rect">
-            <a:avLst/>
-          </a:prstGeom>
-          <a:noFill/>
-        </p:spPr>
-        <p:txBody>
-          <a:bodyPr wrap="none" rtlCol="0">
-            <a:spAutoFit/>
-          </a:bodyPr>
-          <a:lstStyle/>
-          <a:p>
-            <a:r>
-              <a:rPr lang="en-US" sz="1000" dirty="0">
-                <a:latin typeface="TM Sans"/>
-                <a:cs typeface="TM Sans"/>
-              </a:rPr>
-              <a:t>https://youtu.be/NxP__UPj7L8</a:t>
-            </a:r>
-            <a:endParaRPr lang="en-US" sz="1000" dirty="0">
-              <a:latin typeface="TM Sans"/>
-              <a:cs typeface="TM Sans"/>
-            </a:endParaRPr>
-          </a:p>
-        </p:txBody>
-      </p:sp>
     </p:spTree>
     <p:extLst>
       <p:ext uri="{BB962C8B-B14F-4D97-AF65-F5344CB8AC3E}">
@@ -12464,7 +13327,7 @@
                   <a:schemeClr val="tx1"/>
                 </a:solidFill>
               </a:rPr>
-              <a:t>1965: Ford built a dynamometer laboratory to </a:t>
+              <a:t>Ford built a dynamometer laboratory to </a:t>
             </a:r>
             <a:r>
               <a:rPr lang="en-US" sz="1800" b="1" i="1" u="sng" dirty="0">
@@ -12730,7 +13593,7 @@
         </p:nvSpPr>
         <p:spPr>
           <a:xfrm>
-            <a:off x="5720317" y="561242"/>
+            <a:off x="5445997" y="528495"/>
             <a:ext cx="730102" cy="354419"/>
           </a:xfrm>
           <a:prstGeom prst="downArrow">
@@ -12767,67 +13630,63 @@
           </a:p>
         </p:txBody>
       </p:sp>
+      <p:sp>
+        <p:nvSpPr>
+          <p:cNvPr id="8" name="Rectangle 7"/>
+          <p:cNvSpPr/>
+          <p:nvPr/>
+        </p:nvSpPr>
+        <p:spPr>
+          <a:xfrm>
+            <a:off x="7574340" y="4928056"/>
+            <a:ext cx="1569660" cy="215444"/>
+          </a:xfrm>
+          <a:prstGeom prst="rect">
+            <a:avLst/>
+          </a:prstGeom>
+        </p:spPr>
+        <p:txBody>
+          <a:bodyPr wrap="none">
+            <a:spAutoFit/>
+          </a:bodyPr>
+          <a:lstStyle/>
+          <a:p>
+            <a:r>
+              <a:rPr lang="en-US" sz="800" dirty="0">
+                <a:latin typeface="TM Sans" panose="020B0502030402020204" pitchFamily="34" charset="0"/>
+              </a:rPr>
+              <a:t>https://youtu.be/NxP__UPj7L8</a:t>
+            </a:r>
+            <a:endParaRPr lang="en-US" sz="800" dirty="0">
+              <a:latin typeface="TM Sans" panose="020B0502030402020204" pitchFamily="34" charset="0"/>
+            </a:endParaRPr>
+          </a:p>
+        </p:txBody>
+      </p:sp>
       <p:pic>
         <p:nvPicPr>
-          <p:cNvPr id="7" name="NxP__UPj7L8">
-            <a:hlinkClick r:id="" action="ppaction://media"/>
-          </p:cNvPr>
+          <p:cNvPr id="11" name="Picture 10"/>
           <p:cNvPicPr>
-            <a:picLocks noRot="1" noChangeAspect="1"/>
+            <a:picLocks noChangeAspect="1"/>
           </p:cNvPicPr>
-          <p:nvPr>
-            <a:videoFile r:link="rId1"/>
-          </p:nvPr>
+          <p:nvPr/>
         </p:nvPicPr>
         <p:blipFill>
-          <a:blip r:embed="rId4"/>
+          <a:blip r:embed="rId3"/>
           <a:stretch>
             <a:fillRect/>
           </a:stretch>
         </p:blipFill>
         <p:spPr>
           <a:xfrm>
-            <a:off x="2436466" y="1556539"/>
-            <a:ext cx="4297487" cy="3223116"/>
+            <a:off x="2045835" y="1478975"/>
+            <a:ext cx="5004703" cy="3449081"/>
           </a:xfrm>
           <a:prstGeom prst="rect">
             <a:avLst/>
           </a:prstGeom>
         </p:spPr>
       </p:pic>
-      <p:sp>
-        <p:nvSpPr>
-          <p:cNvPr id="8" name="Rectangle 7"/>
-          <p:cNvSpPr/>
-          <p:nvPr/>
-        </p:nvSpPr>
-        <p:spPr>
-          <a:xfrm>
-            <a:off x="7574340" y="4928056"/>
-            <a:ext cx="1569660" cy="215444"/>
-          </a:xfrm>
-          <a:prstGeom prst="rect">
-            <a:avLst/>
-          </a:prstGeom>
-        </p:spPr>
-        <p:txBody>
-          <a:bodyPr wrap="none">
-            <a:spAutoFit/>
-          </a:bodyPr>
-          <a:lstStyle/>
-          <a:p>
-            <a:r>
-              <a:rPr lang="en-US" sz="800" dirty="0">
-                <a:latin typeface="TM Sans" panose="020B0502030402020204" pitchFamily="34" charset="0"/>
-              </a:rPr>
-              <a:t>https://youtu.be/NxP__UPj7L8</a:t>
-            </a:r>
-            <a:endParaRPr lang="en-US" sz="800" dirty="0">
-              <a:latin typeface="TM Sans" panose="020B0502030402020204" pitchFamily="34" charset="0"/>
-            </a:endParaRPr>
-          </a:p>
-        </p:txBody>
-      </p:sp>
     </p:spTree>
     <p:extLst>
       <p:ext uri="{BB962C8B-B14F-4D97-AF65-F5344CB8AC3E}">
@@ -12838,86 +13697,6 @@
   <p:clrMapOvr>
     <a:masterClrMapping/>
   </p:clrMapOvr>
-  <p:timing>
-    <p:tnLst>
-      <p:par>
-        <p:cTn id="1" dur="indefinite" restart="never" nodeType="tmRoot">
-          <p:childTnLst>
-            <p:seq concurrent="1" nextAc="seek">
-              <p:cTn id="2" restart="whenNotActive" fill="hold" evtFilter="cancelBubble" nodeType="interactiveSeq">
-                <p:stCondLst>
-                  <p:cond evt="onClick" delay="0">
-                    <p:tgtEl>
-                      <p:spTgt spid="7"/>
-                    </p:tgtEl>
-                  </p:cond>
-                </p:stCondLst>
-                <p:endSync evt="end" delay="0">
-                  <p:rtn val="all"/>
-                </p:endSync>
-                <p:childTnLst>
-                  <p:par>
-                    <p:cTn id="3" fill="hold">
-                      <p:stCondLst>
-                        <p:cond delay="0"/>
-                      </p:stCondLst>
-                      <p:childTnLst>
-                        <p:par>
-                          <p:cTn id="4" fill="hold">
-                            <p:stCondLst>
-                              <p:cond delay="0"/>
-                            </p:stCondLst>
-                            <p:childTnLst>
-                              <p:par>
-                                <p:cTn id="5" presetID="2" presetClass="mediacall" presetSubtype="0" fill="hold" nodeType="clickEffect">
-                                  <p:stCondLst>
-                                    <p:cond delay="0"/>
-                                  </p:stCondLst>
-                                  <p:childTnLst>
-                                    <p:cmd type="call" cmd="togglePause">
-                                      <p:cBhvr>
-                                        <p:cTn id="6" dur="1" fill="hold"/>
-                                        <p:tgtEl>
-                                          <p:spTgt spid="7"/>
-                                        </p:tgtEl>
-                                      </p:cBhvr>
-                                    </p:cmd>
-                                  </p:childTnLst>
-                                </p:cTn>
-                              </p:par>
-                            </p:childTnLst>
-                          </p:cTn>
-                        </p:par>
-                      </p:childTnLst>
-                    </p:cTn>
-                  </p:par>
-                </p:childTnLst>
-              </p:cTn>
-              <p:nextCondLst>
-                <p:cond evt="onClick" delay="0">
-                  <p:tgtEl>
-                    <p:spTgt spid="7"/>
-                  </p:tgtEl>
-                </p:cond>
-              </p:nextCondLst>
-            </p:seq>
-            <p:video>
-              <p:cMediaNode vol="80000">
-                <p:cTn id="7" fill="hold" display="0">
-                  <p:stCondLst>
-                    <p:cond delay="indefinite"/>
-                  </p:stCondLst>
-                </p:cTn>
-                <p:tgtEl>
-                  <p:spTgt spid="7"/>
-                </p:tgtEl>
-              </p:cMediaNode>
-            </p:video>
-          </p:childTnLst>
-        </p:cTn>
-      </p:par>
-    </p:tnLst>
-  </p:timing>
 </p:sld>
 </file>
 
@@ -13360,10 +14139,8 @@
                 <a:latin typeface="Interstate-Black"/>
                 <a:cs typeface="Interstate-Black"/>
               </a:rPr>
-              <a:t>Product vs. Platform Team Responsibilities</a:t>
-            </a:r>
-          </a:p>
-          <a:p>
+              <a:t>Let's start with the correct vocabulary</a:t>
+            </a:r>
             <a:endParaRPr lang="en-US" dirty="0">
               <a:latin typeface="Interstate-Black"/>
               <a:cs typeface="Interstate-Black"/>
@@ -13416,34 +14193,31 @@
         </p:nvSpPr>
         <p:spPr>
           <a:xfrm>
-            <a:off x="273051" y="1130561"/>
-            <a:ext cx="3886200" cy="3340292"/>
+            <a:off x="273050" y="1130561"/>
+            <a:ext cx="8474709" cy="3340292"/>
           </a:xfrm>
         </p:spPr>
         <p:txBody>
           <a:bodyPr>
-            <a:normAutofit/>
+            <a:normAutofit fontScale="92500"/>
           </a:bodyPr>
           <a:lstStyle/>
-          <a:p>
-            <a:pPr algn="ctr"/>
-            <a:r>
-              <a:rPr lang="en-US" sz="1600" b="1" u="sng" dirty="0">
-                <a:solidFill>
-                  <a:schemeClr val="accent3"/>
-                </a:solidFill>
-              </a:rPr>
-              <a:t>Product team responsibilities</a:t>
-            </a:r>
-          </a:p>
           <a:p>
             <a:pPr marL="285750" indent="-285750">
               <a:buFont typeface="Arial" panose="020B0604020202020204" pitchFamily="34" charset="0"/>
               <a:buChar char="•"/>
             </a:pPr>
             <a:r>
+              <a:rPr lang="en-US" b="1" dirty="0"/>
+              <a:t>M</a:t>
+            </a:r>
+            <a:r>
+              <a:rPr lang="en-US" b="1" dirty="0"/>
+              <a:t>ocks</a:t>
+            </a:r>
+            <a:r>
               <a:rPr lang="en-US" dirty="0"/>
-              <a:t>Determine AWS architecture and technologies</a:t>
+              <a:t> - Functions pre-programmed with expectations which form a specification of the calls they are expected to receive</a:t>
             </a:r>
           </a:p>
           <a:p>
@@ -13452,8 +14226,12 @@
               <a:buChar char="•"/>
             </a:pPr>
             <a:r>
+              <a:rPr lang="en-US" b="1" dirty="0"/>
+              <a:t>Stubs</a:t>
+            </a:r>
+            <a:r>
               <a:rPr lang="en-US" dirty="0"/>
-              <a:t>Modify application as needed to meet AWS requirements</a:t>
+              <a:t> - Provide static response to calls made during the test</a:t>
             </a:r>
           </a:p>
           <a:p>
@@ -13462,16 +14240,12 @@
               <a:buChar char="•"/>
             </a:pPr>
             <a:r>
+              <a:rPr lang="en-US" b="1" dirty="0"/>
+              <a:t>Fake Object - </a:t>
+            </a:r>
+            <a:r>
               <a:rPr lang="en-US" dirty="0"/>
-              <a:t>Create terraform(</a:t>
-            </a:r>
-            <a:r>
-              <a:rPr lang="en-US" dirty="0" err="1"/>
-              <a:t>er</a:t>
-            </a:r>
-            <a:r>
-              <a:rPr lang="en-US" dirty="0"/>
-              <a:t>) configurations to manage infrastructure assets</a:t>
+              <a:t>A working object, but takes some shortcuts. Example: Hard codes some properties instead of pulls them from an external source</a:t>
             </a:r>
           </a:p>
           <a:p>
@@ -13480,8 +14254,12 @@
               <a:buChar char="•"/>
             </a:pPr>
             <a:r>
+              <a:rPr lang="en-US" b="1" dirty="0"/>
+              <a:t>Dummy Object - </a:t>
+            </a:r>
+            <a:r>
               <a:rPr lang="en-US" dirty="0"/>
-              <a:t>Leverage build pipeline (or create one) to deploy infrastructure and application to AWS</a:t>
+              <a:t>An object that is passed around but never used</a:t>
             </a:r>
           </a:p>
           <a:p>
@@ -13490,8 +14268,12 @@
               <a:buChar char="•"/>
             </a:pPr>
             <a:r>
+              <a:rPr lang="en-US" b="1" dirty="0"/>
+              <a:t>Test Double -</a:t>
+            </a:r>
+            <a:r>
               <a:rPr lang="en-US" dirty="0"/>
-              <a:t>Manage monitoring and alerting</a:t>
+              <a:t> Any kind of pretend object used in place of a real object for testing purposes. All of the above</a:t>
             </a:r>
           </a:p>
           <a:p>
@@ -13500,8 +14282,63 @@
               <a:buChar char="•"/>
             </a:pPr>
             <a:r>
+              <a:rPr lang="en-US" b="1" dirty="0"/>
+              <a:t>System Under Test</a:t>
+            </a:r>
+            <a:r>
               <a:rPr lang="en-US" dirty="0"/>
-              <a:t>Manage the lifecycle of infrastructure assets and the application</a:t>
+              <a:t> or rather the abbreviation SUT</a:t>
+            </a:r>
+          </a:p>
+          <a:p>
+            <a:pPr marL="285750" indent="-285750">
+              <a:buFont typeface="Arial" panose="020B0604020202020204" pitchFamily="34" charset="0"/>
+              <a:buChar char="•"/>
+            </a:pPr>
+            <a:r>
+              <a:rPr lang="en-US" b="1" dirty="0"/>
+              <a:t>Behavior Verification</a:t>
+            </a:r>
+            <a:r>
+              <a:rPr lang="en-US" dirty="0"/>
+              <a:t> - Check to see if the system made the correct calls</a:t>
+            </a:r>
+          </a:p>
+          <a:p>
+            <a:pPr marL="285750" indent="-285750">
+              <a:buFont typeface="Arial" panose="020B0604020202020204" pitchFamily="34" charset="0"/>
+              <a:buChar char="•"/>
+            </a:pPr>
+            <a:r>
+              <a:rPr lang="en-US" b="1" dirty="0"/>
+              <a:t>State Verification</a:t>
+            </a:r>
+            <a:r>
+              <a:rPr lang="en-US" dirty="0"/>
+              <a:t> - Determine whether the exercised method worked correctly by examining the state of the SUT and its collaborators after the method was exercised</a:t>
+            </a:r>
+          </a:p>
+          <a:p>
+            <a:pPr algn="r"/>
+            <a:r>
+              <a:rPr lang="en-US" dirty="0"/>
+              <a:t>As defined by Gerard </a:t>
+            </a:r>
+            <a:r>
+              <a:rPr lang="en-US" dirty="0" err="1"/>
+              <a:t>Meszaros</a:t>
+            </a:r>
+            <a:r>
+              <a:rPr lang="en-US" dirty="0"/>
+              <a:t> in </a:t>
+            </a:r>
+            <a:r>
+              <a:rPr lang="en-US" i="1" dirty="0" err="1"/>
+              <a:t>xUnit</a:t>
+            </a:r>
+            <a:r>
+              <a:rPr lang="en-US" i="1" dirty="0"/>
+              <a:t>: Testing Patterns</a:t>
             </a:r>
           </a:p>
           <a:p>
@@ -13511,145 +14348,8 @@
             </a:pPr>
             <a:endParaRPr lang="en-US" dirty="0"/>
           </a:p>
-          <a:p>
-            <a:pPr marL="285750" indent="-285750">
-              <a:buFont typeface="Arial" panose="020B0604020202020204" pitchFamily="34" charset="0"/>
-              <a:buChar char="•"/>
-            </a:pPr>
-            <a:endParaRPr lang="en-US" dirty="0"/>
-          </a:p>
-        </p:txBody>
-      </p:sp>
-      <p:sp>
-        <p:nvSpPr>
-          <p:cNvPr id="7" name="Content Placeholder 6"/>
-          <p:cNvSpPr>
-            <a:spLocks noGrp="1"/>
-          </p:cNvSpPr>
-          <p:nvPr>
-            <p:ph sz="quarter" idx="17"/>
-          </p:nvPr>
-        </p:nvSpPr>
-        <p:spPr>
-          <a:xfrm>
-            <a:off x="4937125" y="1131957"/>
-            <a:ext cx="3886200" cy="3340292"/>
-          </a:xfrm>
-        </p:spPr>
-        <p:txBody>
-          <a:bodyPr>
-            <a:normAutofit/>
-          </a:bodyPr>
-          <a:lstStyle/>
-          <a:p>
-            <a:pPr algn="ctr"/>
-            <a:r>
-              <a:rPr lang="en-US" sz="1600" b="1" u="sng" dirty="0">
-                <a:solidFill>
-                  <a:schemeClr val="accent3"/>
-                </a:solidFill>
-              </a:rPr>
-              <a:t>Platform team responsibilities</a:t>
-            </a:r>
-          </a:p>
-          <a:p>
-            <a:pPr marL="285750" indent="-285750">
-              <a:buFont typeface="Arial" panose="020B0604020202020204" pitchFamily="34" charset="0"/>
-              <a:buChar char="•"/>
-            </a:pPr>
-            <a:r>
-              <a:rPr lang="en-US" dirty="0"/>
-              <a:t>Provide guidance and assistance in choosing AWS technologies</a:t>
-            </a:r>
-          </a:p>
-          <a:p>
-            <a:pPr marL="285750" indent="-285750">
-              <a:buFont typeface="Arial" panose="020B0604020202020204" pitchFamily="34" charset="0"/>
-              <a:buChar char="•"/>
-            </a:pPr>
-            <a:r>
-              <a:rPr lang="en-US" dirty="0"/>
-              <a:t>Provide recommendations for application best practices within AWS</a:t>
-            </a:r>
-          </a:p>
-          <a:p>
-            <a:pPr marL="285750" indent="-285750">
-              <a:buFont typeface="Arial" panose="020B0604020202020204" pitchFamily="34" charset="0"/>
-              <a:buChar char="•"/>
-            </a:pPr>
-            <a:r>
-              <a:rPr lang="en-US" dirty="0"/>
-              <a:t>Provide beginner resources for terraform(</a:t>
-            </a:r>
-            <a:r>
-              <a:rPr lang="en-US" dirty="0" err="1"/>
-              <a:t>er</a:t>
-            </a:r>
-            <a:r>
-              <a:rPr lang="en-US" dirty="0"/>
-              <a:t>) and consult as needed</a:t>
-            </a:r>
-          </a:p>
-          <a:p>
-            <a:pPr marL="285750" indent="-285750">
-              <a:buFont typeface="Arial" panose="020B0604020202020204" pitchFamily="34" charset="0"/>
-              <a:buChar char="•"/>
-            </a:pPr>
-            <a:r>
-              <a:rPr lang="en-US" dirty="0"/>
-              <a:t>Create a build pipeline to manage AWS AMI and Docker image assets</a:t>
-            </a:r>
-          </a:p>
-          <a:p>
-            <a:pPr marL="285750" indent="-285750">
-              <a:buFont typeface="Arial" panose="020B0604020202020204" pitchFamily="34" charset="0"/>
-              <a:buChar char="•"/>
-            </a:pPr>
-            <a:r>
-              <a:rPr lang="en-US" dirty="0"/>
-              <a:t>Provide ‘base images’ for Windows Server AMI and Windows Docker images (continuously updated)</a:t>
-            </a:r>
-          </a:p>
-          <a:p>
-            <a:pPr algn="ctr"/>
-            <a:endParaRPr lang="en-US" sz="1600" b="1" u="sng" dirty="0">
-              <a:solidFill>
-                <a:schemeClr val="accent3"/>
-              </a:solidFill>
-            </a:endParaRPr>
-          </a:p>
-        </p:txBody>
-      </p:sp>
-      <p:cxnSp>
-        <p:nvCxnSpPr>
-          <p:cNvPr id="9" name="Straight Connector 8"/>
-          <p:cNvCxnSpPr/>
-          <p:nvPr/>
-        </p:nvCxnSpPr>
-        <p:spPr>
-          <a:xfrm>
-            <a:off x="4562669" y="1131957"/>
-            <a:ext cx="18662" cy="3673308"/>
-          </a:xfrm>
-          <a:prstGeom prst="line">
-            <a:avLst/>
-          </a:prstGeom>
-        </p:spPr>
-        <p:style>
-          <a:lnRef idx="2">
-            <a:schemeClr val="accent1"/>
-          </a:lnRef>
-          <a:fillRef idx="0">
-            <a:schemeClr val="accent1"/>
-          </a:fillRef>
-          <a:effectRef idx="1">
-            <a:schemeClr val="accent1"/>
-          </a:effectRef>
-          <a:fontRef idx="minor">
-            <a:schemeClr val="tx1"/>
-          </a:fontRef>
-        </p:style>
-      </p:cxnSp>
+        </p:txBody>
+      </p:sp>
     </p:spTree>
     <p:extLst>
       <p:ext uri="{BB962C8B-B14F-4D97-AF65-F5344CB8AC3E}">
@@ -13708,54 +14408,26 @@
                 <a:latin typeface="Interstate-Black"/>
                 <a:cs typeface="Interstate-Black"/>
               </a:rPr>
-              <a:t>Compute Provisioning</a:t>
-            </a:r>
-          </a:p>
-          <a:p>
+              <a:t>[Mock] </a:t>
+            </a:r>
+            <a:r>
+              <a:rPr lang="en-US" sz="1600" dirty="0">
+                <a:latin typeface="Interstate-Black"/>
+                <a:cs typeface="Interstate-Black"/>
+              </a:rPr>
+              <a:t>vs. </a:t>
+            </a:r>
+            <a:r>
+              <a:rPr lang="en-US" dirty="0">
+                <a:latin typeface="Interstate-Black"/>
+                <a:cs typeface="Interstate-Black"/>
+              </a:rPr>
+              <a:t>Stub</a:t>
+            </a:r>
             <a:endParaRPr lang="en-US" dirty="0">
               <a:latin typeface="Interstate-Black"/>
               <a:cs typeface="Interstate-Black"/>
             </a:endParaRPr>
-          </a:p>
-        </p:txBody>
-      </p:sp>
-      <p:sp>
-        <p:nvSpPr>
-          <p:cNvPr id="4" name="Content Placeholder 3"/>
-          <p:cNvSpPr>
-            <a:spLocks noGrp="1"/>
-          </p:cNvSpPr>
-          <p:nvPr>
-            <p:ph sz="quarter" idx="17"/>
-          </p:nvPr>
-        </p:nvSpPr>
-        <p:spPr>
-          <a:xfrm>
-            <a:off x="273051" y="4011513"/>
-            <a:ext cx="8550274" cy="770366"/>
-          </a:xfrm>
-        </p:spPr>
-        <p:txBody>
-          <a:bodyPr>
-            <a:noAutofit/>
-          </a:bodyPr>
-          <a:lstStyle/>
-          <a:p>
-            <a:r>
-              <a:rPr lang="en-US" sz="1200" dirty="0"/>
-              <a:t>One of the biggest decisions is determining how the compute for your application will be provisioned. Docker or server-less technologies are strongly preferred, and will work for most Windows applications, but not all. In cases where Docker containers are not suitable, it is recommended to use immutable EC2 instances, as this will provide a similar management experience as containers. Terraform(</a:t>
-            </a:r>
-            <a:r>
-              <a:rPr lang="en-US" sz="1200" dirty="0" err="1"/>
-              <a:t>er</a:t>
-            </a:r>
-            <a:r>
-              <a:rPr lang="en-US" sz="1200" dirty="0"/>
-              <a:t>) must be used for all options.</a:t>
-            </a:r>
-          </a:p>
-          <a:p>
-            <a:endParaRPr lang="en-US" sz="1200" dirty="0"/>
           </a:p>
         </p:txBody>
       </p:sp>
@@ -13794,32 +14466,31 @@
       </p:cxnSp>
       <p:pic>
         <p:nvPicPr>
-          <p:cNvPr id="2" name="Picture 1"/>
+          <p:cNvPr id="16" name="Content Placeholder 15"/>
           <p:cNvPicPr>
-            <a:picLocks noChangeAspect="1"/>
+            <a:picLocks noGrp="1" noChangeAspect="1"/>
           </p:cNvPicPr>
-          <p:nvPr/>
+          <p:nvPr>
+            <p:ph sz="quarter" idx="18"/>
+          </p:nvPr>
         </p:nvPicPr>
         <p:blipFill>
-          <a:blip r:embed="rId2"/>
+          <a:blip r:embed="rId3"/>
           <a:stretch>
             <a:fillRect/>
           </a:stretch>
         </p:blipFill>
         <p:spPr>
           <a:xfrm>
-            <a:off x="273051" y="793760"/>
-            <a:ext cx="8573478" cy="3049801"/>
-          </a:xfrm>
-          <a:prstGeom prst="rect">
-            <a:avLst/>
-          </a:prstGeom>
+            <a:off x="657543" y="805289"/>
+            <a:ext cx="7781290" cy="3928701"/>
+          </a:xfrm>
         </p:spPr>
       </p:pic>
     </p:spTree>
     <p:extLst>
       <p:ext uri="{BB962C8B-B14F-4D97-AF65-F5344CB8AC3E}">
-        <p14:creationId xmlns:p14="http://schemas.microsoft.com/office/powerpoint/2010/main" val="2378701437"/>
+        <p14:creationId xmlns:p14="http://schemas.microsoft.com/office/powerpoint/2010/main" val="912458881"/>
       </p:ext>
     </p:extLst>
   </p:cSld>
@@ -13874,10 +14545,22 @@
                 <a:latin typeface="Interstate-Black"/>
                 <a:cs typeface="Interstate-Black"/>
               </a:rPr>
-              <a:t>Web Gateways</a:t>
-            </a:r>
-          </a:p>
-          <a:p>
+              <a:t>Mock </a:t>
+            </a:r>
+            <a:r>
+              <a:rPr lang="en-US" sz="1600" dirty="0">
+                <a:latin typeface="Interstate-Black"/>
+                <a:cs typeface="Interstate-Black"/>
+              </a:rPr>
+              <a:t>vs. </a:t>
+            </a:r>
+            <a:r>
+              <a:rPr lang="en-US" dirty="0">
+                <a:latin typeface="Interstate-Black"/>
+                <a:cs typeface="Interstate-Black"/>
+              </a:rPr>
+              <a:t>[Stub]</a:t>
+            </a:r>
             <a:endParaRPr lang="en-US" dirty="0">
               <a:latin typeface="Interstate-Black"/>
               <a:cs typeface="Interstate-Black"/>
@@ -13918,197 +14601,33 @@
           </a:fontRef>
         </p:style>
       </p:cxnSp>
-      <p:sp>
-        <p:nvSpPr>
-          <p:cNvPr id="5" name="Content Placeholder 4"/>
-          <p:cNvSpPr>
-            <a:spLocks noGrp="1"/>
-          </p:cNvSpPr>
+      <p:pic>
+        <p:nvPicPr>
+          <p:cNvPr id="16" name="Content Placeholder 15"/>
+          <p:cNvPicPr>
+            <a:picLocks noGrp="1" noChangeAspect="1"/>
+          </p:cNvPicPr>
           <p:nvPr>
             <p:ph sz="quarter" idx="18"/>
           </p:nvPr>
-        </p:nvSpPr>
-        <p:spPr>
-          <a:xfrm>
-            <a:off x="273051" y="1130561"/>
-            <a:ext cx="3886200" cy="3340292"/>
-          </a:xfrm>
-        </p:spPr>
-        <p:txBody>
-          <a:bodyPr>
-            <a:normAutofit/>
-          </a:bodyPr>
-          <a:lstStyle/>
-          <a:p>
-            <a:pPr algn="ctr"/>
-            <a:r>
-              <a:rPr lang="en-US" sz="1600" b="1" u="sng" dirty="0">
-                <a:solidFill>
-                  <a:schemeClr val="accent3"/>
-                </a:solidFill>
-              </a:rPr>
-              <a:t>Recommendations</a:t>
-            </a:r>
-          </a:p>
-          <a:p>
-            <a:pPr marL="285750" indent="-285750">
-              <a:buFont typeface="Arial" panose="020B0604020202020204" pitchFamily="34" charset="0"/>
-              <a:buChar char="•"/>
-            </a:pPr>
-            <a:r>
-              <a:rPr lang="en-US" dirty="0"/>
-              <a:t>Leverage Docker containers based on Windows Server 2016</a:t>
-            </a:r>
-          </a:p>
-          <a:p>
-            <a:pPr marL="285750" indent="-285750">
-              <a:buFont typeface="Arial" panose="020B0604020202020204" pitchFamily="34" charset="0"/>
-              <a:buChar char="•"/>
-            </a:pPr>
-            <a:r>
-              <a:rPr lang="en-US" dirty="0"/>
-              <a:t>Long term: consider migrating to .NET Core for ease of deployment, maturity and the ability to run cross-platform / use Nano Server</a:t>
-            </a:r>
-          </a:p>
-          <a:p>
-            <a:pPr marL="285750" indent="-285750">
-              <a:buFont typeface="Arial" panose="020B0604020202020204" pitchFamily="34" charset="0"/>
-              <a:buChar char="•"/>
-            </a:pPr>
-            <a:r>
-              <a:rPr lang="en-US" dirty="0"/>
-              <a:t>Use ELB (Elastic Load Balancer) for load balancing</a:t>
-            </a:r>
-          </a:p>
-          <a:p>
-            <a:pPr marL="285750" indent="-285750">
-              <a:buFont typeface="Arial" panose="020B0604020202020204" pitchFamily="34" charset="0"/>
-              <a:buChar char="•"/>
-            </a:pPr>
-            <a:r>
-              <a:rPr lang="en-US" dirty="0"/>
-              <a:t>Should be implemented as one or more auto-scaling group(s)</a:t>
-            </a:r>
-          </a:p>
-          <a:p>
-            <a:pPr marL="285750" indent="-285750">
-              <a:buFont typeface="Arial" panose="020B0604020202020204" pitchFamily="34" charset="0"/>
-              <a:buChar char="•"/>
-            </a:pPr>
-            <a:endParaRPr lang="en-US" dirty="0"/>
-          </a:p>
-          <a:p>
-            <a:pPr marL="285750" indent="-285750">
-              <a:buFont typeface="Arial" panose="020B0604020202020204" pitchFamily="34" charset="0"/>
-              <a:buChar char="•"/>
-            </a:pPr>
-            <a:endParaRPr lang="en-US" dirty="0"/>
-          </a:p>
-          <a:p>
-            <a:pPr marL="285750" indent="-285750">
-              <a:buFont typeface="Arial" panose="020B0604020202020204" pitchFamily="34" charset="0"/>
-              <a:buChar char="•"/>
-            </a:pPr>
-            <a:endParaRPr lang="en-US" dirty="0"/>
-          </a:p>
-        </p:txBody>
-      </p:sp>
-      <p:sp>
-        <p:nvSpPr>
-          <p:cNvPr id="7" name="Content Placeholder 6"/>
-          <p:cNvSpPr>
-            <a:spLocks noGrp="1"/>
-          </p:cNvSpPr>
-          <p:nvPr>
-            <p:ph sz="quarter" idx="17"/>
-          </p:nvPr>
-        </p:nvSpPr>
-        <p:spPr>
-          <a:xfrm>
-            <a:off x="4937125" y="1131957"/>
-            <a:ext cx="3886200" cy="3340292"/>
-          </a:xfrm>
-        </p:spPr>
-        <p:txBody>
-          <a:bodyPr>
-            <a:normAutofit/>
-          </a:bodyPr>
-          <a:lstStyle/>
-          <a:p>
-            <a:pPr algn="ctr"/>
-            <a:r>
-              <a:rPr lang="en-US" sz="1600" b="1" u="sng" dirty="0">
-                <a:solidFill>
-                  <a:schemeClr val="accent3"/>
-                </a:solidFill>
-              </a:rPr>
-              <a:t>Concerns</a:t>
-            </a:r>
-          </a:p>
-          <a:p>
-            <a:pPr marL="285750" indent="-285750">
-              <a:buFont typeface="Arial" panose="020B0604020202020204" pitchFamily="34" charset="0"/>
-              <a:buChar char="•"/>
-            </a:pPr>
-            <a:r>
-              <a:rPr lang="en-US" dirty="0"/>
-              <a:t>TMWS is currently a single point of failure, which needs to be addressed</a:t>
-            </a:r>
-          </a:p>
-          <a:p>
-            <a:pPr marL="285750" indent="-285750">
-              <a:buFont typeface="Arial" panose="020B0604020202020204" pitchFamily="34" charset="0"/>
-              <a:buChar char="•"/>
-            </a:pPr>
-            <a:r>
-              <a:rPr lang="en-US" dirty="0"/>
-              <a:t>Services requiring an IP address (vs. a DNS name) will add risk, complexity and cost</a:t>
-            </a:r>
-          </a:p>
-          <a:p>
-            <a:pPr algn="ctr"/>
-            <a:endParaRPr lang="en-US" sz="1600" b="1" u="sng" dirty="0">
-              <a:solidFill>
-                <a:schemeClr val="accent3"/>
-              </a:solidFill>
-            </a:endParaRPr>
-          </a:p>
-        </p:txBody>
-      </p:sp>
-      <p:cxnSp>
-        <p:nvCxnSpPr>
-          <p:cNvPr id="9" name="Straight Connector 8"/>
-          <p:cNvCxnSpPr/>
-          <p:nvPr/>
-        </p:nvCxnSpPr>
-        <p:spPr>
-          <a:xfrm>
-            <a:off x="4562669" y="1131957"/>
-            <a:ext cx="18662" cy="3673308"/>
-          </a:xfrm>
-          <a:prstGeom prst="line">
-            <a:avLst/>
-          </a:prstGeom>
-        </p:spPr>
-        <p:style>
-          <a:lnRef idx="2">
-            <a:schemeClr val="accent1"/>
-          </a:lnRef>
-          <a:fillRef idx="0">
-            <a:schemeClr val="accent1"/>
-          </a:fillRef>
-          <a:effectRef idx="1">
-            <a:schemeClr val="accent1"/>
-          </a:effectRef>
-          <a:fontRef idx="minor">
-            <a:schemeClr val="tx1"/>
-          </a:fontRef>
-        </p:style>
-      </p:cxnSp>
+        </p:nvPicPr>
+        <p:blipFill>
+          <a:blip r:embed="rId3"/>
+          <a:stretch>
+            <a:fillRect/>
+          </a:stretch>
+        </p:blipFill>
+        <p:spPr>
+          <a:xfrm>
+            <a:off x="657543" y="961711"/>
+            <a:ext cx="7781290" cy="2770093"/>
+          </a:xfrm>
+        </p:spPr>
+      </p:pic>
     </p:spTree>
     <p:extLst>
       <p:ext uri="{BB962C8B-B14F-4D97-AF65-F5344CB8AC3E}">
-        <p14:creationId xmlns:p14="http://schemas.microsoft.com/office/powerpoint/2010/main" val="973501123"/>
+        <p14:creationId xmlns:p14="http://schemas.microsoft.com/office/powerpoint/2010/main" val="2955137991"/>
       </p:ext>
     </p:extLst>
   </p:cSld>
@@ -15308,13 +15827,13 @@
 <ds:datastoreItem xmlns:ds="http://schemas.openxmlformats.org/officeDocument/2006/customXml" ds:itemID="{85D5E7DC-E869-4789-9860-B4A138DCBC9C}">
   <ds:schemaRefs>
     <ds:schemaRef ds:uri="6eed6d30-21cb-4d2a-afd5-64247d3e7b92"/>
-    <ds:schemaRef ds:uri="http://schemas.openxmlformats.org/package/2006/metadata/core-properties"/>
     <ds:schemaRef ds:uri="http://purl.org/dc/terms/"/>
-    <ds:schemaRef ds:uri="3608d996-f921-4209-962b-af552f1375e0"/>
     <ds:schemaRef ds:uri="http://schemas.microsoft.com/office/2006/documentManagement/types"/>
-    <ds:schemaRef ds:uri="http://schemas.microsoft.com/office/2006/metadata/properties"/>
     <ds:schemaRef ds:uri="http://purl.org/dc/elements/1.1/"/>
     <ds:schemaRef ds:uri="http://schemas.microsoft.com/office/infopath/2007/PartnerControls"/>
+    <ds:schemaRef ds:uri="http://schemas.openxmlformats.org/package/2006/metadata/core-properties"/>
+    <ds:schemaRef ds:uri="3608d996-f921-4209-962b-af552f1375e0"/>
+    <ds:schemaRef ds:uri="http://schemas.microsoft.com/office/2006/metadata/properties"/>
     <ds:schemaRef ds:uri="http://www.w3.org/XML/1998/namespace"/>
     <ds:schemaRef ds:uri="http://purl.org/dc/dcmitype/"/>
   </ds:schemaRefs>

</xml_diff>

<commit_message>
Add Windows @ Ticketmaster slide
</commit_message>
<xml_diff>
--- a/Summit2017_Mocking.pptx
+++ b/Summit2017_Mocking.pptx
@@ -910,7 +910,7 @@
                 <a:ea typeface="+mn-ea"/>
                 <a:cs typeface="+mn-cs"/>
               </a:rPr>
-              <a:t>In 1964, Despite setting a lap, record all three GT40s failed to finish and Ferrari won.</a:t>
+              <a:t>In 1964, Despite setting a lap, record all three GT40s failed to finish and a Ferrari won.</a:t>
             </a:r>
           </a:p>
           <a:p>
@@ -928,7 +928,7 @@
                 <a:ea typeface="+mn-ea"/>
                 <a:cs typeface="+mn-cs"/>
               </a:rPr>
-              <a:t>In 1965, two GT40's were entered and both failed to finish and Ferrari won.</a:t>
+              <a:t>In 1965, two GT40's were entered and both failed to finish and a Ferrari won.</a:t>
             </a:r>
           </a:p>
         </p:txBody>
@@ -12395,45 +12395,321 @@
         </p:nvSpPr>
         <p:spPr>
           <a:xfrm>
-            <a:off x="519978" y="372610"/>
-            <a:ext cx="7125422" cy="2312232"/>
+            <a:off x="519978" y="1096510"/>
+            <a:ext cx="7983942" cy="930410"/>
           </a:xfrm>
         </p:spPr>
         <p:txBody>
           <a:bodyPr/>
           <a:lstStyle/>
           <a:p>
-            <a:pPr lvl="1"/>
-            <a:r>
-              <a:rPr lang="en-GB" dirty="0">
+            <a:pPr lvl="1" algn="ctr"/>
+            <a:r>
+              <a:rPr lang="en-GB" sz="4000" dirty="0">
                 <a:latin typeface="Interstate-Black"/>
                 <a:cs typeface="Interstate-Black"/>
               </a:rPr>
-              <a:t>Archtics AWS Migration Introduction</a:t>
-            </a:r>
-          </a:p>
-        </p:txBody>
-      </p:sp>
-      <p:sp>
-        <p:nvSpPr>
-          <p:cNvPr id="5" name="Date Placeholder 4"/>
-          <p:cNvSpPr>
-            <a:spLocks noGrp="1"/>
-          </p:cNvSpPr>
-          <p:nvPr>
-            <p:ph type="dt" sz="half" idx="2"/>
-          </p:nvPr>
-        </p:nvSpPr>
-        <p:spPr/>
-        <p:txBody>
-          <a:bodyPr/>
+              <a:t>Windows @ Ticketmaster</a:t>
+            </a:r>
+          </a:p>
+        </p:txBody>
+      </p:sp>
+      <p:sp>
+        <p:nvSpPr>
+          <p:cNvPr id="3" name="TextBox 2"/>
+          <p:cNvSpPr txBox="1"/>
+          <p:nvPr/>
+        </p:nvSpPr>
+        <p:spPr>
+          <a:xfrm>
+            <a:off x="1519414" y="2049780"/>
+            <a:ext cx="1228478" cy="461665"/>
+          </a:xfrm>
+          <a:prstGeom prst="rect">
+            <a:avLst/>
+          </a:prstGeom>
+          <a:noFill/>
+        </p:spPr>
+        <p:txBody>
+          <a:bodyPr wrap="none" rtlCol="0">
+            <a:spAutoFit/>
+          </a:bodyPr>
           <a:lstStyle/>
           <a:p>
-            <a:fld id="{B68F874E-2AAB-6746-AA75-DC3D541616E8}" type="datetime1">
-              <a:rPr lang="en-US" smtClean="0"/>
-              <a:t>3/31/2017</a:t>
-            </a:fld>
-            <a:endParaRPr lang="en-GB" dirty="0"/>
+            <a:r>
+              <a:rPr lang="en-US" sz="2400" dirty="0">
+                <a:latin typeface="TM Sans"/>
+                <a:cs typeface="TM Sans"/>
+              </a:rPr>
+              <a:t>Physical</a:t>
+            </a:r>
+          </a:p>
+        </p:txBody>
+      </p:sp>
+      <p:sp>
+        <p:nvSpPr>
+          <p:cNvPr id="6" name="TextBox 5"/>
+          <p:cNvSpPr txBox="1"/>
+          <p:nvPr/>
+        </p:nvSpPr>
+        <p:spPr>
+          <a:xfrm>
+            <a:off x="2189974" y="2606040"/>
+            <a:ext cx="1949893" cy="461665"/>
+          </a:xfrm>
+          <a:prstGeom prst="rect">
+            <a:avLst/>
+          </a:prstGeom>
+          <a:noFill/>
+        </p:spPr>
+        <p:txBody>
+          <a:bodyPr wrap="none" rtlCol="0">
+            <a:spAutoFit/>
+          </a:bodyPr>
+          <a:lstStyle/>
+          <a:p>
+            <a:r>
+              <a:rPr lang="en-US" sz="2400" dirty="0">
+                <a:latin typeface="TM Sans"/>
+                <a:cs typeface="TM Sans"/>
+              </a:rPr>
+              <a:t>Private Cloud</a:t>
+            </a:r>
+          </a:p>
+        </p:txBody>
+      </p:sp>
+      <p:sp>
+        <p:nvSpPr>
+          <p:cNvPr id="7" name="TextBox 6"/>
+          <p:cNvSpPr txBox="1"/>
+          <p:nvPr/>
+        </p:nvSpPr>
+        <p:spPr>
+          <a:xfrm>
+            <a:off x="3217980" y="3253740"/>
+            <a:ext cx="1843774" cy="461665"/>
+          </a:xfrm>
+          <a:prstGeom prst="rect">
+            <a:avLst/>
+          </a:prstGeom>
+          <a:noFill/>
+        </p:spPr>
+        <p:txBody>
+          <a:bodyPr wrap="none" rtlCol="0">
+            <a:spAutoFit/>
+          </a:bodyPr>
+          <a:lstStyle/>
+          <a:p>
+            <a:r>
+              <a:rPr lang="en-US" sz="2400" dirty="0">
+                <a:latin typeface="TM Sans"/>
+                <a:cs typeface="TM Sans"/>
+              </a:rPr>
+              <a:t>Public Cloud</a:t>
+            </a:r>
+          </a:p>
+        </p:txBody>
+      </p:sp>
+      <p:sp>
+        <p:nvSpPr>
+          <p:cNvPr id="8" name="TextBox 7"/>
+          <p:cNvSpPr txBox="1"/>
+          <p:nvPr/>
+        </p:nvSpPr>
+        <p:spPr>
+          <a:xfrm>
+            <a:off x="4139867" y="2327910"/>
+            <a:ext cx="1114536" cy="461665"/>
+          </a:xfrm>
+          <a:prstGeom prst="rect">
+            <a:avLst/>
+          </a:prstGeom>
+          <a:noFill/>
+        </p:spPr>
+        <p:txBody>
+          <a:bodyPr wrap="none" rtlCol="0">
+            <a:spAutoFit/>
+          </a:bodyPr>
+          <a:lstStyle/>
+          <a:p>
+            <a:r>
+              <a:rPr lang="en-US" sz="2400" dirty="0">
+                <a:latin typeface="TM Sans"/>
+                <a:cs typeface="TM Sans"/>
+              </a:rPr>
+              <a:t>Docker</a:t>
+            </a:r>
+          </a:p>
+        </p:txBody>
+      </p:sp>
+      <p:sp>
+        <p:nvSpPr>
+          <p:cNvPr id="9" name="TextBox 8"/>
+          <p:cNvSpPr txBox="1"/>
+          <p:nvPr/>
+        </p:nvSpPr>
+        <p:spPr>
+          <a:xfrm>
+            <a:off x="1808147" y="3484572"/>
+            <a:ext cx="1071255" cy="461665"/>
+          </a:xfrm>
+          <a:prstGeom prst="rect">
+            <a:avLst/>
+          </a:prstGeom>
+          <a:noFill/>
+        </p:spPr>
+        <p:txBody>
+          <a:bodyPr wrap="none" rtlCol="0">
+            <a:spAutoFit/>
+          </a:bodyPr>
+          <a:lstStyle/>
+          <a:p>
+            <a:r>
+              <a:rPr lang="en-US" sz="2400" dirty="0">
+                <a:latin typeface="TM Sans"/>
+                <a:cs typeface="TM Sans"/>
+              </a:rPr>
+              <a:t>Packer</a:t>
+            </a:r>
+          </a:p>
+        </p:txBody>
+      </p:sp>
+      <p:sp>
+        <p:nvSpPr>
+          <p:cNvPr id="10" name="TextBox 9"/>
+          <p:cNvSpPr txBox="1"/>
+          <p:nvPr/>
+        </p:nvSpPr>
+        <p:spPr>
+          <a:xfrm>
+            <a:off x="5254403" y="2954347"/>
+            <a:ext cx="1470339" cy="461665"/>
+          </a:xfrm>
+          <a:prstGeom prst="rect">
+            <a:avLst/>
+          </a:prstGeom>
+          <a:noFill/>
+        </p:spPr>
+        <p:txBody>
+          <a:bodyPr wrap="none" rtlCol="0">
+            <a:spAutoFit/>
+          </a:bodyPr>
+          <a:lstStyle/>
+          <a:p>
+            <a:r>
+              <a:rPr lang="en-US" sz="2400" dirty="0">
+                <a:latin typeface="TM Sans"/>
+                <a:cs typeface="TM Sans"/>
+              </a:rPr>
+              <a:t>Terraform</a:t>
+            </a:r>
+          </a:p>
+        </p:txBody>
+      </p:sp>
+      <p:sp>
+        <p:nvSpPr>
+          <p:cNvPr id="11" name="TextBox 10"/>
+          <p:cNvSpPr txBox="1"/>
+          <p:nvPr/>
+        </p:nvSpPr>
+        <p:spPr>
+          <a:xfrm>
+            <a:off x="5733957" y="2102484"/>
+            <a:ext cx="1447960" cy="461665"/>
+          </a:xfrm>
+          <a:prstGeom prst="rect">
+            <a:avLst/>
+          </a:prstGeom>
+          <a:noFill/>
+        </p:spPr>
+        <p:txBody>
+          <a:bodyPr wrap="none" rtlCol="0">
+            <a:spAutoFit/>
+          </a:bodyPr>
+          <a:lstStyle/>
+          <a:p>
+            <a:r>
+              <a:rPr lang="en-US" sz="2400" dirty="0" err="1">
+                <a:latin typeface="TM Sans"/>
+                <a:cs typeface="TM Sans"/>
+              </a:rPr>
+              <a:t>GitLab</a:t>
+            </a:r>
+            <a:r>
+              <a:rPr lang="en-US" sz="2400" dirty="0">
+                <a:latin typeface="TM Sans"/>
+                <a:cs typeface="TM Sans"/>
+              </a:rPr>
+              <a:t> CI</a:t>
+            </a:r>
+          </a:p>
+        </p:txBody>
+      </p:sp>
+      <p:sp>
+        <p:nvSpPr>
+          <p:cNvPr id="12" name="TextBox 11"/>
+          <p:cNvSpPr txBox="1"/>
+          <p:nvPr/>
+        </p:nvSpPr>
+        <p:spPr>
+          <a:xfrm>
+            <a:off x="7072721" y="3402388"/>
+            <a:ext cx="766557" cy="461665"/>
+          </a:xfrm>
+          <a:prstGeom prst="rect">
+            <a:avLst/>
+          </a:prstGeom>
+          <a:noFill/>
+        </p:spPr>
+        <p:txBody>
+          <a:bodyPr wrap="none" rtlCol="0">
+            <a:spAutoFit/>
+          </a:bodyPr>
+          <a:lstStyle/>
+          <a:p>
+            <a:r>
+              <a:rPr lang="en-US" sz="2400" dirty="0">
+                <a:latin typeface="TM Sans"/>
+                <a:cs typeface="TM Sans"/>
+              </a:rPr>
+              <a:t>DSC</a:t>
+            </a:r>
+          </a:p>
+        </p:txBody>
+      </p:sp>
+      <p:sp>
+        <p:nvSpPr>
+          <p:cNvPr id="13" name="TextBox 12"/>
+          <p:cNvSpPr txBox="1"/>
+          <p:nvPr/>
+        </p:nvSpPr>
+        <p:spPr>
+          <a:xfrm>
+            <a:off x="4519233" y="3826857"/>
+            <a:ext cx="1467068" cy="461665"/>
+          </a:xfrm>
+          <a:prstGeom prst="rect">
+            <a:avLst/>
+          </a:prstGeom>
+          <a:noFill/>
+        </p:spPr>
+        <p:txBody>
+          <a:bodyPr wrap="none" rtlCol="0">
+            <a:spAutoFit/>
+          </a:bodyPr>
+          <a:lstStyle/>
+          <a:p>
+            <a:r>
+              <a:rPr lang="en-US" sz="2400" dirty="0" err="1">
+                <a:latin typeface="TM Sans"/>
+                <a:cs typeface="TM Sans"/>
+              </a:rPr>
+              <a:t>PoshSpec</a:t>
+            </a:r>
+            <a:endParaRPr lang="en-US" sz="2400" dirty="0">
+              <a:latin typeface="TM Sans"/>
+              <a:cs typeface="TM Sans"/>
+            </a:endParaRPr>
           </a:p>
         </p:txBody>
       </p:sp>

</xml_diff>

<commit_message>
Add Demo6 - Scriptblocks
</commit_message>
<xml_diff>
--- a/Summit2017_Mocking.pptx
+++ b/Summit2017_Mocking.pptx
@@ -5,10 +5,10 @@
     <p:sldMasterId id="2147483648" r:id="rId4"/>
   </p:sldMasterIdLst>
   <p:notesMasterIdLst>
-    <p:notesMasterId r:id="rId26"/>
+    <p:notesMasterId r:id="rId27"/>
   </p:notesMasterIdLst>
   <p:handoutMasterIdLst>
-    <p:handoutMasterId r:id="rId27"/>
+    <p:handoutMasterId r:id="rId28"/>
   </p:handoutMasterIdLst>
   <p:sldIdLst>
     <p:sldId id="422" r:id="rId5"/>
@@ -27,11 +27,12 @@
     <p:sldId id="417" r:id="rId18"/>
     <p:sldId id="430" r:id="rId19"/>
     <p:sldId id="431" r:id="rId20"/>
-    <p:sldId id="418" r:id="rId21"/>
-    <p:sldId id="419" r:id="rId22"/>
-    <p:sldId id="420" r:id="rId23"/>
-    <p:sldId id="409" r:id="rId24"/>
-    <p:sldId id="421" r:id="rId25"/>
+    <p:sldId id="432" r:id="rId21"/>
+    <p:sldId id="418" r:id="rId22"/>
+    <p:sldId id="419" r:id="rId23"/>
+    <p:sldId id="420" r:id="rId24"/>
+    <p:sldId id="409" r:id="rId25"/>
+    <p:sldId id="421" r:id="rId26"/>
   </p:sldIdLst>
   <p:sldSz cx="9144000" cy="5143500" type="screen16x9"/>
   <p:notesSz cx="6858000" cy="9144000"/>
@@ -1399,6 +1400,26 @@
               <a:buFont typeface="Arial" panose="020B0604020202020204" pitchFamily="34" charset="0"/>
               <a:buChar char="•"/>
             </a:pPr>
+            <a:r>
+              <a:rPr lang="en-US" dirty="0"/>
+              <a:t>You can use Add-Member to effectively override the value of any Property or Method</a:t>
+            </a:r>
+          </a:p>
+          <a:p>
+            <a:pPr marL="171450" indent="-171450">
+              <a:buFont typeface="Arial" panose="020B0604020202020204" pitchFamily="34" charset="0"/>
+              <a:buChar char="•"/>
+            </a:pPr>
+            <a:r>
+              <a:rPr lang="en-US" dirty="0"/>
+              <a:t>Note, this method of creating a fake object requires a class with a public constructor</a:t>
+            </a:r>
+          </a:p>
+          <a:p>
+            <a:pPr marL="171450" indent="-171450">
+              <a:buFont typeface="Arial" panose="020B0604020202020204" pitchFamily="34" charset="0"/>
+              <a:buChar char="•"/>
+            </a:pPr>
             <a:endParaRPr lang="en-US" dirty="0"/>
           </a:p>
           <a:p>
@@ -1452,6 +1473,160 @@
     <p:extLst>
       <p:ext uri="{BB962C8B-B14F-4D97-AF65-F5344CB8AC3E}">
         <p14:creationId xmlns:p14="http://schemas.microsoft.com/office/powerpoint/2010/main" val="431507397"/>
+      </p:ext>
+    </p:extLst>
+  </p:cSld>
+  <p:clrMapOvr>
+    <a:masterClrMapping/>
+  </p:clrMapOvr>
+</p:notes>
+</file>
+
+<file path=ppt/notesSlides/notesSlide15.xml><?xml version="1.0" encoding="utf-8"?>
+<p:notes xmlns:a="http://schemas.openxmlformats.org/drawingml/2006/main" xmlns:r="http://schemas.openxmlformats.org/officeDocument/2006/relationships" xmlns:p="http://schemas.openxmlformats.org/presentationml/2006/main">
+  <p:cSld>
+    <p:spTree>
+      <p:nvGrpSpPr>
+        <p:cNvPr id="1" name=""/>
+        <p:cNvGrpSpPr/>
+        <p:nvPr/>
+      </p:nvGrpSpPr>
+      <p:grpSpPr>
+        <a:xfrm>
+          <a:off x="0" y="0"/>
+          <a:ext cx="0" cy="0"/>
+          <a:chOff x="0" y="0"/>
+          <a:chExt cx="0" cy="0"/>
+        </a:xfrm>
+      </p:grpSpPr>
+      <p:sp>
+        <p:nvSpPr>
+          <p:cNvPr id="2" name="Slide Image Placeholder 1"/>
+          <p:cNvSpPr>
+            <a:spLocks noGrp="1" noRot="1" noChangeAspect="1"/>
+          </p:cNvSpPr>
+          <p:nvPr>
+            <p:ph type="sldImg"/>
+          </p:nvPr>
+        </p:nvSpPr>
+        <p:spPr/>
+      </p:sp>
+      <p:sp>
+        <p:nvSpPr>
+          <p:cNvPr id="3" name="Notes Placeholder 2"/>
+          <p:cNvSpPr>
+            <a:spLocks noGrp="1"/>
+          </p:cNvSpPr>
+          <p:nvPr>
+            <p:ph type="body" idx="1"/>
+          </p:nvPr>
+        </p:nvSpPr>
+        <p:spPr/>
+        <p:txBody>
+          <a:bodyPr/>
+          <a:lstStyle/>
+          <a:p>
+            <a:pPr marL="171450" indent="-171450">
+              <a:buFont typeface="Arial" panose="020B0604020202020204" pitchFamily="34" charset="0"/>
+              <a:buChar char="•"/>
+            </a:pPr>
+            <a:r>
+              <a:rPr lang="en-US" dirty="0"/>
+              <a:t>How about testing a </a:t>
+            </a:r>
+            <a:r>
+              <a:rPr lang="en-US" dirty="0" err="1"/>
+              <a:t>ScriptBlock</a:t>
+            </a:r>
+            <a:r>
+              <a:rPr lang="en-US" dirty="0"/>
+              <a:t> that you are passing to Invoke-Command</a:t>
+            </a:r>
+          </a:p>
+          <a:p>
+            <a:pPr marL="171450" indent="-171450">
+              <a:buFont typeface="Arial" panose="020B0604020202020204" pitchFamily="34" charset="0"/>
+              <a:buChar char="•"/>
+            </a:pPr>
+            <a:r>
+              <a:rPr lang="en-US" dirty="0"/>
+              <a:t>Don’t put a lot of logic in your </a:t>
+            </a:r>
+            <a:r>
+              <a:rPr lang="en-US" dirty="0" err="1"/>
+              <a:t>ScriptBlock</a:t>
+            </a:r>
+            <a:r>
+              <a:rPr lang="en-US" dirty="0"/>
+              <a:t>. Build a testable module then use the </a:t>
+            </a:r>
+            <a:r>
+              <a:rPr lang="en-US" dirty="0" err="1"/>
+              <a:t>ScriptBlock</a:t>
+            </a:r>
+            <a:r>
+              <a:rPr lang="en-US" dirty="0"/>
+              <a:t> to install and invoke the module.</a:t>
+            </a:r>
+          </a:p>
+          <a:p>
+            <a:pPr marL="171450" indent="-171450">
+              <a:buFont typeface="Arial" panose="020B0604020202020204" pitchFamily="34" charset="0"/>
+              <a:buChar char="•"/>
+            </a:pPr>
+            <a:endParaRPr lang="en-US" dirty="0"/>
+          </a:p>
+          <a:p>
+            <a:pPr marL="171450" indent="-171450">
+              <a:buFont typeface="Arial" panose="020B0604020202020204" pitchFamily="34" charset="0"/>
+              <a:buChar char="•"/>
+            </a:pPr>
+            <a:endParaRPr lang="en-US" dirty="0"/>
+          </a:p>
+          <a:p>
+            <a:pPr marL="0" indent="0">
+              <a:buFont typeface="Arial" panose="020B0604020202020204" pitchFamily="34" charset="0"/>
+              <a:buNone/>
+            </a:pPr>
+            <a:endParaRPr lang="en-US" dirty="0"/>
+          </a:p>
+          <a:p>
+            <a:pPr marL="171450" indent="-171450">
+              <a:buFont typeface="Arial" panose="020B0604020202020204" pitchFamily="34" charset="0"/>
+              <a:buChar char="•"/>
+            </a:pPr>
+            <a:endParaRPr lang="en-US" dirty="0"/>
+          </a:p>
+        </p:txBody>
+      </p:sp>
+      <p:sp>
+        <p:nvSpPr>
+          <p:cNvPr id="4" name="Slide Number Placeholder 3"/>
+          <p:cNvSpPr>
+            <a:spLocks noGrp="1"/>
+          </p:cNvSpPr>
+          <p:nvPr>
+            <p:ph type="sldNum" sz="quarter" idx="10"/>
+          </p:nvPr>
+        </p:nvSpPr>
+        <p:spPr/>
+        <p:txBody>
+          <a:bodyPr/>
+          <a:lstStyle/>
+          <a:p>
+            <a:fld id="{580C3CF9-2088-4345-84DE-A0500A36AC73}" type="slidenum">
+              <a:rPr lang="en-US" smtClean="0"/>
+              <a:pPr/>
+              <a:t>17</a:t>
+            </a:fld>
+            <a:endParaRPr lang="en-US"/>
+          </a:p>
+        </p:txBody>
+      </p:sp>
+    </p:spTree>
+    <p:extLst>
+      <p:ext uri="{BB962C8B-B14F-4D97-AF65-F5344CB8AC3E}">
+        <p14:creationId xmlns:p14="http://schemas.microsoft.com/office/powerpoint/2010/main" val="430800703"/>
       </p:ext>
     </p:extLst>
   </p:cSld>
@@ -15448,125 +15623,13 @@
       </p:cxnSp>
       <p:sp>
         <p:nvSpPr>
-          <p:cNvPr id="8" name="TextBox 7"/>
-          <p:cNvSpPr txBox="1"/>
-          <p:nvPr/>
-        </p:nvSpPr>
-        <p:spPr>
-          <a:xfrm>
-            <a:off x="273051" y="803344"/>
-            <a:ext cx="8454559" cy="307777"/>
-          </a:xfrm>
-          <a:prstGeom prst="rect">
-            <a:avLst/>
-          </a:prstGeom>
-          <a:noFill/>
-        </p:spPr>
-        <p:txBody>
-          <a:bodyPr wrap="none" rtlCol="0">
-            <a:spAutoFit/>
-          </a:bodyPr>
-          <a:lstStyle/>
-          <a:p>
-            <a:r>
-              <a:rPr lang="en-US" sz="1400" dirty="0">
-                <a:latin typeface="Fira Code" panose="020B0509050000020004" pitchFamily="49" charset="0"/>
-                <a:ea typeface="Fira Code" panose="020B0509050000020004" pitchFamily="49" charset="0"/>
-                <a:cs typeface="TM Sans"/>
-              </a:rPr>
-              <a:t>New-Object -TypeName Diagnostics.Process -Property @{Name = "IMadeItUp.exe" }</a:t>
-            </a:r>
-            <a:endParaRPr lang="en-US" sz="1400" dirty="0">
-              <a:latin typeface="Fira Code" panose="020B0509050000020004" pitchFamily="49" charset="0"/>
-              <a:ea typeface="Fira Code" panose="020B0509050000020004" pitchFamily="49" charset="0"/>
-              <a:cs typeface="TM Sans"/>
-            </a:endParaRPr>
-          </a:p>
-        </p:txBody>
-      </p:sp>
-      <p:pic>
-        <p:nvPicPr>
-          <p:cNvPr id="13" name="Picture 12"/>
-          <p:cNvPicPr>
-            <a:picLocks noChangeAspect="1"/>
-          </p:cNvPicPr>
-          <p:nvPr/>
-        </p:nvPicPr>
-        <p:blipFill>
-          <a:blip r:embed="rId3"/>
-          <a:stretch>
-            <a:fillRect/>
-          </a:stretch>
-        </p:blipFill>
-        <p:spPr>
-          <a:xfrm>
-            <a:off x="2672456" y="3887890"/>
-            <a:ext cx="6087325" cy="857370"/>
-          </a:xfrm>
-          <a:prstGeom prst="rect">
-            <a:avLst/>
-          </a:prstGeom>
-          <a:ln w="76200">
-            <a:solidFill>
-              <a:schemeClr val="bg2">
-                <a:lumMod val="50000"/>
-              </a:schemeClr>
-            </a:solidFill>
-          </a:ln>
-        </p:spPr>
-      </p:pic>
-      <p:sp>
-        <p:nvSpPr>
-          <p:cNvPr id="14" name="TextBox 13"/>
-          <p:cNvSpPr txBox="1"/>
-          <p:nvPr/>
-        </p:nvSpPr>
-        <p:spPr>
-          <a:xfrm>
-            <a:off x="336594" y="3953998"/>
-            <a:ext cx="2339102" cy="707886"/>
-          </a:xfrm>
-          <a:prstGeom prst="rect">
-            <a:avLst/>
-          </a:prstGeom>
-          <a:noFill/>
-        </p:spPr>
-        <p:txBody>
-          <a:bodyPr wrap="none" rtlCol="0">
-            <a:spAutoFit/>
-          </a:bodyPr>
-          <a:lstStyle/>
-          <a:p>
-            <a:r>
-              <a:rPr lang="en-US" sz="2000" dirty="0">
-                <a:latin typeface="Fira Code" panose="020B0509050000020004" pitchFamily="49" charset="0"/>
-                <a:ea typeface="Fira Code" panose="020B0509050000020004" pitchFamily="49" charset="0"/>
-                <a:cs typeface="TM Sans"/>
-              </a:rPr>
-              <a:t>PS &gt;$ps</a:t>
-            </a:r>
-          </a:p>
-          <a:p>
-            <a:r>
-              <a:rPr lang="en-US" sz="2000" dirty="0">
-                <a:latin typeface="Fira Code" panose="020B0509050000020004" pitchFamily="49" charset="0"/>
-                <a:ea typeface="Fira Code" panose="020B0509050000020004" pitchFamily="49" charset="0"/>
-                <a:cs typeface="TM Sans"/>
-              </a:rPr>
-              <a:t>PS &gt;$ps.Kill()</a:t>
-            </a:r>
-          </a:p>
-        </p:txBody>
-      </p:sp>
-      <p:sp>
-        <p:nvSpPr>
           <p:cNvPr id="15" name="TextBox 14"/>
           <p:cNvSpPr txBox="1"/>
           <p:nvPr/>
         </p:nvSpPr>
         <p:spPr>
           <a:xfrm>
-            <a:off x="225529" y="2349449"/>
+            <a:off x="225530" y="2115250"/>
             <a:ext cx="8645315" cy="830997"/>
           </a:xfrm>
           <a:prstGeom prst="rect">
@@ -15978,8 +16041,8 @@
         </p:nvSpPr>
         <p:spPr>
           <a:xfrm>
-            <a:off x="273052" y="1130561"/>
-            <a:ext cx="8597792" cy="630002"/>
+            <a:off x="225530" y="830179"/>
+            <a:ext cx="8645314" cy="978809"/>
           </a:xfrm>
           <a:solidFill>
             <a:schemeClr val="bg2">
@@ -15996,9 +16059,50 @@
         </p:spPr>
         <p:txBody>
           <a:bodyPr>
-            <a:normAutofit/>
+            <a:noAutofit/>
           </a:bodyPr>
           <a:lstStyle/>
+          <a:p>
+            <a:pPr lvl="0">
+              <a:lnSpc>
+                <a:spcPct val="100000"/>
+              </a:lnSpc>
+              <a:spcBef>
+                <a:spcPts val="0"/>
+              </a:spcBef>
+            </a:pPr>
+            <a:r>
+              <a:rPr lang="en-US" sz="1200" dirty="0">
+                <a:solidFill>
+                  <a:schemeClr val="bg1">
+                    <a:lumMod val="65000"/>
+                  </a:schemeClr>
+                </a:solidFill>
+                <a:latin typeface="Fira Code" panose="020B0509050000020004" pitchFamily="49" charset="0"/>
+                <a:ea typeface="Fira Code" panose="020B0509050000020004" pitchFamily="49" charset="0"/>
+              </a:rPr>
+              <a:t>PS &gt; </a:t>
+            </a:r>
+            <a:r>
+              <a:rPr lang="en-US" sz="1200" dirty="0">
+                <a:solidFill>
+                  <a:schemeClr val="bg1">
+                    <a:lumMod val="65000"/>
+                  </a:schemeClr>
+                </a:solidFill>
+                <a:latin typeface="Fira Code" panose="020B0509050000020004" pitchFamily="49" charset="0"/>
+                <a:ea typeface="Fira Code" panose="020B0509050000020004" pitchFamily="49" charset="0"/>
+              </a:rPr>
+              <a:t>New-Object -TypeName Diagnostics.Process -Property @{Name = "IMadeItUp.exe" }</a:t>
+            </a:r>
+            <a:endParaRPr lang="en-US" sz="1200" dirty="0">
+              <a:solidFill>
+                <a:srgbClr val="FF0000"/>
+              </a:solidFill>
+              <a:latin typeface="Fira Code" panose="020B0509050000020004" pitchFamily="49" charset="0"/>
+              <a:ea typeface="Fira Code" panose="020B0509050000020004" pitchFamily="49" charset="0"/>
+            </a:endParaRPr>
+          </a:p>
           <a:p>
             <a:pPr>
               <a:lnSpc>
@@ -16008,41 +16112,281 @@
                 <a:spcPts val="0"/>
               </a:spcBef>
             </a:pPr>
-            <a:r>
-              <a:rPr lang="en-US" sz="1200" dirty="0">
-                <a:solidFill>
-                  <a:srgbClr val="FF0000"/>
-                </a:solidFill>
-                <a:latin typeface="Fira Code" panose="020B0509050000020004" pitchFamily="49" charset="0"/>
-                <a:ea typeface="Fira Code" panose="020B0509050000020004" pitchFamily="49" charset="0"/>
-              </a:rPr>
-              <a:t>New-Object : The value supplied is not valid, or the property is read-only. Change the value, and then try again.</a:t>
-            </a:r>
-            <a:br>
-              <a:rPr lang="en-US" sz="1200" dirty="0">
-                <a:solidFill>
-                  <a:srgbClr val="FF0000"/>
-                </a:solidFill>
-                <a:latin typeface="Fira Code" panose="020B0509050000020004" pitchFamily="49" charset="0"/>
-                <a:ea typeface="Fira Code" panose="020B0509050000020004" pitchFamily="49" charset="0"/>
-              </a:rPr>
-            </a:br>
-            <a:r>
-              <a:rPr lang="en-US" sz="1200" dirty="0">
-                <a:solidFill>
-                  <a:srgbClr val="FF0000"/>
-                </a:solidFill>
-                <a:latin typeface="Fira Code" panose="020B0509050000020004" pitchFamily="49" charset="0"/>
-                <a:ea typeface="Fira Code" panose="020B0509050000020004" pitchFamily="49" charset="0"/>
-              </a:rPr>
-              <a:t>At line:1 char:7+ $ps = New-Object -TypeName Diagnostics.Process -Property @{Name = "IM ...</a:t>
-            </a:r>
             <a:endParaRPr lang="en-US" sz="1200" dirty="0">
               <a:solidFill>
                 <a:srgbClr val="FF0000"/>
               </a:solidFill>
               <a:latin typeface="Fira Code" panose="020B0509050000020004" pitchFamily="49" charset="0"/>
               <a:ea typeface="Fira Code" panose="020B0509050000020004" pitchFamily="49" charset="0"/>
+            </a:endParaRPr>
+          </a:p>
+          <a:p>
+            <a:pPr>
+              <a:lnSpc>
+                <a:spcPct val="100000"/>
+              </a:lnSpc>
+              <a:spcBef>
+                <a:spcPts val="0"/>
+              </a:spcBef>
+            </a:pPr>
+            <a:r>
+              <a:rPr lang="en-US" sz="1200" dirty="0">
+                <a:solidFill>
+                  <a:srgbClr val="FF0000"/>
+                </a:solidFill>
+                <a:latin typeface="Fira Code" panose="020B0509050000020004" pitchFamily="49" charset="0"/>
+                <a:ea typeface="Fira Code" panose="020B0509050000020004" pitchFamily="49" charset="0"/>
+              </a:rPr>
+              <a:t>New-Object : The value supplied is not valid, or the property is read-only. Change the value, and then try again.</a:t>
+            </a:r>
+            <a:br>
+              <a:rPr lang="en-US" sz="1200" dirty="0">
+                <a:solidFill>
+                  <a:srgbClr val="FF0000"/>
+                </a:solidFill>
+                <a:latin typeface="Fira Code" panose="020B0509050000020004" pitchFamily="49" charset="0"/>
+                <a:ea typeface="Fira Code" panose="020B0509050000020004" pitchFamily="49" charset="0"/>
+              </a:rPr>
+            </a:br>
+            <a:r>
+              <a:rPr lang="en-US" sz="1200" dirty="0">
+                <a:solidFill>
+                  <a:srgbClr val="FF0000"/>
+                </a:solidFill>
+                <a:latin typeface="Fira Code" panose="020B0509050000020004" pitchFamily="49" charset="0"/>
+                <a:ea typeface="Fira Code" panose="020B0509050000020004" pitchFamily="49" charset="0"/>
+              </a:rPr>
+              <a:t>At line:1 char:7+ $ps = New-Object -TypeName Diagnostics.Process -Property @{Name = "IM ...</a:t>
+            </a:r>
+            <a:endParaRPr lang="en-US" sz="1200" dirty="0">
+              <a:solidFill>
+                <a:srgbClr val="FF0000"/>
+              </a:solidFill>
+              <a:latin typeface="Fira Code" panose="020B0509050000020004" pitchFamily="49" charset="0"/>
+              <a:ea typeface="Fira Code" panose="020B0509050000020004" pitchFamily="49" charset="0"/>
+            </a:endParaRPr>
+          </a:p>
+        </p:txBody>
+      </p:sp>
+      <p:sp>
+        <p:nvSpPr>
+          <p:cNvPr id="18" name="TextBox 17"/>
+          <p:cNvSpPr txBox="1"/>
+          <p:nvPr/>
+        </p:nvSpPr>
+        <p:spPr>
+          <a:xfrm>
+            <a:off x="2085013" y="3258252"/>
+            <a:ext cx="6785832" cy="1569660"/>
+          </a:xfrm>
+          <a:prstGeom prst="rect">
+            <a:avLst/>
+          </a:prstGeom>
+          <a:solidFill>
+            <a:schemeClr val="bg2">
+              <a:lumMod val="50000"/>
+            </a:schemeClr>
+          </a:solidFill>
+          <a:ln w="76200">
+            <a:solidFill>
+              <a:schemeClr val="bg2">
+                <a:lumMod val="50000"/>
+              </a:schemeClr>
+            </a:solidFill>
+          </a:ln>
+        </p:spPr>
+        <p:txBody>
+          <a:bodyPr wrap="none" rtlCol="0">
+            <a:spAutoFit/>
+          </a:bodyPr>
+          <a:lstStyle/>
+          <a:p>
+            <a:r>
+              <a:rPr lang="en-US" sz="1200" dirty="0">
+                <a:solidFill>
+                  <a:schemeClr val="bg1">
+                    <a:lumMod val="65000"/>
+                  </a:schemeClr>
+                </a:solidFill>
+                <a:latin typeface="Fira Code" panose="020B0509050000020004" pitchFamily="49" charset="0"/>
+              </a:rPr>
+              <a:t>PS &gt; </a:t>
+            </a:r>
+            <a:r>
+              <a:rPr lang="en-US" sz="1200" dirty="0">
+                <a:solidFill>
+                  <a:srgbClr val="569CD6"/>
+                </a:solidFill>
+                <a:latin typeface="Fira Code" panose="020B0509050000020004" pitchFamily="49" charset="0"/>
+              </a:rPr>
+              <a:t>$</a:t>
+            </a:r>
+            <a:r>
+              <a:rPr lang="en-US" sz="1200" dirty="0">
+                <a:solidFill>
+                  <a:srgbClr val="9CDCFE"/>
+                </a:solidFill>
+                <a:latin typeface="Fira Code" panose="020B0509050000020004" pitchFamily="49" charset="0"/>
+              </a:rPr>
+              <a:t>ps</a:t>
+            </a:r>
+            <a:endParaRPr lang="en-US" sz="1200" dirty="0">
+              <a:solidFill>
+                <a:srgbClr val="D4D4D4"/>
+              </a:solidFill>
+              <a:latin typeface="Fira Code" panose="020B0509050000020004" pitchFamily="49" charset="0"/>
+            </a:endParaRPr>
+          </a:p>
+          <a:p>
+            <a:endParaRPr lang="en-US" sz="1200" dirty="0">
+              <a:solidFill>
+                <a:schemeClr val="bg1">
+                  <a:lumMod val="65000"/>
+                </a:schemeClr>
+              </a:solidFill>
+              <a:latin typeface="Fira Code" panose="020B0509050000020004" pitchFamily="49" charset="0"/>
+            </a:endParaRPr>
+          </a:p>
+          <a:p>
+            <a:r>
+              <a:rPr lang="en-US" sz="1200" dirty="0">
+                <a:solidFill>
+                  <a:schemeClr val="bg1">
+                    <a:lumMod val="65000"/>
+                  </a:schemeClr>
+                </a:solidFill>
+                <a:latin typeface="Fira Code" panose="020B0509050000020004" pitchFamily="49" charset="0"/>
+              </a:rPr>
+              <a:t>Handles  NPM(K)    PM(K)      WS(K)     CPU(s)     Id  SI </a:t>
+            </a:r>
+            <a:r>
+              <a:rPr lang="en-US" sz="1200" dirty="0" err="1">
+                <a:solidFill>
+                  <a:schemeClr val="bg1">
+                    <a:lumMod val="65000"/>
+                  </a:schemeClr>
+                </a:solidFill>
+                <a:latin typeface="Fira Code" panose="020B0509050000020004" pitchFamily="49" charset="0"/>
+              </a:rPr>
+              <a:t>ProcessName</a:t>
+            </a:r>
+            <a:endParaRPr lang="en-US" sz="1200" dirty="0">
+              <a:solidFill>
+                <a:schemeClr val="bg1">
+                  <a:lumMod val="65000"/>
+                </a:schemeClr>
+              </a:solidFill>
+              <a:latin typeface="Fira Code" panose="020B0509050000020004" pitchFamily="49" charset="0"/>
+            </a:endParaRPr>
+          </a:p>
+          <a:p>
+            <a:r>
+              <a:rPr lang="en-US" sz="1200" dirty="0">
+                <a:solidFill>
+                  <a:schemeClr val="bg1">
+                    <a:lumMod val="65000"/>
+                  </a:schemeClr>
+                </a:solidFill>
+                <a:latin typeface="Fira Code" panose="020B0509050000020004" pitchFamily="49" charset="0"/>
+              </a:rPr>
+              <a:t>-------  ------    -----      -----     ------     --  -- -----------</a:t>
+            </a:r>
+          </a:p>
+          <a:p>
+            <a:r>
+              <a:rPr lang="en-US" sz="1200" dirty="0">
+                <a:solidFill>
+                  <a:schemeClr val="bg1">
+                    <a:lumMod val="65000"/>
+                  </a:schemeClr>
+                </a:solidFill>
+                <a:latin typeface="Fira Code" panose="020B0509050000020004" pitchFamily="49" charset="0"/>
+              </a:rPr>
+              <a:t>              0        0          0               321     IMadeItUp.exe</a:t>
+            </a:r>
+          </a:p>
+          <a:p>
+            <a:r>
+              <a:rPr lang="en-US" sz="1200" dirty="0">
+                <a:solidFill>
+                  <a:schemeClr val="bg1">
+                    <a:lumMod val="65000"/>
+                  </a:schemeClr>
+                </a:solidFill>
+                <a:latin typeface="Fira Code" panose="020B0509050000020004" pitchFamily="49" charset="0"/>
+              </a:rPr>
+              <a:t>PS &gt; </a:t>
+            </a:r>
+            <a:r>
+              <a:rPr lang="en-US" sz="1200" dirty="0">
+                <a:solidFill>
+                  <a:srgbClr val="569CD6"/>
+                </a:solidFill>
+                <a:latin typeface="Fira Code" panose="020B0509050000020004" pitchFamily="49" charset="0"/>
+              </a:rPr>
+              <a:t>$</a:t>
+            </a:r>
+            <a:r>
+              <a:rPr lang="en-US" sz="1200" dirty="0" err="1">
+                <a:solidFill>
+                  <a:srgbClr val="9CDCFE"/>
+                </a:solidFill>
+                <a:latin typeface="Fira Code" panose="020B0509050000020004" pitchFamily="49" charset="0"/>
+              </a:rPr>
+              <a:t>ps</a:t>
+            </a:r>
+            <a:r>
+              <a:rPr lang="en-US" sz="1200" dirty="0" err="1">
+                <a:solidFill>
+                  <a:srgbClr val="DCDCAA"/>
+                </a:solidFill>
+                <a:latin typeface="Fira Code" panose="020B0509050000020004" pitchFamily="49" charset="0"/>
+              </a:rPr>
+              <a:t>.kill</a:t>
+            </a:r>
+            <a:r>
+              <a:rPr lang="en-US" sz="1200" dirty="0">
+                <a:solidFill>
+                  <a:srgbClr val="569CD6"/>
+                </a:solidFill>
+                <a:latin typeface="Fira Code" panose="020B0509050000020004" pitchFamily="49" charset="0"/>
+              </a:rPr>
+              <a:t>()</a:t>
+            </a:r>
+            <a:endParaRPr lang="en-US" sz="1200" dirty="0">
+              <a:solidFill>
+                <a:srgbClr val="D4D4D4"/>
+              </a:solidFill>
+              <a:latin typeface="Fira Code" panose="020B0509050000020004" pitchFamily="49" charset="0"/>
+            </a:endParaRPr>
+          </a:p>
+          <a:p>
+            <a:br>
+              <a:rPr lang="en-US" sz="1200" dirty="0">
+                <a:solidFill>
+                  <a:srgbClr val="D4D4D4"/>
+                </a:solidFill>
+                <a:latin typeface="Fira Code" panose="020B0509050000020004" pitchFamily="49" charset="0"/>
+              </a:rPr>
+            </a:br>
+            <a:r>
+              <a:rPr lang="en-US" sz="1200" dirty="0">
+                <a:solidFill>
+                  <a:schemeClr val="bg1">
+                    <a:lumMod val="65000"/>
+                  </a:schemeClr>
+                </a:solidFill>
+                <a:latin typeface="Fira Code" panose="020B0509050000020004" pitchFamily="49" charset="0"/>
+              </a:rPr>
+              <a:t>Killed 321</a:t>
+            </a:r>
+            <a:endParaRPr lang="en-US" sz="1200" dirty="0">
+              <a:solidFill>
+                <a:schemeClr val="bg1">
+                  <a:lumMod val="65000"/>
+                </a:schemeClr>
+              </a:solidFill>
+              <a:latin typeface="Fira Code" panose="020B0509050000020004" pitchFamily="49" charset="0"/>
             </a:endParaRPr>
           </a:p>
         </p:txBody>
@@ -16061,6 +16405,725 @@
 </file>
 
 <file path=ppt/slides/slide17.xml><?xml version="1.0" encoding="utf-8"?>
+<p:sld xmlns:a="http://schemas.openxmlformats.org/drawingml/2006/main" xmlns:r="http://schemas.openxmlformats.org/officeDocument/2006/relationships" xmlns:p="http://schemas.openxmlformats.org/presentationml/2006/main">
+  <p:cSld>
+    <p:spTree>
+      <p:nvGrpSpPr>
+        <p:cNvPr id="1" name=""/>
+        <p:cNvGrpSpPr/>
+        <p:nvPr/>
+      </p:nvGrpSpPr>
+      <p:grpSpPr>
+        <a:xfrm>
+          <a:off x="0" y="0"/>
+          <a:ext cx="0" cy="0"/>
+          <a:chOff x="0" y="0"/>
+          <a:chExt cx="0" cy="0"/>
+        </a:xfrm>
+      </p:grpSpPr>
+      <p:sp>
+        <p:nvSpPr>
+          <p:cNvPr id="3" name="Text Placeholder 2"/>
+          <p:cNvSpPr>
+            <a:spLocks noGrp="1"/>
+          </p:cNvSpPr>
+          <p:nvPr>
+            <p:ph type="body" sz="quarter" idx="15"/>
+          </p:nvPr>
+        </p:nvSpPr>
+        <p:spPr>
+          <a:effectLst>
+            <a:outerShdw blurRad="40005" dist="20320" dir="5400000" algn="ctr" rotWithShape="0">
+              <a:schemeClr val="bg2">
+                <a:alpha val="38000"/>
+              </a:schemeClr>
+            </a:outerShdw>
+          </a:effectLst>
+        </p:spPr>
+        <p:txBody>
+          <a:bodyPr/>
+          <a:lstStyle/>
+          <a:p>
+            <a:r>
+              <a:rPr lang="en-US" dirty="0">
+                <a:latin typeface="Interstate-Black"/>
+                <a:cs typeface="Interstate-Black"/>
+              </a:rPr>
+              <a:t>Script Blocks</a:t>
+            </a:r>
+          </a:p>
+        </p:txBody>
+      </p:sp>
+      <p:cxnSp>
+        <p:nvCxnSpPr>
+          <p:cNvPr id="6" name="Straight Connector 5"/>
+          <p:cNvCxnSpPr>
+            <a:stCxn id="3" idx="1"/>
+            <a:endCxn id="3" idx="3"/>
+          </p:cNvCxnSpPr>
+          <p:nvPr/>
+        </p:nvCxnSpPr>
+        <p:spPr>
+          <a:xfrm>
+            <a:off x="273051" y="641272"/>
+            <a:ext cx="8550274" cy="0"/>
+          </a:xfrm>
+          <a:prstGeom prst="line">
+            <a:avLst/>
+          </a:prstGeom>
+        </p:spPr>
+        <p:style>
+          <a:lnRef idx="2">
+            <a:schemeClr val="accent1"/>
+          </a:lnRef>
+          <a:fillRef idx="0">
+            <a:schemeClr val="accent1"/>
+          </a:fillRef>
+          <a:effectRef idx="1">
+            <a:schemeClr val="accent1"/>
+          </a:effectRef>
+          <a:fontRef idx="minor">
+            <a:schemeClr val="tx1"/>
+          </a:fontRef>
+        </p:style>
+      </p:cxnSp>
+      <p:sp>
+        <p:nvSpPr>
+          <p:cNvPr id="15" name="TextBox 14"/>
+          <p:cNvSpPr txBox="1"/>
+          <p:nvPr/>
+        </p:nvSpPr>
+        <p:spPr>
+          <a:xfrm>
+            <a:off x="336594" y="946348"/>
+            <a:ext cx="3717684" cy="1938992"/>
+          </a:xfrm>
+          <a:prstGeom prst="rect">
+            <a:avLst/>
+          </a:prstGeom>
+          <a:solidFill>
+            <a:schemeClr val="bg2">
+              <a:lumMod val="50000"/>
+            </a:schemeClr>
+          </a:solidFill>
+          <a:ln w="76200">
+            <a:solidFill>
+              <a:schemeClr val="bg2">
+                <a:lumMod val="50000"/>
+              </a:schemeClr>
+            </a:solidFill>
+          </a:ln>
+        </p:spPr>
+        <p:txBody>
+          <a:bodyPr wrap="none" rtlCol="0">
+            <a:spAutoFit/>
+          </a:bodyPr>
+          <a:lstStyle/>
+          <a:p>
+            <a:r>
+              <a:rPr lang="en-US" sz="1200" dirty="0">
+                <a:solidFill>
+                  <a:srgbClr val="569CD6"/>
+                </a:solidFill>
+                <a:latin typeface="Fira Code" panose="020B0509050000020004" pitchFamily="49" charset="0"/>
+              </a:rPr>
+              <a:t>$</a:t>
+            </a:r>
+            <a:r>
+              <a:rPr lang="en-US" sz="1200" dirty="0" err="1">
+                <a:solidFill>
+                  <a:srgbClr val="9CDCFE"/>
+                </a:solidFill>
+                <a:latin typeface="Fira Code" panose="020B0509050000020004" pitchFamily="49" charset="0"/>
+              </a:rPr>
+              <a:t>scriptblock</a:t>
+            </a:r>
+            <a:r>
+              <a:rPr lang="en-US" sz="1200" dirty="0">
+                <a:solidFill>
+                  <a:srgbClr val="D4D4D4"/>
+                </a:solidFill>
+                <a:latin typeface="Fira Code" panose="020B0509050000020004" pitchFamily="49" charset="0"/>
+              </a:rPr>
+              <a:t> = {</a:t>
+            </a:r>
+            <a:r>
+              <a:rPr lang="en-US" sz="1200" dirty="0" err="1">
+                <a:solidFill>
+                  <a:srgbClr val="C586C0"/>
+                </a:solidFill>
+                <a:latin typeface="Fira Code" panose="020B0509050000020004" pitchFamily="49" charset="0"/>
+              </a:rPr>
+              <a:t>param</a:t>
+            </a:r>
+            <a:r>
+              <a:rPr lang="en-US" sz="1200" dirty="0">
+                <a:solidFill>
+                  <a:srgbClr val="569CD6"/>
+                </a:solidFill>
+                <a:latin typeface="Fira Code" panose="020B0509050000020004" pitchFamily="49" charset="0"/>
+              </a:rPr>
+              <a:t>(</a:t>
+            </a:r>
+            <a:r>
+              <a:rPr lang="en-US" sz="1200" dirty="0">
+                <a:solidFill>
+                  <a:srgbClr val="9CDCFE"/>
+                </a:solidFill>
+                <a:latin typeface="Fira Code" panose="020B0509050000020004" pitchFamily="49" charset="0"/>
+              </a:rPr>
+              <a:t>[bool]</a:t>
+            </a:r>
+            <a:r>
+              <a:rPr lang="en-US" sz="1200" dirty="0">
+                <a:solidFill>
+                  <a:srgbClr val="569CD6"/>
+                </a:solidFill>
+                <a:latin typeface="Fira Code" panose="020B0509050000020004" pitchFamily="49" charset="0"/>
+              </a:rPr>
+              <a:t>$</a:t>
+            </a:r>
+            <a:r>
+              <a:rPr lang="en-US" sz="1200" dirty="0">
+                <a:solidFill>
+                  <a:srgbClr val="9CDCFE"/>
+                </a:solidFill>
+                <a:latin typeface="Fira Code" panose="020B0509050000020004" pitchFamily="49" charset="0"/>
+              </a:rPr>
+              <a:t>testing</a:t>
+            </a:r>
+            <a:r>
+              <a:rPr lang="en-US" sz="1200" dirty="0">
+                <a:solidFill>
+                  <a:srgbClr val="569CD6"/>
+                </a:solidFill>
+                <a:latin typeface="Fira Code" panose="020B0509050000020004" pitchFamily="49" charset="0"/>
+              </a:rPr>
+              <a:t>)</a:t>
+            </a:r>
+            <a:r>
+              <a:rPr lang="en-US" sz="1200" dirty="0">
+                <a:solidFill>
+                  <a:srgbClr val="D4D4D4"/>
+                </a:solidFill>
+                <a:latin typeface="Fira Code" panose="020B0509050000020004" pitchFamily="49" charset="0"/>
+              </a:rPr>
+              <a:t> </a:t>
+            </a:r>
+          </a:p>
+          <a:p>
+            <a:r>
+              <a:rPr lang="en-US" sz="1200" dirty="0">
+                <a:solidFill>
+                  <a:srgbClr val="D4D4D4"/>
+                </a:solidFill>
+                <a:latin typeface="Fira Code" panose="020B0509050000020004" pitchFamily="49" charset="0"/>
+              </a:rPr>
+              <a:t>    </a:t>
+            </a:r>
+            <a:r>
+              <a:rPr lang="en-US" sz="1200" dirty="0">
+                <a:solidFill>
+                  <a:srgbClr val="C586C0"/>
+                </a:solidFill>
+                <a:latin typeface="Fira Code" panose="020B0509050000020004" pitchFamily="49" charset="0"/>
+              </a:rPr>
+              <a:t>if</a:t>
+            </a:r>
+            <a:r>
+              <a:rPr lang="en-US" sz="1200" dirty="0">
+                <a:solidFill>
+                  <a:srgbClr val="D4D4D4"/>
+                </a:solidFill>
+                <a:latin typeface="Fira Code" panose="020B0509050000020004" pitchFamily="49" charset="0"/>
+              </a:rPr>
+              <a:t> </a:t>
+            </a:r>
+            <a:r>
+              <a:rPr lang="en-US" sz="1200" dirty="0">
+                <a:solidFill>
+                  <a:srgbClr val="569CD6"/>
+                </a:solidFill>
+                <a:latin typeface="Fira Code" panose="020B0509050000020004" pitchFamily="49" charset="0"/>
+              </a:rPr>
+              <a:t>($</a:t>
+            </a:r>
+            <a:r>
+              <a:rPr lang="en-US" sz="1200" dirty="0">
+                <a:solidFill>
+                  <a:srgbClr val="9CDCFE"/>
+                </a:solidFill>
+                <a:latin typeface="Fira Code" panose="020B0509050000020004" pitchFamily="49" charset="0"/>
+              </a:rPr>
+              <a:t>testing</a:t>
+            </a:r>
+            <a:r>
+              <a:rPr lang="en-US" sz="1200" dirty="0">
+                <a:solidFill>
+                  <a:srgbClr val="569CD6"/>
+                </a:solidFill>
+                <a:latin typeface="Fira Code" panose="020B0509050000020004" pitchFamily="49" charset="0"/>
+              </a:rPr>
+              <a:t>)</a:t>
+            </a:r>
+            <a:r>
+              <a:rPr lang="en-US" sz="1200" dirty="0">
+                <a:solidFill>
+                  <a:srgbClr val="D4D4D4"/>
+                </a:solidFill>
+                <a:latin typeface="Fira Code" panose="020B0509050000020004" pitchFamily="49" charset="0"/>
+              </a:rPr>
+              <a:t> {</a:t>
+            </a:r>
+          </a:p>
+          <a:p>
+            <a:r>
+              <a:rPr lang="en-US" sz="1200" dirty="0">
+                <a:solidFill>
+                  <a:srgbClr val="D4D4D4"/>
+                </a:solidFill>
+                <a:latin typeface="Fira Code" panose="020B0509050000020004" pitchFamily="49" charset="0"/>
+              </a:rPr>
+              <a:t>        </a:t>
+            </a:r>
+            <a:r>
+              <a:rPr lang="en-US" sz="1200" dirty="0">
+                <a:solidFill>
+                  <a:srgbClr val="DCDCAA"/>
+                </a:solidFill>
+                <a:latin typeface="Fira Code" panose="020B0509050000020004" pitchFamily="49" charset="0"/>
+              </a:rPr>
+              <a:t>Write-Output</a:t>
+            </a:r>
+            <a:r>
+              <a:rPr lang="en-US" sz="1200" dirty="0">
+                <a:solidFill>
+                  <a:srgbClr val="D4D4D4"/>
+                </a:solidFill>
+                <a:latin typeface="Fira Code" panose="020B0509050000020004" pitchFamily="49" charset="0"/>
+              </a:rPr>
+              <a:t> </a:t>
+            </a:r>
+            <a:r>
+              <a:rPr lang="en-US" sz="1200" dirty="0">
+                <a:solidFill>
+                  <a:srgbClr val="CE9178"/>
+                </a:solidFill>
+                <a:latin typeface="Fira Code" panose="020B0509050000020004" pitchFamily="49" charset="0"/>
+              </a:rPr>
+              <a:t>'</a:t>
+            </a:r>
+            <a:r>
+              <a:rPr lang="en-US" sz="1200" dirty="0" err="1">
+                <a:solidFill>
+                  <a:srgbClr val="CE9178"/>
+                </a:solidFill>
+                <a:latin typeface="Fira Code" panose="020B0509050000020004" pitchFamily="49" charset="0"/>
+              </a:rPr>
+              <a:t>TestHostName</a:t>
+            </a:r>
+            <a:r>
+              <a:rPr lang="en-US" sz="1200" dirty="0">
+                <a:solidFill>
+                  <a:srgbClr val="CE9178"/>
+                </a:solidFill>
+                <a:latin typeface="Fira Code" panose="020B0509050000020004" pitchFamily="49" charset="0"/>
+              </a:rPr>
+              <a:t>'</a:t>
+            </a:r>
+            <a:endParaRPr lang="en-US" sz="1200" dirty="0">
+              <a:solidFill>
+                <a:srgbClr val="D4D4D4"/>
+              </a:solidFill>
+              <a:latin typeface="Fira Code" panose="020B0509050000020004" pitchFamily="49" charset="0"/>
+            </a:endParaRPr>
+          </a:p>
+          <a:p>
+            <a:r>
+              <a:rPr lang="en-US" sz="1200" dirty="0">
+                <a:solidFill>
+                  <a:srgbClr val="D4D4D4"/>
+                </a:solidFill>
+                <a:latin typeface="Fira Code" panose="020B0509050000020004" pitchFamily="49" charset="0"/>
+              </a:rPr>
+              <a:t>    }</a:t>
+            </a:r>
+          </a:p>
+          <a:p>
+            <a:r>
+              <a:rPr lang="en-US" sz="1200" dirty="0">
+                <a:solidFill>
+                  <a:srgbClr val="D4D4D4"/>
+                </a:solidFill>
+                <a:latin typeface="Fira Code" panose="020B0509050000020004" pitchFamily="49" charset="0"/>
+              </a:rPr>
+              <a:t>    </a:t>
+            </a:r>
+            <a:r>
+              <a:rPr lang="en-US" sz="1200" dirty="0">
+                <a:solidFill>
+                  <a:srgbClr val="C586C0"/>
+                </a:solidFill>
+                <a:latin typeface="Fira Code" panose="020B0509050000020004" pitchFamily="49" charset="0"/>
+              </a:rPr>
+              <a:t>else</a:t>
+            </a:r>
+            <a:r>
+              <a:rPr lang="en-US" sz="1200" dirty="0">
+                <a:solidFill>
+                  <a:srgbClr val="D4D4D4"/>
+                </a:solidFill>
+                <a:latin typeface="Fira Code" panose="020B0509050000020004" pitchFamily="49" charset="0"/>
+              </a:rPr>
+              <a:t> {</a:t>
+            </a:r>
+          </a:p>
+          <a:p>
+            <a:r>
+              <a:rPr lang="en-US" sz="1200" dirty="0">
+                <a:solidFill>
+                  <a:srgbClr val="D4D4D4"/>
+                </a:solidFill>
+                <a:latin typeface="Fira Code" panose="020B0509050000020004" pitchFamily="49" charset="0"/>
+              </a:rPr>
+              <a:t>        HOSTNAME</a:t>
+            </a:r>
+          </a:p>
+          <a:p>
+            <a:r>
+              <a:rPr lang="en-US" sz="1200" dirty="0">
+                <a:solidFill>
+                  <a:srgbClr val="D4D4D4"/>
+                </a:solidFill>
+                <a:latin typeface="Fira Code" panose="020B0509050000020004" pitchFamily="49" charset="0"/>
+              </a:rPr>
+              <a:t>    }</a:t>
+            </a:r>
+          </a:p>
+          <a:p>
+            <a:r>
+              <a:rPr lang="en-US" sz="1200" dirty="0">
+                <a:solidFill>
+                  <a:srgbClr val="D4D4D4"/>
+                </a:solidFill>
+                <a:latin typeface="Fira Code" panose="020B0509050000020004" pitchFamily="49" charset="0"/>
+              </a:rPr>
+              <a:t>}</a:t>
+            </a:r>
+          </a:p>
+          <a:p>
+            <a:br>
+              <a:rPr lang="en-US" sz="1200" dirty="0">
+                <a:solidFill>
+                  <a:srgbClr val="D4D4D4"/>
+                </a:solidFill>
+                <a:latin typeface="Fira Code" panose="020B0509050000020004" pitchFamily="49" charset="0"/>
+              </a:rPr>
+            </a:br>
+            <a:endParaRPr lang="en-US" sz="1200" b="0" dirty="0">
+              <a:solidFill>
+                <a:srgbClr val="D4D4D4"/>
+              </a:solidFill>
+              <a:effectLst/>
+              <a:latin typeface="Fira Code" panose="020B0509050000020004" pitchFamily="49" charset="0"/>
+            </a:endParaRPr>
+          </a:p>
+        </p:txBody>
+      </p:sp>
+      <p:sp>
+        <p:nvSpPr>
+          <p:cNvPr id="11" name="TextBox 10"/>
+          <p:cNvSpPr txBox="1"/>
+          <p:nvPr/>
+        </p:nvSpPr>
+        <p:spPr>
+          <a:xfrm>
+            <a:off x="2595338" y="3258252"/>
+            <a:ext cx="6227987" cy="1384995"/>
+          </a:xfrm>
+          <a:prstGeom prst="rect">
+            <a:avLst/>
+          </a:prstGeom>
+          <a:solidFill>
+            <a:schemeClr val="bg2">
+              <a:lumMod val="50000"/>
+            </a:schemeClr>
+          </a:solidFill>
+          <a:ln w="76200">
+            <a:solidFill>
+              <a:schemeClr val="bg2">
+                <a:lumMod val="50000"/>
+              </a:schemeClr>
+            </a:solidFill>
+          </a:ln>
+        </p:spPr>
+        <p:txBody>
+          <a:bodyPr wrap="none" rtlCol="0">
+            <a:spAutoFit/>
+          </a:bodyPr>
+          <a:lstStyle/>
+          <a:p>
+            <a:r>
+              <a:rPr lang="en-US" sz="1200" dirty="0">
+                <a:solidFill>
+                  <a:schemeClr val="bg1">
+                    <a:lumMod val="65000"/>
+                  </a:schemeClr>
+                </a:solidFill>
+                <a:latin typeface="Fira Code" panose="020B0509050000020004" pitchFamily="49" charset="0"/>
+              </a:rPr>
+              <a:t>PS &gt; </a:t>
+            </a:r>
+            <a:r>
+              <a:rPr lang="en-US" sz="1200" dirty="0">
+                <a:solidFill>
+                  <a:srgbClr val="DCDCAA"/>
+                </a:solidFill>
+                <a:latin typeface="Fira Code" panose="020B0509050000020004" pitchFamily="49" charset="0"/>
+              </a:rPr>
+              <a:t>Invoke-Command</a:t>
+            </a:r>
+            <a:r>
+              <a:rPr lang="en-US" sz="1200" dirty="0">
+                <a:solidFill>
+                  <a:srgbClr val="D4D4D4"/>
+                </a:solidFill>
+                <a:latin typeface="Fira Code" panose="020B0509050000020004" pitchFamily="49" charset="0"/>
+              </a:rPr>
+              <a:t> -</a:t>
+            </a:r>
+            <a:r>
+              <a:rPr lang="en-US" sz="1200" dirty="0" err="1">
+                <a:solidFill>
+                  <a:srgbClr val="D4D4D4"/>
+                </a:solidFill>
+                <a:latin typeface="Fira Code" panose="020B0509050000020004" pitchFamily="49" charset="0"/>
+              </a:rPr>
+              <a:t>ScriptBlock</a:t>
+            </a:r>
+            <a:r>
+              <a:rPr lang="en-US" sz="1200" dirty="0">
+                <a:solidFill>
+                  <a:srgbClr val="D4D4D4"/>
+                </a:solidFill>
+                <a:latin typeface="Fira Code" panose="020B0509050000020004" pitchFamily="49" charset="0"/>
+              </a:rPr>
+              <a:t> </a:t>
+            </a:r>
+            <a:r>
+              <a:rPr lang="en-US" sz="1200" dirty="0">
+                <a:solidFill>
+                  <a:srgbClr val="569CD6"/>
+                </a:solidFill>
+                <a:latin typeface="Fira Code" panose="020B0509050000020004" pitchFamily="49" charset="0"/>
+              </a:rPr>
+              <a:t>$</a:t>
+            </a:r>
+            <a:r>
+              <a:rPr lang="en-US" sz="1200" dirty="0" err="1">
+                <a:solidFill>
+                  <a:srgbClr val="9CDCFE"/>
+                </a:solidFill>
+                <a:latin typeface="Fira Code" panose="020B0509050000020004" pitchFamily="49" charset="0"/>
+              </a:rPr>
+              <a:t>scriptblock</a:t>
+            </a:r>
+            <a:endParaRPr lang="en-US" sz="1200" dirty="0">
+              <a:solidFill>
+                <a:srgbClr val="D4D4D4"/>
+              </a:solidFill>
+              <a:latin typeface="Fira Code" panose="020B0509050000020004" pitchFamily="49" charset="0"/>
+            </a:endParaRPr>
+          </a:p>
+          <a:p>
+            <a:endParaRPr lang="en-US" sz="1200" dirty="0">
+              <a:solidFill>
+                <a:schemeClr val="bg1">
+                  <a:lumMod val="65000"/>
+                </a:schemeClr>
+              </a:solidFill>
+              <a:latin typeface="Fira Code" panose="020B0509050000020004" pitchFamily="49" charset="0"/>
+            </a:endParaRPr>
+          </a:p>
+          <a:p>
+            <a:r>
+              <a:rPr lang="en-US" sz="1200" dirty="0">
+                <a:solidFill>
+                  <a:schemeClr val="bg1">
+                    <a:lumMod val="65000"/>
+                  </a:schemeClr>
+                </a:solidFill>
+                <a:latin typeface="Fira Code" panose="020B0509050000020004" pitchFamily="49" charset="0"/>
+              </a:rPr>
+              <a:t>USHOLCHU1-L</a:t>
+            </a:r>
+          </a:p>
+          <a:p>
+            <a:endParaRPr lang="en-US" sz="1200" dirty="0">
+              <a:solidFill>
+                <a:schemeClr val="bg1">
+                  <a:lumMod val="65000"/>
+                </a:schemeClr>
+              </a:solidFill>
+              <a:latin typeface="Fira Code" panose="020B0509050000020004" pitchFamily="49" charset="0"/>
+            </a:endParaRPr>
+          </a:p>
+          <a:p>
+            <a:r>
+              <a:rPr lang="en-US" sz="1200" dirty="0">
+                <a:solidFill>
+                  <a:schemeClr val="bg1">
+                    <a:lumMod val="65000"/>
+                  </a:schemeClr>
+                </a:solidFill>
+                <a:latin typeface="Fira Code" panose="020B0509050000020004" pitchFamily="49" charset="0"/>
+              </a:rPr>
+              <a:t>PS &gt; </a:t>
+            </a:r>
+            <a:r>
+              <a:rPr lang="en-US" sz="1200" dirty="0">
+                <a:solidFill>
+                  <a:srgbClr val="DCDCAA"/>
+                </a:solidFill>
+                <a:latin typeface="Fira Code" panose="020B0509050000020004" pitchFamily="49" charset="0"/>
+              </a:rPr>
+              <a:t>Invoke-Command</a:t>
+            </a:r>
+            <a:r>
+              <a:rPr lang="en-US" sz="1200" dirty="0">
+                <a:solidFill>
+                  <a:srgbClr val="D4D4D4"/>
+                </a:solidFill>
+                <a:latin typeface="Fira Code" panose="020B0509050000020004" pitchFamily="49" charset="0"/>
+              </a:rPr>
+              <a:t> -</a:t>
+            </a:r>
+            <a:r>
+              <a:rPr lang="en-US" sz="1200" dirty="0" err="1">
+                <a:solidFill>
+                  <a:srgbClr val="D4D4D4"/>
+                </a:solidFill>
+                <a:latin typeface="Fira Code" panose="020B0509050000020004" pitchFamily="49" charset="0"/>
+              </a:rPr>
+              <a:t>ScriptBlock</a:t>
+            </a:r>
+            <a:r>
+              <a:rPr lang="en-US" sz="1200" dirty="0">
+                <a:solidFill>
+                  <a:srgbClr val="D4D4D4"/>
+                </a:solidFill>
+                <a:latin typeface="Fira Code" panose="020B0509050000020004" pitchFamily="49" charset="0"/>
+              </a:rPr>
+              <a:t> </a:t>
+            </a:r>
+            <a:r>
+              <a:rPr lang="en-US" sz="1200" dirty="0">
+                <a:solidFill>
+                  <a:srgbClr val="569CD6"/>
+                </a:solidFill>
+                <a:latin typeface="Fira Code" panose="020B0509050000020004" pitchFamily="49" charset="0"/>
+              </a:rPr>
+              <a:t>$</a:t>
+            </a:r>
+            <a:r>
+              <a:rPr lang="en-US" sz="1200" dirty="0" err="1">
+                <a:solidFill>
+                  <a:srgbClr val="9CDCFE"/>
+                </a:solidFill>
+                <a:latin typeface="Fira Code" panose="020B0509050000020004" pitchFamily="49" charset="0"/>
+              </a:rPr>
+              <a:t>scriptblock</a:t>
+            </a:r>
+            <a:r>
+              <a:rPr lang="en-US" sz="1200" dirty="0">
+                <a:solidFill>
+                  <a:srgbClr val="D4D4D4"/>
+                </a:solidFill>
+                <a:latin typeface="Fira Code" panose="020B0509050000020004" pitchFamily="49" charset="0"/>
+              </a:rPr>
+              <a:t> -</a:t>
+            </a:r>
+            <a:r>
+              <a:rPr lang="en-US" sz="1200" dirty="0" err="1">
+                <a:solidFill>
+                  <a:srgbClr val="D4D4D4"/>
+                </a:solidFill>
+                <a:latin typeface="Fira Code" panose="020B0509050000020004" pitchFamily="49" charset="0"/>
+              </a:rPr>
+              <a:t>ArgumentList</a:t>
+            </a:r>
+            <a:r>
+              <a:rPr lang="en-US" sz="1200" dirty="0">
+                <a:solidFill>
+                  <a:srgbClr val="D4D4D4"/>
+                </a:solidFill>
+                <a:latin typeface="Fira Code" panose="020B0509050000020004" pitchFamily="49" charset="0"/>
+              </a:rPr>
+              <a:t> </a:t>
+            </a:r>
+            <a:r>
+              <a:rPr lang="en-US" sz="1200" dirty="0">
+                <a:solidFill>
+                  <a:srgbClr val="569CD6"/>
+                </a:solidFill>
+                <a:latin typeface="Fira Code" panose="020B0509050000020004" pitchFamily="49" charset="0"/>
+              </a:rPr>
+              <a:t>$true</a:t>
+            </a:r>
+            <a:endParaRPr lang="en-US" sz="1200" dirty="0">
+              <a:solidFill>
+                <a:srgbClr val="D4D4D4"/>
+              </a:solidFill>
+              <a:latin typeface="Fira Code" panose="020B0509050000020004" pitchFamily="49" charset="0"/>
+            </a:endParaRPr>
+          </a:p>
+          <a:p>
+            <a:endParaRPr lang="en-US" sz="1200" dirty="0">
+              <a:solidFill>
+                <a:schemeClr val="bg1">
+                  <a:lumMod val="65000"/>
+                </a:schemeClr>
+              </a:solidFill>
+              <a:latin typeface="Fira Code" panose="020B0509050000020004" pitchFamily="49" charset="0"/>
+            </a:endParaRPr>
+          </a:p>
+          <a:p>
+            <a:r>
+              <a:rPr lang="en-US" sz="1200" dirty="0" err="1">
+                <a:solidFill>
+                  <a:schemeClr val="bg1">
+                    <a:lumMod val="65000"/>
+                  </a:schemeClr>
+                </a:solidFill>
+                <a:latin typeface="Fira Code" panose="020B0509050000020004" pitchFamily="49" charset="0"/>
+              </a:rPr>
+              <a:t>TestHostName</a:t>
+            </a:r>
+            <a:endParaRPr lang="en-US" sz="1200" dirty="0">
+              <a:solidFill>
+                <a:schemeClr val="bg1">
+                  <a:lumMod val="65000"/>
+                </a:schemeClr>
+              </a:solidFill>
+              <a:latin typeface="Fira Code" panose="020B0509050000020004" pitchFamily="49" charset="0"/>
+            </a:endParaRPr>
+          </a:p>
+        </p:txBody>
+      </p:sp>
+    </p:spTree>
+    <p:extLst>
+      <p:ext uri="{BB962C8B-B14F-4D97-AF65-F5344CB8AC3E}">
+        <p14:creationId xmlns:p14="http://schemas.microsoft.com/office/powerpoint/2010/main" val="2146753326"/>
+      </p:ext>
+    </p:extLst>
+  </p:cSld>
+  <p:clrMapOvr>
+    <a:masterClrMapping/>
+  </p:clrMapOvr>
+</p:sld>
+</file>
+
+<file path=ppt/slides/slide18.xml><?xml version="1.0" encoding="utf-8"?>
 <p:sld xmlns:a="http://schemas.openxmlformats.org/drawingml/2006/main" xmlns:r="http://schemas.openxmlformats.org/officeDocument/2006/relationships" xmlns:p="http://schemas.openxmlformats.org/presentationml/2006/main">
   <p:cSld>
     <p:spTree>
@@ -16361,7 +17424,7 @@
 </p:sld>
 </file>
 
-<file path=ppt/slides/slide18.xml><?xml version="1.0" encoding="utf-8"?>
+<file path=ppt/slides/slide19.xml><?xml version="1.0" encoding="utf-8"?>
 <p:sld xmlns:a="http://schemas.openxmlformats.org/drawingml/2006/main" xmlns:r="http://schemas.openxmlformats.org/officeDocument/2006/relationships" xmlns:p="http://schemas.openxmlformats.org/presentationml/2006/main">
   <p:cSld>
     <p:spTree>
@@ -16708,7 +17771,362 @@
 </p:sld>
 </file>
 
-<file path=ppt/slides/slide19.xml><?xml version="1.0" encoding="utf-8"?>
+<file path=ppt/slides/slide2.xml><?xml version="1.0" encoding="utf-8"?>
+<p:sld xmlns:a="http://schemas.openxmlformats.org/drawingml/2006/main" xmlns:r="http://schemas.openxmlformats.org/officeDocument/2006/relationships" xmlns:p="http://schemas.openxmlformats.org/presentationml/2006/main">
+  <p:cSld>
+    <p:spTree>
+      <p:nvGrpSpPr>
+        <p:cNvPr id="1" name=""/>
+        <p:cNvGrpSpPr/>
+        <p:nvPr/>
+      </p:nvGrpSpPr>
+      <p:grpSpPr>
+        <a:xfrm>
+          <a:off x="0" y="0"/>
+          <a:ext cx="0" cy="0"/>
+          <a:chOff x="0" y="0"/>
+          <a:chExt cx="0" cy="0"/>
+        </a:xfrm>
+      </p:grpSpPr>
+      <p:sp>
+        <p:nvSpPr>
+          <p:cNvPr id="2" name="Text Placeholder 1"/>
+          <p:cNvSpPr>
+            <a:spLocks noGrp="1"/>
+          </p:cNvSpPr>
+          <p:nvPr>
+            <p:ph type="body" sz="quarter" idx="12"/>
+          </p:nvPr>
+        </p:nvSpPr>
+        <p:spPr>
+          <a:xfrm>
+            <a:off x="519978" y="1096510"/>
+            <a:ext cx="7983942" cy="930410"/>
+          </a:xfrm>
+        </p:spPr>
+        <p:txBody>
+          <a:bodyPr/>
+          <a:lstStyle/>
+          <a:p>
+            <a:pPr lvl="1" algn="ctr"/>
+            <a:r>
+              <a:rPr lang="en-GB" sz="4000" dirty="0">
+                <a:latin typeface="Interstate-Black"/>
+                <a:cs typeface="Interstate-Black"/>
+              </a:rPr>
+              <a:t>Windows @ Ticketmaster</a:t>
+            </a:r>
+          </a:p>
+        </p:txBody>
+      </p:sp>
+      <p:sp>
+        <p:nvSpPr>
+          <p:cNvPr id="3" name="TextBox 2"/>
+          <p:cNvSpPr txBox="1"/>
+          <p:nvPr/>
+        </p:nvSpPr>
+        <p:spPr>
+          <a:xfrm>
+            <a:off x="1519414" y="2049780"/>
+            <a:ext cx="1228478" cy="461665"/>
+          </a:xfrm>
+          <a:prstGeom prst="rect">
+            <a:avLst/>
+          </a:prstGeom>
+          <a:noFill/>
+        </p:spPr>
+        <p:txBody>
+          <a:bodyPr wrap="none" rtlCol="0">
+            <a:spAutoFit/>
+          </a:bodyPr>
+          <a:lstStyle/>
+          <a:p>
+            <a:r>
+              <a:rPr lang="en-US" sz="2400" dirty="0">
+                <a:latin typeface="TM Sans"/>
+                <a:cs typeface="TM Sans"/>
+              </a:rPr>
+              <a:t>Physical</a:t>
+            </a:r>
+          </a:p>
+        </p:txBody>
+      </p:sp>
+      <p:sp>
+        <p:nvSpPr>
+          <p:cNvPr id="6" name="TextBox 5"/>
+          <p:cNvSpPr txBox="1"/>
+          <p:nvPr/>
+        </p:nvSpPr>
+        <p:spPr>
+          <a:xfrm>
+            <a:off x="2189974" y="2606040"/>
+            <a:ext cx="1949893" cy="461665"/>
+          </a:xfrm>
+          <a:prstGeom prst="rect">
+            <a:avLst/>
+          </a:prstGeom>
+          <a:noFill/>
+        </p:spPr>
+        <p:txBody>
+          <a:bodyPr wrap="none" rtlCol="0">
+            <a:spAutoFit/>
+          </a:bodyPr>
+          <a:lstStyle/>
+          <a:p>
+            <a:r>
+              <a:rPr lang="en-US" sz="2400" dirty="0">
+                <a:latin typeface="TM Sans"/>
+                <a:cs typeface="TM Sans"/>
+              </a:rPr>
+              <a:t>Private Cloud</a:t>
+            </a:r>
+          </a:p>
+        </p:txBody>
+      </p:sp>
+      <p:sp>
+        <p:nvSpPr>
+          <p:cNvPr id="7" name="TextBox 6"/>
+          <p:cNvSpPr txBox="1"/>
+          <p:nvPr/>
+        </p:nvSpPr>
+        <p:spPr>
+          <a:xfrm>
+            <a:off x="3217980" y="3253740"/>
+            <a:ext cx="1843774" cy="461665"/>
+          </a:xfrm>
+          <a:prstGeom prst="rect">
+            <a:avLst/>
+          </a:prstGeom>
+          <a:noFill/>
+        </p:spPr>
+        <p:txBody>
+          <a:bodyPr wrap="none" rtlCol="0">
+            <a:spAutoFit/>
+          </a:bodyPr>
+          <a:lstStyle/>
+          <a:p>
+            <a:r>
+              <a:rPr lang="en-US" sz="2400" dirty="0">
+                <a:latin typeface="TM Sans"/>
+                <a:cs typeface="TM Sans"/>
+              </a:rPr>
+              <a:t>Public Cloud</a:t>
+            </a:r>
+          </a:p>
+        </p:txBody>
+      </p:sp>
+      <p:sp>
+        <p:nvSpPr>
+          <p:cNvPr id="8" name="TextBox 7"/>
+          <p:cNvSpPr txBox="1"/>
+          <p:nvPr/>
+        </p:nvSpPr>
+        <p:spPr>
+          <a:xfrm>
+            <a:off x="4139867" y="2327910"/>
+            <a:ext cx="1114536" cy="461665"/>
+          </a:xfrm>
+          <a:prstGeom prst="rect">
+            <a:avLst/>
+          </a:prstGeom>
+          <a:noFill/>
+        </p:spPr>
+        <p:txBody>
+          <a:bodyPr wrap="none" rtlCol="0">
+            <a:spAutoFit/>
+          </a:bodyPr>
+          <a:lstStyle/>
+          <a:p>
+            <a:r>
+              <a:rPr lang="en-US" sz="2400" dirty="0">
+                <a:latin typeface="TM Sans"/>
+                <a:cs typeface="TM Sans"/>
+              </a:rPr>
+              <a:t>Docker</a:t>
+            </a:r>
+          </a:p>
+        </p:txBody>
+      </p:sp>
+      <p:sp>
+        <p:nvSpPr>
+          <p:cNvPr id="9" name="TextBox 8"/>
+          <p:cNvSpPr txBox="1"/>
+          <p:nvPr/>
+        </p:nvSpPr>
+        <p:spPr>
+          <a:xfrm>
+            <a:off x="1808147" y="3484572"/>
+            <a:ext cx="1071255" cy="461665"/>
+          </a:xfrm>
+          <a:prstGeom prst="rect">
+            <a:avLst/>
+          </a:prstGeom>
+          <a:noFill/>
+        </p:spPr>
+        <p:txBody>
+          <a:bodyPr wrap="none" rtlCol="0">
+            <a:spAutoFit/>
+          </a:bodyPr>
+          <a:lstStyle/>
+          <a:p>
+            <a:r>
+              <a:rPr lang="en-US" sz="2400" dirty="0">
+                <a:latin typeface="TM Sans"/>
+                <a:cs typeface="TM Sans"/>
+              </a:rPr>
+              <a:t>Packer</a:t>
+            </a:r>
+          </a:p>
+        </p:txBody>
+      </p:sp>
+      <p:sp>
+        <p:nvSpPr>
+          <p:cNvPr id="10" name="TextBox 9"/>
+          <p:cNvSpPr txBox="1"/>
+          <p:nvPr/>
+        </p:nvSpPr>
+        <p:spPr>
+          <a:xfrm>
+            <a:off x="5254403" y="2954347"/>
+            <a:ext cx="1470339" cy="461665"/>
+          </a:xfrm>
+          <a:prstGeom prst="rect">
+            <a:avLst/>
+          </a:prstGeom>
+          <a:noFill/>
+        </p:spPr>
+        <p:txBody>
+          <a:bodyPr wrap="none" rtlCol="0">
+            <a:spAutoFit/>
+          </a:bodyPr>
+          <a:lstStyle/>
+          <a:p>
+            <a:r>
+              <a:rPr lang="en-US" sz="2400" dirty="0">
+                <a:latin typeface="TM Sans"/>
+                <a:cs typeface="TM Sans"/>
+              </a:rPr>
+              <a:t>Terraform</a:t>
+            </a:r>
+          </a:p>
+        </p:txBody>
+      </p:sp>
+      <p:sp>
+        <p:nvSpPr>
+          <p:cNvPr id="11" name="TextBox 10"/>
+          <p:cNvSpPr txBox="1"/>
+          <p:nvPr/>
+        </p:nvSpPr>
+        <p:spPr>
+          <a:xfrm>
+            <a:off x="5733957" y="2102484"/>
+            <a:ext cx="1447960" cy="461665"/>
+          </a:xfrm>
+          <a:prstGeom prst="rect">
+            <a:avLst/>
+          </a:prstGeom>
+          <a:noFill/>
+        </p:spPr>
+        <p:txBody>
+          <a:bodyPr wrap="none" rtlCol="0">
+            <a:spAutoFit/>
+          </a:bodyPr>
+          <a:lstStyle/>
+          <a:p>
+            <a:r>
+              <a:rPr lang="en-US" sz="2400" dirty="0" err="1">
+                <a:latin typeface="TM Sans"/>
+                <a:cs typeface="TM Sans"/>
+              </a:rPr>
+              <a:t>GitLab</a:t>
+            </a:r>
+            <a:r>
+              <a:rPr lang="en-US" sz="2400" dirty="0">
+                <a:latin typeface="TM Sans"/>
+                <a:cs typeface="TM Sans"/>
+              </a:rPr>
+              <a:t> CI</a:t>
+            </a:r>
+          </a:p>
+        </p:txBody>
+      </p:sp>
+      <p:sp>
+        <p:nvSpPr>
+          <p:cNvPr id="12" name="TextBox 11"/>
+          <p:cNvSpPr txBox="1"/>
+          <p:nvPr/>
+        </p:nvSpPr>
+        <p:spPr>
+          <a:xfrm>
+            <a:off x="7072721" y="3402388"/>
+            <a:ext cx="766557" cy="461665"/>
+          </a:xfrm>
+          <a:prstGeom prst="rect">
+            <a:avLst/>
+          </a:prstGeom>
+          <a:noFill/>
+        </p:spPr>
+        <p:txBody>
+          <a:bodyPr wrap="none" rtlCol="0">
+            <a:spAutoFit/>
+          </a:bodyPr>
+          <a:lstStyle/>
+          <a:p>
+            <a:r>
+              <a:rPr lang="en-US" sz="2400" dirty="0">
+                <a:latin typeface="TM Sans"/>
+                <a:cs typeface="TM Sans"/>
+              </a:rPr>
+              <a:t>DSC</a:t>
+            </a:r>
+          </a:p>
+        </p:txBody>
+      </p:sp>
+      <p:sp>
+        <p:nvSpPr>
+          <p:cNvPr id="13" name="TextBox 12"/>
+          <p:cNvSpPr txBox="1"/>
+          <p:nvPr/>
+        </p:nvSpPr>
+        <p:spPr>
+          <a:xfrm>
+            <a:off x="4519233" y="3826857"/>
+            <a:ext cx="1467068" cy="461665"/>
+          </a:xfrm>
+          <a:prstGeom prst="rect">
+            <a:avLst/>
+          </a:prstGeom>
+          <a:noFill/>
+        </p:spPr>
+        <p:txBody>
+          <a:bodyPr wrap="none" rtlCol="0">
+            <a:spAutoFit/>
+          </a:bodyPr>
+          <a:lstStyle/>
+          <a:p>
+            <a:r>
+              <a:rPr lang="en-US" sz="2400" dirty="0" err="1">
+                <a:latin typeface="TM Sans"/>
+                <a:cs typeface="TM Sans"/>
+              </a:rPr>
+              <a:t>PoshSpec</a:t>
+            </a:r>
+            <a:endParaRPr lang="en-US" sz="2400" dirty="0">
+              <a:latin typeface="TM Sans"/>
+              <a:cs typeface="TM Sans"/>
+            </a:endParaRPr>
+          </a:p>
+        </p:txBody>
+      </p:sp>
+    </p:spTree>
+  </p:cSld>
+  <p:clrMapOvr>
+    <a:masterClrMapping/>
+  </p:clrMapOvr>
+</p:sld>
+</file>
+
+<file path=ppt/slides/slide20.xml><?xml version="1.0" encoding="utf-8"?>
 <p:sld xmlns:a="http://schemas.openxmlformats.org/drawingml/2006/main" xmlns:r="http://schemas.openxmlformats.org/officeDocument/2006/relationships" xmlns:p="http://schemas.openxmlformats.org/presentationml/2006/main">
   <p:cSld>
     <p:spTree>
@@ -16977,362 +18395,7 @@
 </p:sld>
 </file>
 
-<file path=ppt/slides/slide2.xml><?xml version="1.0" encoding="utf-8"?>
-<p:sld xmlns:a="http://schemas.openxmlformats.org/drawingml/2006/main" xmlns:r="http://schemas.openxmlformats.org/officeDocument/2006/relationships" xmlns:p="http://schemas.openxmlformats.org/presentationml/2006/main">
-  <p:cSld>
-    <p:spTree>
-      <p:nvGrpSpPr>
-        <p:cNvPr id="1" name=""/>
-        <p:cNvGrpSpPr/>
-        <p:nvPr/>
-      </p:nvGrpSpPr>
-      <p:grpSpPr>
-        <a:xfrm>
-          <a:off x="0" y="0"/>
-          <a:ext cx="0" cy="0"/>
-          <a:chOff x="0" y="0"/>
-          <a:chExt cx="0" cy="0"/>
-        </a:xfrm>
-      </p:grpSpPr>
-      <p:sp>
-        <p:nvSpPr>
-          <p:cNvPr id="2" name="Text Placeholder 1"/>
-          <p:cNvSpPr>
-            <a:spLocks noGrp="1"/>
-          </p:cNvSpPr>
-          <p:nvPr>
-            <p:ph type="body" sz="quarter" idx="12"/>
-          </p:nvPr>
-        </p:nvSpPr>
-        <p:spPr>
-          <a:xfrm>
-            <a:off x="519978" y="1096510"/>
-            <a:ext cx="7983942" cy="930410"/>
-          </a:xfrm>
-        </p:spPr>
-        <p:txBody>
-          <a:bodyPr/>
-          <a:lstStyle/>
-          <a:p>
-            <a:pPr lvl="1" algn="ctr"/>
-            <a:r>
-              <a:rPr lang="en-GB" sz="4000" dirty="0">
-                <a:latin typeface="Interstate-Black"/>
-                <a:cs typeface="Interstate-Black"/>
-              </a:rPr>
-              <a:t>Windows @ Ticketmaster</a:t>
-            </a:r>
-          </a:p>
-        </p:txBody>
-      </p:sp>
-      <p:sp>
-        <p:nvSpPr>
-          <p:cNvPr id="3" name="TextBox 2"/>
-          <p:cNvSpPr txBox="1"/>
-          <p:nvPr/>
-        </p:nvSpPr>
-        <p:spPr>
-          <a:xfrm>
-            <a:off x="1519414" y="2049780"/>
-            <a:ext cx="1228478" cy="461665"/>
-          </a:xfrm>
-          <a:prstGeom prst="rect">
-            <a:avLst/>
-          </a:prstGeom>
-          <a:noFill/>
-        </p:spPr>
-        <p:txBody>
-          <a:bodyPr wrap="none" rtlCol="0">
-            <a:spAutoFit/>
-          </a:bodyPr>
-          <a:lstStyle/>
-          <a:p>
-            <a:r>
-              <a:rPr lang="en-US" sz="2400" dirty="0">
-                <a:latin typeface="TM Sans"/>
-                <a:cs typeface="TM Sans"/>
-              </a:rPr>
-              <a:t>Physical</a:t>
-            </a:r>
-          </a:p>
-        </p:txBody>
-      </p:sp>
-      <p:sp>
-        <p:nvSpPr>
-          <p:cNvPr id="6" name="TextBox 5"/>
-          <p:cNvSpPr txBox="1"/>
-          <p:nvPr/>
-        </p:nvSpPr>
-        <p:spPr>
-          <a:xfrm>
-            <a:off x="2189974" y="2606040"/>
-            <a:ext cx="1949893" cy="461665"/>
-          </a:xfrm>
-          <a:prstGeom prst="rect">
-            <a:avLst/>
-          </a:prstGeom>
-          <a:noFill/>
-        </p:spPr>
-        <p:txBody>
-          <a:bodyPr wrap="none" rtlCol="0">
-            <a:spAutoFit/>
-          </a:bodyPr>
-          <a:lstStyle/>
-          <a:p>
-            <a:r>
-              <a:rPr lang="en-US" sz="2400" dirty="0">
-                <a:latin typeface="TM Sans"/>
-                <a:cs typeface="TM Sans"/>
-              </a:rPr>
-              <a:t>Private Cloud</a:t>
-            </a:r>
-          </a:p>
-        </p:txBody>
-      </p:sp>
-      <p:sp>
-        <p:nvSpPr>
-          <p:cNvPr id="7" name="TextBox 6"/>
-          <p:cNvSpPr txBox="1"/>
-          <p:nvPr/>
-        </p:nvSpPr>
-        <p:spPr>
-          <a:xfrm>
-            <a:off x="3217980" y="3253740"/>
-            <a:ext cx="1843774" cy="461665"/>
-          </a:xfrm>
-          <a:prstGeom prst="rect">
-            <a:avLst/>
-          </a:prstGeom>
-          <a:noFill/>
-        </p:spPr>
-        <p:txBody>
-          <a:bodyPr wrap="none" rtlCol="0">
-            <a:spAutoFit/>
-          </a:bodyPr>
-          <a:lstStyle/>
-          <a:p>
-            <a:r>
-              <a:rPr lang="en-US" sz="2400" dirty="0">
-                <a:latin typeface="TM Sans"/>
-                <a:cs typeface="TM Sans"/>
-              </a:rPr>
-              <a:t>Public Cloud</a:t>
-            </a:r>
-          </a:p>
-        </p:txBody>
-      </p:sp>
-      <p:sp>
-        <p:nvSpPr>
-          <p:cNvPr id="8" name="TextBox 7"/>
-          <p:cNvSpPr txBox="1"/>
-          <p:nvPr/>
-        </p:nvSpPr>
-        <p:spPr>
-          <a:xfrm>
-            <a:off x="4139867" y="2327910"/>
-            <a:ext cx="1114536" cy="461665"/>
-          </a:xfrm>
-          <a:prstGeom prst="rect">
-            <a:avLst/>
-          </a:prstGeom>
-          <a:noFill/>
-        </p:spPr>
-        <p:txBody>
-          <a:bodyPr wrap="none" rtlCol="0">
-            <a:spAutoFit/>
-          </a:bodyPr>
-          <a:lstStyle/>
-          <a:p>
-            <a:r>
-              <a:rPr lang="en-US" sz="2400" dirty="0">
-                <a:latin typeface="TM Sans"/>
-                <a:cs typeface="TM Sans"/>
-              </a:rPr>
-              <a:t>Docker</a:t>
-            </a:r>
-          </a:p>
-        </p:txBody>
-      </p:sp>
-      <p:sp>
-        <p:nvSpPr>
-          <p:cNvPr id="9" name="TextBox 8"/>
-          <p:cNvSpPr txBox="1"/>
-          <p:nvPr/>
-        </p:nvSpPr>
-        <p:spPr>
-          <a:xfrm>
-            <a:off x="1808147" y="3484572"/>
-            <a:ext cx="1071255" cy="461665"/>
-          </a:xfrm>
-          <a:prstGeom prst="rect">
-            <a:avLst/>
-          </a:prstGeom>
-          <a:noFill/>
-        </p:spPr>
-        <p:txBody>
-          <a:bodyPr wrap="none" rtlCol="0">
-            <a:spAutoFit/>
-          </a:bodyPr>
-          <a:lstStyle/>
-          <a:p>
-            <a:r>
-              <a:rPr lang="en-US" sz="2400" dirty="0">
-                <a:latin typeface="TM Sans"/>
-                <a:cs typeface="TM Sans"/>
-              </a:rPr>
-              <a:t>Packer</a:t>
-            </a:r>
-          </a:p>
-        </p:txBody>
-      </p:sp>
-      <p:sp>
-        <p:nvSpPr>
-          <p:cNvPr id="10" name="TextBox 9"/>
-          <p:cNvSpPr txBox="1"/>
-          <p:nvPr/>
-        </p:nvSpPr>
-        <p:spPr>
-          <a:xfrm>
-            <a:off x="5254403" y="2954347"/>
-            <a:ext cx="1470339" cy="461665"/>
-          </a:xfrm>
-          <a:prstGeom prst="rect">
-            <a:avLst/>
-          </a:prstGeom>
-          <a:noFill/>
-        </p:spPr>
-        <p:txBody>
-          <a:bodyPr wrap="none" rtlCol="0">
-            <a:spAutoFit/>
-          </a:bodyPr>
-          <a:lstStyle/>
-          <a:p>
-            <a:r>
-              <a:rPr lang="en-US" sz="2400" dirty="0">
-                <a:latin typeface="TM Sans"/>
-                <a:cs typeface="TM Sans"/>
-              </a:rPr>
-              <a:t>Terraform</a:t>
-            </a:r>
-          </a:p>
-        </p:txBody>
-      </p:sp>
-      <p:sp>
-        <p:nvSpPr>
-          <p:cNvPr id="11" name="TextBox 10"/>
-          <p:cNvSpPr txBox="1"/>
-          <p:nvPr/>
-        </p:nvSpPr>
-        <p:spPr>
-          <a:xfrm>
-            <a:off x="5733957" y="2102484"/>
-            <a:ext cx="1447960" cy="461665"/>
-          </a:xfrm>
-          <a:prstGeom prst="rect">
-            <a:avLst/>
-          </a:prstGeom>
-          <a:noFill/>
-        </p:spPr>
-        <p:txBody>
-          <a:bodyPr wrap="none" rtlCol="0">
-            <a:spAutoFit/>
-          </a:bodyPr>
-          <a:lstStyle/>
-          <a:p>
-            <a:r>
-              <a:rPr lang="en-US" sz="2400" dirty="0" err="1">
-                <a:latin typeface="TM Sans"/>
-                <a:cs typeface="TM Sans"/>
-              </a:rPr>
-              <a:t>GitLab</a:t>
-            </a:r>
-            <a:r>
-              <a:rPr lang="en-US" sz="2400" dirty="0">
-                <a:latin typeface="TM Sans"/>
-                <a:cs typeface="TM Sans"/>
-              </a:rPr>
-              <a:t> CI</a:t>
-            </a:r>
-          </a:p>
-        </p:txBody>
-      </p:sp>
-      <p:sp>
-        <p:nvSpPr>
-          <p:cNvPr id="12" name="TextBox 11"/>
-          <p:cNvSpPr txBox="1"/>
-          <p:nvPr/>
-        </p:nvSpPr>
-        <p:spPr>
-          <a:xfrm>
-            <a:off x="7072721" y="3402388"/>
-            <a:ext cx="766557" cy="461665"/>
-          </a:xfrm>
-          <a:prstGeom prst="rect">
-            <a:avLst/>
-          </a:prstGeom>
-          <a:noFill/>
-        </p:spPr>
-        <p:txBody>
-          <a:bodyPr wrap="none" rtlCol="0">
-            <a:spAutoFit/>
-          </a:bodyPr>
-          <a:lstStyle/>
-          <a:p>
-            <a:r>
-              <a:rPr lang="en-US" sz="2400" dirty="0">
-                <a:latin typeface="TM Sans"/>
-                <a:cs typeface="TM Sans"/>
-              </a:rPr>
-              <a:t>DSC</a:t>
-            </a:r>
-          </a:p>
-        </p:txBody>
-      </p:sp>
-      <p:sp>
-        <p:nvSpPr>
-          <p:cNvPr id="13" name="TextBox 12"/>
-          <p:cNvSpPr txBox="1"/>
-          <p:nvPr/>
-        </p:nvSpPr>
-        <p:spPr>
-          <a:xfrm>
-            <a:off x="4519233" y="3826857"/>
-            <a:ext cx="1467068" cy="461665"/>
-          </a:xfrm>
-          <a:prstGeom prst="rect">
-            <a:avLst/>
-          </a:prstGeom>
-          <a:noFill/>
-        </p:spPr>
-        <p:txBody>
-          <a:bodyPr wrap="none" rtlCol="0">
-            <a:spAutoFit/>
-          </a:bodyPr>
-          <a:lstStyle/>
-          <a:p>
-            <a:r>
-              <a:rPr lang="en-US" sz="2400" dirty="0" err="1">
-                <a:latin typeface="TM Sans"/>
-                <a:cs typeface="TM Sans"/>
-              </a:rPr>
-              <a:t>PoshSpec</a:t>
-            </a:r>
-            <a:endParaRPr lang="en-US" sz="2400" dirty="0">
-              <a:latin typeface="TM Sans"/>
-              <a:cs typeface="TM Sans"/>
-            </a:endParaRPr>
-          </a:p>
-        </p:txBody>
-      </p:sp>
-    </p:spTree>
-  </p:cSld>
-  <p:clrMapOvr>
-    <a:masterClrMapping/>
-  </p:clrMapOvr>
-</p:sld>
-</file>
-
-<file path=ppt/slides/slide20.xml><?xml version="1.0" encoding="utf-8"?>
+<file path=ppt/slides/slide21.xml><?xml version="1.0" encoding="utf-8"?>
 <p:sld xmlns:a="http://schemas.openxmlformats.org/drawingml/2006/main" xmlns:r="http://schemas.openxmlformats.org/officeDocument/2006/relationships" xmlns:p="http://schemas.openxmlformats.org/presentationml/2006/main">
   <p:cSld>
     <p:spTree>
@@ -17499,7 +18562,7 @@
 </p:sld>
 </file>
 
-<file path=ppt/slides/slide21.xml><?xml version="1.0" encoding="utf-8"?>
+<file path=ppt/slides/slide22.xml><?xml version="1.0" encoding="utf-8"?>
 <p:sld xmlns:a="http://schemas.openxmlformats.org/drawingml/2006/main" xmlns:r="http://schemas.openxmlformats.org/officeDocument/2006/relationships" xmlns:p="http://schemas.openxmlformats.org/presentationml/2006/main">
   <p:cSld>
     <p:spTree>

</xml_diff>

<commit_message>
Updated list of Technologies
</commit_message>
<xml_diff>
--- a/Summit2017_Mocking.pptx
+++ b/Summit2017_Mocking.pptx
@@ -17610,7 +17610,7 @@
         </p:nvSpPr>
         <p:spPr>
           <a:xfrm>
-            <a:off x="2650718" y="2606040"/>
+            <a:off x="2895570" y="2616536"/>
             <a:ext cx="680251" cy="461665"/>
           </a:xfrm>
           <a:prstGeom prst="rect">
@@ -17706,7 +17706,7 @@
         </p:nvSpPr>
         <p:spPr>
           <a:xfrm>
-            <a:off x="1808147" y="3484572"/>
+            <a:off x="1671024" y="3381299"/>
             <a:ext cx="1071255" cy="461665"/>
           </a:xfrm>
           <a:prstGeom prst="rect">
@@ -17809,7 +17809,7 @@
         </p:nvSpPr>
         <p:spPr>
           <a:xfrm>
-            <a:off x="7072721" y="3402388"/>
+            <a:off x="7781369" y="3420368"/>
             <a:ext cx="766557" cy="461665"/>
           </a:xfrm>
           <a:prstGeom prst="rect">
@@ -17841,7 +17841,7 @@
         </p:nvSpPr>
         <p:spPr>
           <a:xfrm>
-            <a:off x="4519233" y="3826857"/>
+            <a:off x="4522504" y="3637515"/>
             <a:ext cx="1467068" cy="461665"/>
           </a:xfrm>
           <a:prstGeom prst="rect">
@@ -17866,6 +17866,138 @@
               <a:latin typeface="TM Sans"/>
               <a:cs typeface="TM Sans"/>
             </a:endParaRPr>
+          </a:p>
+        </p:txBody>
+      </p:sp>
+      <p:sp>
+        <p:nvSpPr>
+          <p:cNvPr id="14" name="TextBox 13"/>
+          <p:cNvSpPr txBox="1"/>
+          <p:nvPr/>
+        </p:nvSpPr>
+        <p:spPr>
+          <a:xfrm>
+            <a:off x="2323397" y="4156558"/>
+            <a:ext cx="1675908" cy="461665"/>
+          </a:xfrm>
+          <a:prstGeom prst="rect">
+            <a:avLst/>
+          </a:prstGeom>
+          <a:noFill/>
+        </p:spPr>
+        <p:txBody>
+          <a:bodyPr wrap="none" rtlCol="0">
+            <a:spAutoFit/>
+          </a:bodyPr>
+          <a:lstStyle/>
+          <a:p>
+            <a:r>
+              <a:rPr lang="en-US" sz="2400" dirty="0">
+                <a:latin typeface="TM Sans"/>
+                <a:cs typeface="TM Sans"/>
+              </a:rPr>
+              <a:t>Kubernetes</a:t>
+            </a:r>
+          </a:p>
+        </p:txBody>
+      </p:sp>
+      <p:sp>
+        <p:nvSpPr>
+          <p:cNvPr id="15" name="TextBox 14"/>
+          <p:cNvSpPr txBox="1"/>
+          <p:nvPr/>
+        </p:nvSpPr>
+        <p:spPr>
+          <a:xfrm>
+            <a:off x="7062747" y="2606039"/>
+            <a:ext cx="1751249" cy="461665"/>
+          </a:xfrm>
+          <a:prstGeom prst="rect">
+            <a:avLst/>
+          </a:prstGeom>
+          <a:noFill/>
+        </p:spPr>
+        <p:txBody>
+          <a:bodyPr wrap="none" rtlCol="0">
+            <a:spAutoFit/>
+          </a:bodyPr>
+          <a:lstStyle/>
+          <a:p>
+            <a:r>
+              <a:rPr lang="en-US" sz="2400" dirty="0">
+                <a:latin typeface="TM Sans"/>
+                <a:cs typeface="TM Sans"/>
+              </a:rPr>
+              <a:t>Prometheus</a:t>
+            </a:r>
+          </a:p>
+        </p:txBody>
+      </p:sp>
+      <p:sp>
+        <p:nvSpPr>
+          <p:cNvPr id="16" name="TextBox 15"/>
+          <p:cNvSpPr txBox="1"/>
+          <p:nvPr/>
+        </p:nvSpPr>
+        <p:spPr>
+          <a:xfrm>
+            <a:off x="952974" y="2729372"/>
+            <a:ext cx="1253677" cy="461665"/>
+          </a:xfrm>
+          <a:prstGeom prst="rect">
+            <a:avLst/>
+          </a:prstGeom>
+          <a:noFill/>
+        </p:spPr>
+        <p:txBody>
+          <a:bodyPr wrap="none" rtlCol="0">
+            <a:spAutoFit/>
+          </a:bodyPr>
+          <a:lstStyle/>
+          <a:p>
+            <a:r>
+              <a:rPr lang="en-US" sz="2400" dirty="0" err="1">
+                <a:latin typeface="TM Sans"/>
+                <a:cs typeface="TM Sans"/>
+              </a:rPr>
+              <a:t>Telegraf</a:t>
+            </a:r>
+            <a:endParaRPr lang="en-US" sz="2400" dirty="0">
+              <a:latin typeface="TM Sans"/>
+              <a:cs typeface="TM Sans"/>
+            </a:endParaRPr>
+          </a:p>
+        </p:txBody>
+      </p:sp>
+      <p:sp>
+        <p:nvSpPr>
+          <p:cNvPr id="17" name="TextBox 16"/>
+          <p:cNvSpPr txBox="1"/>
+          <p:nvPr/>
+        </p:nvSpPr>
+        <p:spPr>
+          <a:xfrm>
+            <a:off x="6502192" y="3847320"/>
+            <a:ext cx="668773" cy="461665"/>
+          </a:xfrm>
+          <a:prstGeom prst="rect">
+            <a:avLst/>
+          </a:prstGeom>
+          <a:noFill/>
+        </p:spPr>
+        <p:txBody>
+          <a:bodyPr wrap="none" rtlCol="0">
+            <a:spAutoFit/>
+          </a:bodyPr>
+          <a:lstStyle/>
+          <a:p>
+            <a:r>
+              <a:rPr lang="en-US" sz="2400" dirty="0">
+                <a:latin typeface="TM Sans"/>
+                <a:cs typeface="TM Sans"/>
+              </a:rPr>
+              <a:t>ELK</a:t>
+            </a:r>
           </a:p>
         </p:txBody>
       </p:sp>

</xml_diff>

<commit_message>
Updated some note text
</commit_message>
<xml_diff>
--- a/Summit2017_Mocking.pptx
+++ b/Summit2017_Mocking.pptx
@@ -2018,7 +2018,7 @@
                 <a:ea typeface="+mn-ea"/>
                 <a:cs typeface="+mn-cs"/>
               </a:rPr>
-              <a:t>He found out Enzo Ferrari was looking to sell his company.</a:t>
+              <a:t>It so happened that Enzo Ferrari was looking to sell his company</a:t>
             </a:r>
           </a:p>
           <a:p>
@@ -2054,7 +2054,7 @@
                 <a:ea typeface="+mn-ea"/>
                 <a:cs typeface="+mn-cs"/>
               </a:rPr>
-              <a:t>Ferrari walked out when he found out Ford refused to let him remain in control of the racing division. </a:t>
+              <a:t>Ferrari walked out when he found out that Ford refused to let him remain in control of the racing division</a:t>
             </a:r>
           </a:p>
           <a:p>
@@ -2072,7 +2072,7 @@
                 <a:ea typeface="+mn-ea"/>
                 <a:cs typeface="+mn-cs"/>
               </a:rPr>
-              <a:t>Ford was now determined to beat Ferrari and outsourced development of a race car to company from England. The result was the GT40.</a:t>
+              <a:t>Ford became even more determined to beat Ferrari and outsourced development of a race car to company in England. The result was the GT40.</a:t>
             </a:r>
             <a:endParaRPr lang="en-US" dirty="0"/>
           </a:p>
@@ -2438,7 +2438,7 @@
                 <a:ea typeface="+mn-ea"/>
                 <a:cs typeface="+mn-cs"/>
               </a:rPr>
-              <a:t>A significant part of automated testing is isolating your system under test and validating real-world conditions and oftentimes even conditions you don’t expect</a:t>
+              <a:t>A big part of automated testing is isolating your system under test and validating real-world conditions</a:t>
             </a:r>
           </a:p>
         </p:txBody>
@@ -2859,6 +2859,29 @@
             </a:pPr>
             <a:r>
               <a:rPr lang="en-US" dirty="0"/>
+              <a:t>I want to remove Get-</a:t>
+            </a:r>
+            <a:r>
+              <a:rPr lang="en-US" dirty="0" err="1"/>
+              <a:t>ChildItem</a:t>
+            </a:r>
+            <a:r>
+              <a:rPr lang="en-US" dirty="0"/>
+              <a:t> as a variable in </a:t>
+            </a:r>
+            <a:r>
+              <a:rPr lang="en-US"/>
+              <a:t>my test</a:t>
+            </a:r>
+            <a:endParaRPr lang="en-US" dirty="0"/>
+          </a:p>
+          <a:p>
+            <a:pPr marL="171450" indent="-171450">
+              <a:buFont typeface="Arial" panose="020B0604020202020204" pitchFamily="34" charset="0"/>
+              <a:buChar char="•"/>
+            </a:pPr>
+            <a:r>
+              <a:rPr lang="en-US" dirty="0"/>
               <a:t>This test does use a Should Be assertion to verify the value returned by </a:t>
             </a:r>
             <a:r>
@@ -2986,21 +3009,8 @@
             </a:pPr>
             <a:r>
               <a:rPr lang="en-US" dirty="0"/>
-              <a:t>Here, my </a:t>
-            </a:r>
-            <a:r>
-              <a:rPr lang="en-US" dirty="0" err="1"/>
-              <a:t>StubMe</a:t>
-            </a:r>
-            <a:r>
-              <a:rPr lang="en-US" dirty="0"/>
-              <a:t> function is extracting a specific property of the output of Get-</a:t>
-            </a:r>
-            <a:r>
-              <a:rPr lang="en-US" dirty="0" err="1"/>
-              <a:t>ChildItem</a:t>
-            </a:r>
-            <a:endParaRPr lang="en-US" dirty="0"/>
+              <a:t>Gale Colas alerted me to this project just this week</a:t>
+            </a:r>
           </a:p>
           <a:p>
             <a:pPr marL="171450" indent="-171450">
@@ -3009,60 +3019,7 @@
             </a:pPr>
             <a:r>
               <a:rPr lang="en-US" dirty="0"/>
-              <a:t>In this case my Mock statement has no </a:t>
-            </a:r>
-            <a:r>
-              <a:rPr lang="en-US" dirty="0" err="1"/>
-              <a:t>ParameterFilter</a:t>
-            </a:r>
-            <a:r>
-              <a:rPr lang="en-US" dirty="0"/>
-              <a:t> and instead returns a Fake Object</a:t>
-            </a:r>
-          </a:p>
-          <a:p>
-            <a:pPr marL="171450" indent="-171450">
-              <a:buFont typeface="Arial" panose="020B0604020202020204" pitchFamily="34" charset="0"/>
-              <a:buChar char="•"/>
-            </a:pPr>
-            <a:r>
-              <a:rPr lang="en-US" dirty="0"/>
-              <a:t>This test does use a Should Be assertion to verify the value returned by </a:t>
-            </a:r>
-            <a:r>
-              <a:rPr lang="en-US" dirty="0" err="1"/>
-              <a:t>StubMe</a:t>
-            </a:r>
-            <a:endParaRPr lang="en-US" dirty="0"/>
-          </a:p>
-          <a:p>
-            <a:pPr marL="171450" indent="-171450">
-              <a:buFont typeface="Arial" panose="020B0604020202020204" pitchFamily="34" charset="0"/>
-              <a:buChar char="•"/>
-            </a:pPr>
-            <a:r>
-              <a:rPr lang="en-US" dirty="0"/>
-              <a:t>These are both simple examples, but even as the code and tests become more complex it boils down to behavior or state verification.</a:t>
-            </a:r>
-          </a:p>
-          <a:p>
-            <a:pPr marL="171450" indent="-171450">
-              <a:buFont typeface="Arial" panose="020B0604020202020204" pitchFamily="34" charset="0"/>
-              <a:buChar char="•"/>
-            </a:pPr>
-            <a:r>
-              <a:rPr lang="en-US" dirty="0"/>
-              <a:t>Behavior Verification is good when you are testing an integration with some dependency. You want to test that you are making the correct calls, but not actually making them.</a:t>
-            </a:r>
-          </a:p>
-          <a:p>
-            <a:pPr marL="171450" indent="-171450">
-              <a:buFont typeface="Arial" panose="020B0604020202020204" pitchFamily="34" charset="0"/>
-              <a:buChar char="•"/>
-            </a:pPr>
-            <a:r>
-              <a:rPr lang="en-US" dirty="0"/>
-              <a:t>State Verification is necessary when your System Under Test is modifying state. Obviously. </a:t>
+              <a:t>You can quickly generate stubs </a:t>
             </a:r>
           </a:p>
         </p:txBody>
@@ -12196,45 +12153,13 @@
       </p:sp>
       <p:sp>
         <p:nvSpPr>
-          <p:cNvPr id="14" name="TextBox 13"/>
-          <p:cNvSpPr txBox="1"/>
-          <p:nvPr/>
-        </p:nvSpPr>
-        <p:spPr>
-          <a:xfrm>
-            <a:off x="4172079" y="1745723"/>
-            <a:ext cx="2688813" cy="461665"/>
-          </a:xfrm>
-          <a:prstGeom prst="rect">
-            <a:avLst/>
-          </a:prstGeom>
-          <a:noFill/>
-        </p:spPr>
-        <p:txBody>
-          <a:bodyPr wrap="none" rtlCol="0">
-            <a:spAutoFit/>
-          </a:bodyPr>
-          <a:lstStyle/>
-          <a:p>
-            <a:r>
-              <a:rPr lang="en-US" sz="2400" dirty="0">
-                <a:latin typeface="TM Sans"/>
-                <a:cs typeface="TM Sans"/>
-              </a:rPr>
-              <a:t>PowerShell Classes</a:t>
-            </a:r>
-          </a:p>
-        </p:txBody>
-      </p:sp>
-      <p:sp>
-        <p:nvSpPr>
           <p:cNvPr id="15" name="TextBox 14"/>
           <p:cNvSpPr txBox="1"/>
           <p:nvPr/>
         </p:nvSpPr>
         <p:spPr>
           <a:xfrm>
-            <a:off x="3783301" y="3919229"/>
+            <a:off x="4688646" y="3753487"/>
             <a:ext cx="1436804" cy="461665"/>
           </a:xfrm>
           <a:prstGeom prst="rect">
@@ -12266,7 +12191,7 @@
         </p:nvSpPr>
         <p:spPr>
           <a:xfrm>
-            <a:off x="5753230" y="3230369"/>
+            <a:off x="5220105" y="1606223"/>
             <a:ext cx="1282852" cy="461665"/>
           </a:xfrm>
           <a:prstGeom prst="rect">

</xml_diff>

<commit_message>
Cleaned up some notes
</commit_message>
<xml_diff>
--- a/Summit2017_Mocking.pptx
+++ b/Summit2017_Mocking.pptx
@@ -725,7 +725,7 @@
           <a:bodyPr/>
           <a:lstStyle/>
           <a:p>
-            <a:endParaRPr lang="en-US"/>
+            <a:endParaRPr lang="en-US" dirty="0"/>
           </a:p>
         </p:txBody>
       </p:sp>
@@ -2205,7 +2205,7 @@
                 <a:ea typeface="+mn-ea"/>
                 <a:cs typeface="+mn-cs"/>
               </a:rPr>
-              <a:t>It so happened that Enzo Ferrari was looking to sell his company</a:t>
+              <a:t>It just so happened that Enzo Ferrari was struggling financially and looking to sell his company</a:t>
             </a:r>
           </a:p>
           <a:p>
@@ -2241,7 +2241,7 @@
                 <a:ea typeface="+mn-ea"/>
                 <a:cs typeface="+mn-cs"/>
               </a:rPr>
-              <a:t>Ferrari walked out when he found out that Ford refused to let him remain in control of the racing division</a:t>
+              <a:t>However, Ferrari walked out when he found out that Ford refused to let him remain in control of the racing division</a:t>
             </a:r>
           </a:p>
           <a:p>
@@ -2478,7 +2478,7 @@
                 <a:ea typeface="+mn-ea"/>
                 <a:cs typeface="+mn-cs"/>
               </a:rPr>
-              <a:t>After the 1965 season Ford built a dynamometer laboratory to automate the testing of the engines as closely to on-course conditions as possible .</a:t>
+              <a:t>After the 1965 season Ford built a dynamometer laboratory to automate the testing of the engines as closely to on-course conditions as possible</a:t>
             </a:r>
           </a:p>
           <a:p>
@@ -2725,7 +2725,7 @@
                 <a:ea typeface="+mn-ea"/>
                 <a:cs typeface="+mn-cs"/>
               </a:rPr>
-              <a:t>I want to start with some vocabulary</a:t>
+              <a:t>Mocking lets you test one unit of code without executing the entire program. Like testing just the engine and not the entire car.</a:t>
             </a:r>
           </a:p>
           <a:p>
@@ -2743,7 +2743,25 @@
                 <a:ea typeface="+mn-ea"/>
                 <a:cs typeface="+mn-cs"/>
               </a:rPr>
-              <a:t>The names aren’t super important. We tend to refer to everything as Mocking unless your title is QA Automation Engineer, but it’s helpful to understand the different patterns.</a:t>
+              <a:t>So, lets start with some vocabulary</a:t>
+            </a:r>
+          </a:p>
+          <a:p>
+            <a:pPr marL="171450" indent="-171450">
+              <a:buFont typeface="Arial" panose="020B0604020202020204" pitchFamily="34" charset="0"/>
+              <a:buChar char="•"/>
+            </a:pPr>
+            <a:r>
+              <a:rPr lang="en-US" sz="1000" b="0" i="0" kern="1200" dirty="0">
+                <a:solidFill>
+                  <a:schemeClr val="tx1"/>
+                </a:solidFill>
+                <a:effectLst/>
+                <a:latin typeface="+mn-lt"/>
+                <a:ea typeface="+mn-ea"/>
+                <a:cs typeface="+mn-cs"/>
+              </a:rPr>
+              <a:t>We tend to refer to everything as Mocking, but it’s helpful to understand the different patterns.</a:t>
             </a:r>
           </a:p>
           <a:p>
@@ -17499,12 +17517,9 @@
               <a:buChar char="•"/>
             </a:pPr>
             <a:r>
-              <a:rPr lang="en-US" dirty="0">
-                <a:hlinkClick r:id="rId3"/>
-              </a:rPr>
+              <a:rPr lang="en-US" dirty="0"/>
               <a:t>https://github.com/cdhunt/pssummit2017-mocking</a:t>
             </a:r>
-            <a:endParaRPr lang="en-US" dirty="0"/>
           </a:p>
           <a:p>
             <a:pPr marL="429718" lvl="1" indent="-285750">
@@ -18501,7 +18516,7 @@
         </p:nvSpPr>
         <p:spPr>
           <a:xfrm>
-            <a:off x="273050" y="961711"/>
+            <a:off x="273050" y="807810"/>
             <a:ext cx="8550275" cy="320440"/>
           </a:xfrm>
         </p:spPr>
@@ -18804,7 +18819,7 @@
         </p:blipFill>
         <p:spPr>
           <a:xfrm>
-            <a:off x="1811749" y="1282151"/>
+            <a:off x="1811749" y="1155409"/>
             <a:ext cx="5490080" cy="3660053"/>
           </a:xfrm>
           <a:prstGeom prst="rect">
@@ -18887,7 +18902,7 @@
         </p:nvSpPr>
         <p:spPr>
           <a:xfrm>
-            <a:off x="273050" y="961711"/>
+            <a:off x="273050" y="834969"/>
             <a:ext cx="8550275" cy="320440"/>
           </a:xfrm>
         </p:spPr>
@@ -19170,7 +19185,7 @@
         </p:nvSpPr>
         <p:spPr>
           <a:xfrm>
-            <a:off x="5445997" y="528495"/>
+            <a:off x="5445997" y="490787"/>
             <a:ext cx="730102" cy="354419"/>
           </a:xfrm>
           <a:prstGeom prst="downArrow">
@@ -19253,7 +19268,7 @@
         </p:blipFill>
         <p:spPr>
           <a:xfrm>
-            <a:off x="2045835" y="1478975"/>
+            <a:off x="2045835" y="1279801"/>
             <a:ext cx="5004703" cy="3449081"/>
           </a:xfrm>
           <a:prstGeom prst="rect">
@@ -19614,7 +19629,7 @@
         </p:blipFill>
         <p:spPr>
           <a:xfrm>
-            <a:off x="2045835" y="1554482"/>
+            <a:off x="2045835" y="1394262"/>
             <a:ext cx="5004703" cy="3088616"/>
           </a:xfrm>
           <a:prstGeom prst="rect">
@@ -20031,7 +20046,7 @@
         </p:nvSpPr>
         <p:spPr>
           <a:xfrm>
-            <a:off x="225530" y="837006"/>
+            <a:off x="717011" y="841093"/>
             <a:ext cx="7662354" cy="3785652"/>
           </a:xfrm>
           <a:prstGeom prst="rect">

</xml_diff>